<commit_message>
Modified Week 3 lab...
... but didn't add exercise code yet
</commit_message>
<xml_diff>
--- a/Week 3 -- Temporal Models/Lab/Lab 3 -- Gompertz model.pptx
+++ b/Week 3 -- Temporal Models/Lab/Lab 3 -- Gompertz model.pptx
@@ -5,7 +5,7 @@
     <p:sldMasterId id="2147483672" r:id="rId1"/>
   </p:sldMasterIdLst>
   <p:notesMasterIdLst>
-    <p:notesMasterId r:id="rId13"/>
+    <p:notesMasterId r:id="rId21"/>
   </p:notesMasterIdLst>
   <p:sldIdLst>
     <p:sldId id="266" r:id="rId2"/>
@@ -19,6 +19,14 @@
     <p:sldId id="332" r:id="rId10"/>
     <p:sldId id="333" r:id="rId11"/>
     <p:sldId id="334" r:id="rId12"/>
+    <p:sldId id="338" r:id="rId13"/>
+    <p:sldId id="335" r:id="rId14"/>
+    <p:sldId id="337" r:id="rId15"/>
+    <p:sldId id="339" r:id="rId16"/>
+    <p:sldId id="340" r:id="rId17"/>
+    <p:sldId id="341" r:id="rId18"/>
+    <p:sldId id="342" r:id="rId19"/>
+    <p:sldId id="343" r:id="rId20"/>
   </p:sldIdLst>
   <p:sldSz cx="9144000" cy="6858000" type="screen4x3"/>
   <p:notesSz cx="6858000" cy="9144000"/>
@@ -207,7 +215,7 @@
           <a:p>
             <a:fld id="{1522831B-4FE3-4D45-950B-0D2C6BB2DD76}" type="datetimeFigureOut">
               <a:rPr lang="en-US" smtClean="0"/>
-              <a:t>3/7/2018</a:t>
+              <a:t>4/12/2018</a:t>
             </a:fld>
             <a:endParaRPr lang="en-US"/>
           </a:p>
@@ -3478,8 +3486,8 @@
           <a:lstStyle/>
           <a:p>
             <a:r>
-              <a:rPr lang="en-US" dirty="0" smtClean="0"/>
-              <a:t>April 5, 2016</a:t>
+              <a:rPr lang="en-US" smtClean="0"/>
+              <a:t>April 12, 2018</a:t>
             </a:r>
             <a:endParaRPr lang="en-US" dirty="0"/>
           </a:p>
@@ -3680,8 +3688,8 @@
           </a:p>
         </p:txBody>
       </p:sp>
-      <mc:AlternateContent xmlns:mc="http://schemas.openxmlformats.org/markup-compatibility/2006">
-        <mc:Choice xmlns:a14="http://schemas.microsoft.com/office/drawing/2010/main" Requires="a14">
+      <mc:AlternateContent xmlns:mc="http://schemas.openxmlformats.org/markup-compatibility/2006" xmlns:a14="http://schemas.microsoft.com/office/drawing/2010/main">
+        <mc:Choice Requires="a14">
           <p:sp>
             <p:nvSpPr>
               <p:cNvPr id="3" name="Content Placeholder 2"/>
@@ -3704,7 +3712,6 @@
                   <a:rPr lang="en-US" b="1" dirty="0" smtClean="0"/>
                   <a:t>Gompertz model</a:t>
                 </a:r>
-                <a:endParaRPr lang="en-US" b="1" dirty="0" smtClean="0"/>
               </a:p>
               <a:p>
                 <a:pPr marL="0" indent="0">
@@ -3714,16 +3721,11 @@
                   <a:rPr lang="en-US" i="1" dirty="0" smtClean="0"/>
                   <a:t>Benefits</a:t>
                 </a:r>
-                <a:endParaRPr lang="en-US" i="1" dirty="0" smtClean="0"/>
               </a:p>
               <a:p>
                 <a:r>
                   <a:rPr lang="en-US" dirty="0" smtClean="0"/>
-                  <a:t>Specifies an explicit </a:t>
-                </a:r>
-                <a:r>
-                  <a:rPr lang="en-US" dirty="0" smtClean="0"/>
-                  <a:t>model</a:t>
+                  <a:t>Specifies an explicit model</a:t>
                 </a:r>
               </a:p>
               <a:p>
@@ -3732,7 +3734,6 @@
                   <a:rPr lang="en-US" dirty="0" smtClean="0"/>
                   <a:t>Can select form of density dependence</a:t>
                 </a:r>
-                <a:endParaRPr lang="en-US" dirty="0" smtClean="0"/>
               </a:p>
               <a:p>
                 <a:r>
@@ -4073,7 +4074,7 @@
             </p:txBody>
           </p:sp>
         </mc:Choice>
-        <mc:Fallback>
+        <mc:Fallback xmlns="">
           <p:sp>
             <p:nvSpPr>
               <p:cNvPr id="3" name="Content Placeholder 2"/>
@@ -4230,6 +4231,4695 @@
 </p:sld>
 </file>
 
+<file path=ppt/slides/slide12.xml><?xml version="1.0" encoding="utf-8"?>
+<p:sld xmlns:a="http://schemas.openxmlformats.org/drawingml/2006/main" xmlns:r="http://schemas.openxmlformats.org/officeDocument/2006/relationships" xmlns:p="http://schemas.openxmlformats.org/presentationml/2006/main">
+  <p:cSld>
+    <p:spTree>
+      <p:nvGrpSpPr>
+        <p:cNvPr id="1" name=""/>
+        <p:cNvGrpSpPr/>
+        <p:nvPr/>
+      </p:nvGrpSpPr>
+      <p:grpSpPr>
+        <a:xfrm>
+          <a:off x="0" y="0"/>
+          <a:ext cx="0" cy="0"/>
+          <a:chOff x="0" y="0"/>
+          <a:chExt cx="0" cy="0"/>
+        </a:xfrm>
+      </p:grpSpPr>
+      <p:sp>
+        <p:nvSpPr>
+          <p:cNvPr id="2" name="Title 1"/>
+          <p:cNvSpPr>
+            <a:spLocks noGrp="1"/>
+          </p:cNvSpPr>
+          <p:nvPr>
+            <p:ph type="title"/>
+          </p:nvPr>
+        </p:nvSpPr>
+        <p:spPr/>
+        <p:txBody>
+          <a:bodyPr/>
+          <a:lstStyle/>
+          <a:p>
+            <a:endParaRPr lang="en-GB"/>
+          </a:p>
+        </p:txBody>
+      </p:sp>
+      <p:sp>
+        <p:nvSpPr>
+          <p:cNvPr id="3" name="Content Placeholder 2"/>
+          <p:cNvSpPr>
+            <a:spLocks noGrp="1"/>
+          </p:cNvSpPr>
+          <p:nvPr>
+            <p:ph idx="1"/>
+          </p:nvPr>
+        </p:nvSpPr>
+        <p:spPr/>
+        <p:txBody>
+          <a:bodyPr/>
+          <a:lstStyle/>
+          <a:p>
+            <a:pPr marL="0" indent="0">
+              <a:buNone/>
+            </a:pPr>
+            <a:r>
+              <a:rPr lang="en-US" b="1" dirty="0" smtClean="0"/>
+              <a:t>Map argument</a:t>
+            </a:r>
+            <a:endParaRPr lang="en-US" dirty="0" smtClean="0"/>
+          </a:p>
+          <a:p>
+            <a:pPr marL="0" indent="0">
+              <a:buNone/>
+            </a:pPr>
+            <a:endParaRPr lang="en-US" b="1" dirty="0"/>
+          </a:p>
+          <a:p>
+            <a:pPr marL="0" indent="0">
+              <a:buNone/>
+            </a:pPr>
+            <a:r>
+              <a:rPr lang="en-US" b="1" dirty="0" smtClean="0"/>
+              <a:t>[Look at map example in GitHub]</a:t>
+            </a:r>
+            <a:endParaRPr lang="en-US" b="1" dirty="0" smtClean="0"/>
+          </a:p>
+        </p:txBody>
+      </p:sp>
+    </p:spTree>
+    <p:extLst>
+      <p:ext uri="{BB962C8B-B14F-4D97-AF65-F5344CB8AC3E}">
+        <p14:creationId xmlns:p14="http://schemas.microsoft.com/office/powerpoint/2010/main" val="37211971"/>
+      </p:ext>
+    </p:extLst>
+  </p:cSld>
+  <p:clrMapOvr>
+    <a:masterClrMapping/>
+  </p:clrMapOvr>
+  <p:timing>
+    <p:tnLst>
+      <p:par>
+        <p:cTn id="1" dur="indefinite" restart="never" nodeType="tmRoot"/>
+      </p:par>
+    </p:tnLst>
+  </p:timing>
+</p:sld>
+</file>
+
+<file path=ppt/slides/slide13.xml><?xml version="1.0" encoding="utf-8"?>
+<p:sld xmlns:a="http://schemas.openxmlformats.org/drawingml/2006/main" xmlns:r="http://schemas.openxmlformats.org/officeDocument/2006/relationships" xmlns:p="http://schemas.openxmlformats.org/presentationml/2006/main">
+  <p:cSld>
+    <p:spTree>
+      <p:nvGrpSpPr>
+        <p:cNvPr id="1" name=""/>
+        <p:cNvGrpSpPr/>
+        <p:nvPr/>
+      </p:nvGrpSpPr>
+      <p:grpSpPr>
+        <a:xfrm>
+          <a:off x="0" y="0"/>
+          <a:ext cx="0" cy="0"/>
+          <a:chOff x="0" y="0"/>
+          <a:chExt cx="0" cy="0"/>
+        </a:xfrm>
+      </p:grpSpPr>
+      <p:sp>
+        <p:nvSpPr>
+          <p:cNvPr id="2" name="Title 1"/>
+          <p:cNvSpPr>
+            <a:spLocks noGrp="1"/>
+          </p:cNvSpPr>
+          <p:nvPr>
+            <p:ph type="title"/>
+          </p:nvPr>
+        </p:nvSpPr>
+        <p:spPr/>
+        <p:txBody>
+          <a:bodyPr/>
+          <a:lstStyle/>
+          <a:p>
+            <a:endParaRPr lang="en-GB"/>
+          </a:p>
+        </p:txBody>
+      </p:sp>
+      <p:sp>
+        <p:nvSpPr>
+          <p:cNvPr id="3" name="Content Placeholder 2"/>
+          <p:cNvSpPr>
+            <a:spLocks noGrp="1"/>
+          </p:cNvSpPr>
+          <p:nvPr>
+            <p:ph idx="1"/>
+          </p:nvPr>
+        </p:nvSpPr>
+        <p:spPr>
+          <a:xfrm>
+            <a:off x="76200" y="838200"/>
+            <a:ext cx="3715062" cy="5943600"/>
+          </a:xfrm>
+        </p:spPr>
+        <p:txBody>
+          <a:bodyPr/>
+          <a:lstStyle/>
+          <a:p>
+            <a:pPr marL="0" indent="0">
+              <a:buNone/>
+            </a:pPr>
+            <a:r>
+              <a:rPr lang="en-US" b="1" dirty="0" smtClean="0"/>
+              <a:t>Try again with real data</a:t>
+            </a:r>
+          </a:p>
+          <a:p>
+            <a:pPr marL="0" indent="0">
+              <a:buNone/>
+            </a:pPr>
+            <a:endParaRPr lang="en-US" b="1" dirty="0"/>
+          </a:p>
+          <a:p>
+            <a:pPr marL="0" indent="0">
+              <a:buNone/>
+            </a:pPr>
+            <a:r>
+              <a:rPr lang="en-US" dirty="0" smtClean="0"/>
+              <a:t>Package </a:t>
+            </a:r>
+            <a:r>
+              <a:rPr lang="en-US" i="1" dirty="0" err="1" smtClean="0"/>
+              <a:t>FishLife</a:t>
+            </a:r>
+            <a:endParaRPr lang="en-US" dirty="0" smtClean="0"/>
+          </a:p>
+          <a:p>
+            <a:r>
+              <a:rPr lang="en-US" dirty="0" smtClean="0"/>
+              <a:t>Contains data for 100s of fish populations worldwide</a:t>
+            </a:r>
+            <a:endParaRPr lang="en-US" dirty="0" smtClean="0"/>
+          </a:p>
+          <a:p>
+            <a:pPr marL="0" indent="0">
+              <a:buNone/>
+            </a:pPr>
+            <a:endParaRPr lang="en-US" dirty="0" smtClean="0"/>
+          </a:p>
+          <a:p>
+            <a:pPr marL="0" indent="0">
+              <a:buNone/>
+            </a:pPr>
+            <a:endParaRPr lang="en-US" dirty="0" smtClean="0"/>
+          </a:p>
+          <a:p>
+            <a:pPr marL="457200" lvl="1" indent="0">
+              <a:buNone/>
+            </a:pPr>
+            <a:endParaRPr lang="en-US" dirty="0" smtClean="0"/>
+          </a:p>
+        </p:txBody>
+      </p:sp>
+      <p:pic>
+        <p:nvPicPr>
+          <p:cNvPr id="4" name="Picture 3"/>
+          <p:cNvPicPr>
+            <a:picLocks noChangeAspect="1"/>
+          </p:cNvPicPr>
+          <p:nvPr/>
+        </p:nvPicPr>
+        <p:blipFill>
+          <a:blip r:embed="rId2" cstate="print">
+            <a:extLst>
+              <a:ext uri="{28A0092B-C50C-407E-A947-70E740481C1C}">
+                <a14:useLocalDpi xmlns:a14="http://schemas.microsoft.com/office/drawing/2010/main" val="0"/>
+              </a:ext>
+            </a:extLst>
+          </a:blip>
+          <a:stretch>
+            <a:fillRect/>
+          </a:stretch>
+        </p:blipFill>
+        <p:spPr>
+          <a:xfrm>
+            <a:off x="3791262" y="1304144"/>
+            <a:ext cx="5276538" cy="5276538"/>
+          </a:xfrm>
+          <a:prstGeom prst="rect">
+            <a:avLst/>
+          </a:prstGeom>
+        </p:spPr>
+      </p:pic>
+    </p:spTree>
+    <p:extLst>
+      <p:ext uri="{BB962C8B-B14F-4D97-AF65-F5344CB8AC3E}">
+        <p14:creationId xmlns:p14="http://schemas.microsoft.com/office/powerpoint/2010/main" val="211285545"/>
+      </p:ext>
+    </p:extLst>
+  </p:cSld>
+  <p:clrMapOvr>
+    <a:masterClrMapping/>
+  </p:clrMapOvr>
+  <p:timing>
+    <p:tnLst>
+      <p:par>
+        <p:cTn id="1" dur="indefinite" restart="never" nodeType="tmRoot"/>
+      </p:par>
+    </p:tnLst>
+  </p:timing>
+</p:sld>
+</file>
+
+<file path=ppt/slides/slide14.xml><?xml version="1.0" encoding="utf-8"?>
+<p:sld xmlns:a="http://schemas.openxmlformats.org/drawingml/2006/main" xmlns:r="http://schemas.openxmlformats.org/officeDocument/2006/relationships" xmlns:p="http://schemas.openxmlformats.org/presentationml/2006/main">
+  <p:cSld>
+    <p:spTree>
+      <p:nvGrpSpPr>
+        <p:cNvPr id="1" name=""/>
+        <p:cNvGrpSpPr/>
+        <p:nvPr/>
+      </p:nvGrpSpPr>
+      <p:grpSpPr>
+        <a:xfrm>
+          <a:off x="0" y="0"/>
+          <a:ext cx="0" cy="0"/>
+          <a:chOff x="0" y="0"/>
+          <a:chExt cx="0" cy="0"/>
+        </a:xfrm>
+      </p:grpSpPr>
+      <p:sp>
+        <p:nvSpPr>
+          <p:cNvPr id="2" name="Title 1"/>
+          <p:cNvSpPr>
+            <a:spLocks noGrp="1"/>
+          </p:cNvSpPr>
+          <p:nvPr>
+            <p:ph type="title"/>
+          </p:nvPr>
+        </p:nvSpPr>
+        <p:spPr/>
+        <p:txBody>
+          <a:bodyPr/>
+          <a:lstStyle/>
+          <a:p>
+            <a:endParaRPr lang="en-GB"/>
+          </a:p>
+        </p:txBody>
+      </p:sp>
+      <p:sp>
+        <p:nvSpPr>
+          <p:cNvPr id="3" name="Content Placeholder 2"/>
+          <p:cNvSpPr>
+            <a:spLocks noGrp="1"/>
+          </p:cNvSpPr>
+          <p:nvPr>
+            <p:ph idx="1"/>
+          </p:nvPr>
+        </p:nvSpPr>
+        <p:spPr>
+          <a:xfrm>
+            <a:off x="76200" y="838200"/>
+            <a:ext cx="8991600" cy="5943600"/>
+          </a:xfrm>
+        </p:spPr>
+        <p:txBody>
+          <a:bodyPr/>
+          <a:lstStyle/>
+          <a:p>
+            <a:pPr marL="0" indent="0">
+              <a:buNone/>
+            </a:pPr>
+            <a:r>
+              <a:rPr lang="en-US" b="1" dirty="0" smtClean="0"/>
+              <a:t>Alaska pollock</a:t>
+            </a:r>
+          </a:p>
+          <a:p>
+            <a:pPr marL="0" indent="0">
+              <a:buNone/>
+            </a:pPr>
+            <a:endParaRPr lang="en-US" b="1" dirty="0"/>
+          </a:p>
+          <a:p>
+            <a:pPr marL="0" indent="0">
+              <a:buNone/>
+            </a:pPr>
+            <a:r>
+              <a:rPr lang="en-US" dirty="0" smtClean="0"/>
+              <a:t>Is this converged?</a:t>
+            </a:r>
+          </a:p>
+          <a:p>
+            <a:pPr marL="0" indent="0">
+              <a:buNone/>
+            </a:pPr>
+            <a:endParaRPr lang="en-US" dirty="0"/>
+          </a:p>
+          <a:p>
+            <a:pPr marL="0" indent="0">
+              <a:buNone/>
+            </a:pPr>
+            <a:r>
+              <a:rPr lang="en-US" dirty="0" smtClean="0"/>
+              <a:t>How to modify?</a:t>
+            </a:r>
+          </a:p>
+          <a:p>
+            <a:pPr marL="0" indent="0">
+              <a:buNone/>
+            </a:pPr>
+            <a:endParaRPr lang="en-US" dirty="0" smtClean="0"/>
+          </a:p>
+          <a:p>
+            <a:pPr marL="0" indent="0">
+              <a:buNone/>
+            </a:pPr>
+            <a:endParaRPr lang="en-US" dirty="0" smtClean="0"/>
+          </a:p>
+          <a:p>
+            <a:pPr marL="457200" lvl="1" indent="0">
+              <a:buNone/>
+            </a:pPr>
+            <a:endParaRPr lang="en-US" dirty="0" smtClean="0"/>
+          </a:p>
+        </p:txBody>
+      </p:sp>
+      <p:pic>
+        <p:nvPicPr>
+          <p:cNvPr id="4" name="Picture 3"/>
+          <p:cNvPicPr>
+            <a:picLocks noChangeAspect="1"/>
+          </p:cNvPicPr>
+          <p:nvPr/>
+        </p:nvPicPr>
+        <p:blipFill>
+          <a:blip r:embed="rId2" cstate="print">
+            <a:extLst>
+              <a:ext uri="{28A0092B-C50C-407E-A947-70E740481C1C}">
+                <a14:useLocalDpi xmlns:a14="http://schemas.microsoft.com/office/drawing/2010/main" val="0"/>
+              </a:ext>
+            </a:extLst>
+          </a:blip>
+          <a:stretch>
+            <a:fillRect/>
+          </a:stretch>
+        </p:blipFill>
+        <p:spPr>
+          <a:xfrm>
+            <a:off x="3296579" y="914400"/>
+            <a:ext cx="5906132" cy="3691332"/>
+          </a:xfrm>
+          <a:prstGeom prst="rect">
+            <a:avLst/>
+          </a:prstGeom>
+        </p:spPr>
+      </p:pic>
+      <p:graphicFrame>
+        <p:nvGraphicFramePr>
+          <p:cNvPr id="7" name="Table 6"/>
+          <p:cNvGraphicFramePr>
+            <a:graphicFrameLocks noGrp="1"/>
+          </p:cNvGraphicFramePr>
+          <p:nvPr>
+            <p:extLst>
+              <p:ext uri="{D42A27DB-BD31-4B8C-83A1-F6EECF244321}">
+                <p14:modId xmlns:p14="http://schemas.microsoft.com/office/powerpoint/2010/main" val="2687732233"/>
+              </p:ext>
+            </p:extLst>
+          </p:nvPr>
+        </p:nvGraphicFramePr>
+        <p:xfrm>
+          <a:off x="647076" y="4556760"/>
+          <a:ext cx="6095999" cy="2355850"/>
+        </p:xfrm>
+        <a:graphic>
+          <a:graphicData uri="http://schemas.openxmlformats.org/drawingml/2006/table">
+            <a:tbl>
+              <a:tblPr firstRow="1" bandRow="1">
+                <a:tableStyleId>{5C22544A-7EE6-4342-B048-85BDC9FD1C3A}</a:tableStyleId>
+              </a:tblPr>
+              <a:tblGrid>
+                <a:gridCol w="870857">
+                  <a:extLst>
+                    <a:ext uri="{9D8B030D-6E8A-4147-A177-3AD203B41FA5}">
+                      <a16:colId xmlns:a16="http://schemas.microsoft.com/office/drawing/2014/main" val="2929900390"/>
+                    </a:ext>
+                  </a:extLst>
+                </a:gridCol>
+                <a:gridCol w="870857">
+                  <a:extLst>
+                    <a:ext uri="{9D8B030D-6E8A-4147-A177-3AD203B41FA5}">
+                      <a16:colId xmlns:a16="http://schemas.microsoft.com/office/drawing/2014/main" val="582206649"/>
+                    </a:ext>
+                  </a:extLst>
+                </a:gridCol>
+                <a:gridCol w="870857">
+                  <a:extLst>
+                    <a:ext uri="{9D8B030D-6E8A-4147-A177-3AD203B41FA5}">
+                      <a16:colId xmlns:a16="http://schemas.microsoft.com/office/drawing/2014/main" val="4134810510"/>
+                    </a:ext>
+                  </a:extLst>
+                </a:gridCol>
+                <a:gridCol w="870857">
+                  <a:extLst>
+                    <a:ext uri="{9D8B030D-6E8A-4147-A177-3AD203B41FA5}">
+                      <a16:colId xmlns:a16="http://schemas.microsoft.com/office/drawing/2014/main" val="955040813"/>
+                    </a:ext>
+                  </a:extLst>
+                </a:gridCol>
+                <a:gridCol w="870857">
+                  <a:extLst>
+                    <a:ext uri="{9D8B030D-6E8A-4147-A177-3AD203B41FA5}">
+                      <a16:colId xmlns:a16="http://schemas.microsoft.com/office/drawing/2014/main" val="3654415663"/>
+                    </a:ext>
+                  </a:extLst>
+                </a:gridCol>
+                <a:gridCol w="870857">
+                  <a:extLst>
+                    <a:ext uri="{9D8B030D-6E8A-4147-A177-3AD203B41FA5}">
+                      <a16:colId xmlns:a16="http://schemas.microsoft.com/office/drawing/2014/main" val="2026900679"/>
+                    </a:ext>
+                  </a:extLst>
+                </a:gridCol>
+                <a:gridCol w="870857">
+                  <a:extLst>
+                    <a:ext uri="{9D8B030D-6E8A-4147-A177-3AD203B41FA5}">
+                      <a16:colId xmlns:a16="http://schemas.microsoft.com/office/drawing/2014/main" val="2562458432"/>
+                    </a:ext>
+                  </a:extLst>
+                </a:gridCol>
+              </a:tblGrid>
+              <a:tr h="370840">
+                <a:tc>
+                  <a:txBody>
+                    <a:bodyPr/>
+                    <a:lstStyle/>
+                    <a:p>
+                      <a:pPr algn="l" fontAlgn="b"/>
+                      <a:r>
+                        <a:rPr lang="en-GB" sz="1400" b="0" i="0" u="none" strike="noStrike" dirty="0" err="1">
+                          <a:solidFill>
+                            <a:srgbClr val="000000"/>
+                          </a:solidFill>
+                          <a:effectLst/>
+                          <a:latin typeface="Calibri" panose="020F0502020204030204" pitchFamily="34" charset="0"/>
+                        </a:rPr>
+                        <a:t>Param</a:t>
+                      </a:r>
+                      <a:endParaRPr lang="en-GB" sz="1400" b="0" i="0" u="none" strike="noStrike" dirty="0">
+                        <a:solidFill>
+                          <a:srgbClr val="000000"/>
+                        </a:solidFill>
+                        <a:effectLst/>
+                        <a:latin typeface="Calibri" panose="020F0502020204030204" pitchFamily="34" charset="0"/>
+                      </a:endParaRPr>
+                    </a:p>
+                  </a:txBody>
+                  <a:tcPr marL="9525" marR="9525" marT="9525" marB="0" anchor="b"/>
+                </a:tc>
+                <a:tc>
+                  <a:txBody>
+                    <a:bodyPr/>
+                    <a:lstStyle/>
+                    <a:p>
+                      <a:pPr algn="l" fontAlgn="b"/>
+                      <a:r>
+                        <a:rPr lang="en-GB" sz="1400" b="0" i="0" u="none" strike="noStrike" dirty="0" smtClean="0">
+                          <a:solidFill>
+                            <a:srgbClr val="000000"/>
+                          </a:solidFill>
+                          <a:effectLst/>
+                          <a:latin typeface="Calibri" panose="020F0502020204030204" pitchFamily="34" charset="0"/>
+                        </a:rPr>
+                        <a:t>Starting</a:t>
+                      </a:r>
+                      <a:r>
+                        <a:rPr lang="en-GB" sz="1400" b="0" i="0" u="none" strike="noStrike" baseline="0" dirty="0" smtClean="0">
+                          <a:solidFill>
+                            <a:srgbClr val="000000"/>
+                          </a:solidFill>
+                          <a:effectLst/>
+                          <a:latin typeface="Calibri" panose="020F0502020204030204" pitchFamily="34" charset="0"/>
+                        </a:rPr>
+                        <a:t> </a:t>
+                      </a:r>
+                      <a:r>
+                        <a:rPr lang="en-GB" sz="1400" b="0" i="0" u="none" strike="noStrike" dirty="0" smtClean="0">
+                          <a:solidFill>
+                            <a:srgbClr val="000000"/>
+                          </a:solidFill>
+                          <a:effectLst/>
+                          <a:latin typeface="Calibri" panose="020F0502020204030204" pitchFamily="34" charset="0"/>
+                        </a:rPr>
+                        <a:t>value</a:t>
+                      </a:r>
+                      <a:endParaRPr lang="en-GB" sz="1400" b="0" i="0" u="none" strike="noStrike" dirty="0">
+                        <a:solidFill>
+                          <a:srgbClr val="000000"/>
+                        </a:solidFill>
+                        <a:effectLst/>
+                        <a:latin typeface="Calibri" panose="020F0502020204030204" pitchFamily="34" charset="0"/>
+                      </a:endParaRPr>
+                    </a:p>
+                  </a:txBody>
+                  <a:tcPr marL="9525" marR="9525" marT="9525" marB="0" anchor="b"/>
+                </a:tc>
+                <a:tc>
+                  <a:txBody>
+                    <a:bodyPr/>
+                    <a:lstStyle/>
+                    <a:p>
+                      <a:pPr algn="l" fontAlgn="b"/>
+                      <a:r>
+                        <a:rPr lang="en-GB" sz="1400" b="0" i="0" u="none" strike="noStrike" dirty="0">
+                          <a:solidFill>
+                            <a:srgbClr val="000000"/>
+                          </a:solidFill>
+                          <a:effectLst/>
+                          <a:latin typeface="Calibri" panose="020F0502020204030204" pitchFamily="34" charset="0"/>
+                        </a:rPr>
+                        <a:t>Lower</a:t>
+                      </a:r>
+                    </a:p>
+                  </a:txBody>
+                  <a:tcPr marL="9525" marR="9525" marT="9525" marB="0" anchor="b"/>
+                </a:tc>
+                <a:tc>
+                  <a:txBody>
+                    <a:bodyPr/>
+                    <a:lstStyle/>
+                    <a:p>
+                      <a:pPr algn="l" fontAlgn="b"/>
+                      <a:r>
+                        <a:rPr lang="en-GB" sz="1400" b="0" i="0" u="none" strike="noStrike" dirty="0">
+                          <a:solidFill>
+                            <a:srgbClr val="000000"/>
+                          </a:solidFill>
+                          <a:effectLst/>
+                          <a:latin typeface="Calibri" panose="020F0502020204030204" pitchFamily="34" charset="0"/>
+                        </a:rPr>
+                        <a:t>MLE</a:t>
+                      </a:r>
+                    </a:p>
+                  </a:txBody>
+                  <a:tcPr marL="9525" marR="9525" marT="9525" marB="0" anchor="b"/>
+                </a:tc>
+                <a:tc>
+                  <a:txBody>
+                    <a:bodyPr/>
+                    <a:lstStyle/>
+                    <a:p>
+                      <a:pPr algn="l" fontAlgn="b"/>
+                      <a:r>
+                        <a:rPr lang="en-GB" sz="1400" b="0" i="0" u="none" strike="noStrike" dirty="0">
+                          <a:solidFill>
+                            <a:srgbClr val="000000"/>
+                          </a:solidFill>
+                          <a:effectLst/>
+                          <a:latin typeface="Calibri" panose="020F0502020204030204" pitchFamily="34" charset="0"/>
+                        </a:rPr>
+                        <a:t>Upper</a:t>
+                      </a:r>
+                    </a:p>
+                  </a:txBody>
+                  <a:tcPr marL="9525" marR="9525" marT="9525" marB="0" anchor="b"/>
+                </a:tc>
+                <a:tc>
+                  <a:txBody>
+                    <a:bodyPr/>
+                    <a:lstStyle/>
+                    <a:p>
+                      <a:pPr algn="l" fontAlgn="b"/>
+                      <a:r>
+                        <a:rPr lang="en-GB" sz="1400" b="0" i="0" u="none" strike="noStrike" dirty="0" smtClean="0">
+                          <a:solidFill>
+                            <a:srgbClr val="000000"/>
+                          </a:solidFill>
+                          <a:effectLst/>
+                          <a:latin typeface="Calibri" panose="020F0502020204030204" pitchFamily="34" charset="0"/>
+                        </a:rPr>
+                        <a:t>Final</a:t>
+                      </a:r>
+                      <a:r>
+                        <a:rPr lang="en-GB" sz="1400" b="0" i="0" u="none" strike="noStrike" baseline="0" dirty="0" smtClean="0">
+                          <a:solidFill>
+                            <a:srgbClr val="000000"/>
+                          </a:solidFill>
+                          <a:effectLst/>
+                          <a:latin typeface="Calibri" panose="020F0502020204030204" pitchFamily="34" charset="0"/>
+                        </a:rPr>
+                        <a:t> </a:t>
+                      </a:r>
+                      <a:r>
+                        <a:rPr lang="en-GB" sz="1400" b="0" i="0" u="none" strike="noStrike" dirty="0" smtClean="0">
+                          <a:solidFill>
+                            <a:srgbClr val="000000"/>
+                          </a:solidFill>
+                          <a:effectLst/>
+                          <a:latin typeface="Calibri" panose="020F0502020204030204" pitchFamily="34" charset="0"/>
+                        </a:rPr>
+                        <a:t>gradient</a:t>
+                      </a:r>
+                      <a:endParaRPr lang="en-GB" sz="1400" b="0" i="0" u="none" strike="noStrike" dirty="0">
+                        <a:solidFill>
+                          <a:srgbClr val="000000"/>
+                        </a:solidFill>
+                        <a:effectLst/>
+                        <a:latin typeface="Calibri" panose="020F0502020204030204" pitchFamily="34" charset="0"/>
+                      </a:endParaRPr>
+                    </a:p>
+                  </a:txBody>
+                  <a:tcPr marL="9525" marR="9525" marT="9525" marB="0" anchor="b"/>
+                </a:tc>
+                <a:tc>
+                  <a:txBody>
+                    <a:bodyPr/>
+                    <a:lstStyle/>
+                    <a:p>
+                      <a:pPr algn="l" fontAlgn="b"/>
+                      <a:r>
+                        <a:rPr lang="en-GB" sz="1400" b="0" i="0" u="none" strike="noStrike" dirty="0">
+                          <a:solidFill>
+                            <a:srgbClr val="000000"/>
+                          </a:solidFill>
+                          <a:effectLst/>
+                          <a:latin typeface="Calibri" panose="020F0502020204030204" pitchFamily="34" charset="0"/>
+                        </a:rPr>
+                        <a:t>Std. Error</a:t>
+                      </a:r>
+                    </a:p>
+                  </a:txBody>
+                  <a:tcPr marL="9525" marR="9525" marT="9525" marB="0" anchor="b"/>
+                </a:tc>
+                <a:extLst>
+                  <a:ext uri="{0D108BD9-81ED-4DB2-BD59-A6C34878D82A}">
+                    <a16:rowId xmlns:a16="http://schemas.microsoft.com/office/drawing/2014/main" val="3473302007"/>
+                  </a:ext>
+                </a:extLst>
+              </a:tr>
+              <a:tr h="370840">
+                <a:tc>
+                  <a:txBody>
+                    <a:bodyPr/>
+                    <a:lstStyle/>
+                    <a:p>
+                      <a:pPr algn="l" fontAlgn="b"/>
+                      <a:r>
+                        <a:rPr lang="en-GB" sz="1400" b="0" i="0" u="none" strike="noStrike" dirty="0">
+                          <a:solidFill>
+                            <a:srgbClr val="000000"/>
+                          </a:solidFill>
+                          <a:effectLst/>
+                          <a:latin typeface="Calibri" panose="020F0502020204030204" pitchFamily="34" charset="0"/>
+                        </a:rPr>
+                        <a:t>log_d0</a:t>
+                      </a:r>
+                    </a:p>
+                  </a:txBody>
+                  <a:tcPr marL="9525" marR="9525" marT="9525" marB="0" anchor="b"/>
+                </a:tc>
+                <a:tc>
+                  <a:txBody>
+                    <a:bodyPr/>
+                    <a:lstStyle/>
+                    <a:p>
+                      <a:pPr algn="ctr" fontAlgn="b"/>
+                      <a:r>
+                        <a:rPr lang="en-GB" sz="1400" b="0" i="0" u="none" strike="noStrike" dirty="0">
+                          <a:solidFill>
+                            <a:srgbClr val="000000"/>
+                          </a:solidFill>
+                          <a:effectLst/>
+                          <a:latin typeface="Calibri" panose="020F0502020204030204" pitchFamily="34" charset="0"/>
+                        </a:rPr>
+                        <a:t>0</a:t>
+                      </a:r>
+                    </a:p>
+                  </a:txBody>
+                  <a:tcPr marL="9525" marR="9525" marT="9525" marB="0" anchor="b"/>
+                </a:tc>
+                <a:tc>
+                  <a:txBody>
+                    <a:bodyPr/>
+                    <a:lstStyle/>
+                    <a:p>
+                      <a:pPr algn="ctr" fontAlgn="b"/>
+                      <a:r>
+                        <a:rPr lang="en-GB" sz="1400" b="0" i="0" u="none" strike="noStrike" dirty="0" smtClean="0">
+                          <a:solidFill>
+                            <a:srgbClr val="000000"/>
+                          </a:solidFill>
+                          <a:effectLst/>
+                          <a:latin typeface="Calibri" panose="020F0502020204030204" pitchFamily="34" charset="0"/>
+                        </a:rPr>
+                        <a:t>-</a:t>
+                      </a:r>
+                      <a:r>
+                        <a:rPr lang="en-GB" sz="1400" b="0" i="0" u="none" strike="noStrike" dirty="0" err="1" smtClean="0">
+                          <a:solidFill>
+                            <a:srgbClr val="000000"/>
+                          </a:solidFill>
+                          <a:effectLst/>
+                          <a:latin typeface="Calibri" panose="020F0502020204030204" pitchFamily="34" charset="0"/>
+                        </a:rPr>
+                        <a:t>Inf</a:t>
+                      </a:r>
+                      <a:endParaRPr lang="en-GB" sz="1400" b="0" i="0" u="none" strike="noStrike" dirty="0">
+                        <a:solidFill>
+                          <a:srgbClr val="000000"/>
+                        </a:solidFill>
+                        <a:effectLst/>
+                        <a:latin typeface="Calibri" panose="020F0502020204030204" pitchFamily="34" charset="0"/>
+                      </a:endParaRPr>
+                    </a:p>
+                  </a:txBody>
+                  <a:tcPr marL="9525" marR="9525" marT="9525" marB="0" anchor="b"/>
+                </a:tc>
+                <a:tc>
+                  <a:txBody>
+                    <a:bodyPr/>
+                    <a:lstStyle/>
+                    <a:p>
+                      <a:pPr algn="ctr" fontAlgn="b"/>
+                      <a:r>
+                        <a:rPr lang="en-GB" sz="1400" b="0" i="0" u="none" strike="noStrike">
+                          <a:solidFill>
+                            <a:srgbClr val="000000"/>
+                          </a:solidFill>
+                          <a:effectLst/>
+                          <a:latin typeface="Calibri" panose="020F0502020204030204" pitchFamily="34" charset="0"/>
+                        </a:rPr>
+                        <a:t>4.126071</a:t>
+                      </a:r>
+                    </a:p>
+                  </a:txBody>
+                  <a:tcPr marL="9525" marR="9525" marT="9525" marB="0" anchor="b"/>
+                </a:tc>
+                <a:tc>
+                  <a:txBody>
+                    <a:bodyPr/>
+                    <a:lstStyle/>
+                    <a:p>
+                      <a:pPr algn="ctr" fontAlgn="b"/>
+                      <a:r>
+                        <a:rPr lang="en-GB" sz="1400" b="0" i="0" u="none" strike="noStrike" dirty="0" err="1">
+                          <a:solidFill>
+                            <a:srgbClr val="000000"/>
+                          </a:solidFill>
+                          <a:effectLst/>
+                          <a:latin typeface="Calibri" panose="020F0502020204030204" pitchFamily="34" charset="0"/>
+                        </a:rPr>
+                        <a:t>Inf</a:t>
+                      </a:r>
+                      <a:endParaRPr lang="en-GB" sz="1400" b="0" i="0" u="none" strike="noStrike" dirty="0">
+                        <a:solidFill>
+                          <a:srgbClr val="000000"/>
+                        </a:solidFill>
+                        <a:effectLst/>
+                        <a:latin typeface="Calibri" panose="020F0502020204030204" pitchFamily="34" charset="0"/>
+                      </a:endParaRPr>
+                    </a:p>
+                  </a:txBody>
+                  <a:tcPr marL="9525" marR="9525" marT="9525" marB="0" anchor="b"/>
+                </a:tc>
+                <a:tc>
+                  <a:txBody>
+                    <a:bodyPr/>
+                    <a:lstStyle/>
+                    <a:p>
+                      <a:pPr algn="ctr" fontAlgn="b"/>
+                      <a:r>
+                        <a:rPr lang="en-GB" sz="1400" b="0" i="0" u="none" strike="noStrike">
+                          <a:solidFill>
+                            <a:srgbClr val="000000"/>
+                          </a:solidFill>
+                          <a:effectLst/>
+                          <a:latin typeface="Calibri" panose="020F0502020204030204" pitchFamily="34" charset="0"/>
+                        </a:rPr>
+                        <a:t>3.75E-07</a:t>
+                      </a:r>
+                    </a:p>
+                  </a:txBody>
+                  <a:tcPr marL="9525" marR="9525" marT="9525" marB="0" anchor="b"/>
+                </a:tc>
+                <a:tc>
+                  <a:txBody>
+                    <a:bodyPr/>
+                    <a:lstStyle/>
+                    <a:p>
+                      <a:pPr algn="ctr" fontAlgn="b"/>
+                      <a:r>
+                        <a:rPr lang="en-GB" sz="1400" b="0" i="0" u="none" strike="noStrike">
+                          <a:solidFill>
+                            <a:srgbClr val="000000"/>
+                          </a:solidFill>
+                          <a:effectLst/>
+                          <a:latin typeface="Calibri" panose="020F0502020204030204" pitchFamily="34" charset="0"/>
+                        </a:rPr>
+                        <a:t>0.260514</a:t>
+                      </a:r>
+                    </a:p>
+                  </a:txBody>
+                  <a:tcPr marL="9525" marR="9525" marT="9525" marB="0" anchor="b"/>
+                </a:tc>
+                <a:extLst>
+                  <a:ext uri="{0D108BD9-81ED-4DB2-BD59-A6C34878D82A}">
+                    <a16:rowId xmlns:a16="http://schemas.microsoft.com/office/drawing/2014/main" val="2897939989"/>
+                  </a:ext>
+                </a:extLst>
+              </a:tr>
+              <a:tr h="370840">
+                <a:tc>
+                  <a:txBody>
+                    <a:bodyPr/>
+                    <a:lstStyle/>
+                    <a:p>
+                      <a:pPr algn="l" fontAlgn="b"/>
+                      <a:r>
+                        <a:rPr lang="en-GB" sz="1400" b="0" i="0" u="none" strike="noStrike">
+                          <a:solidFill>
+                            <a:srgbClr val="000000"/>
+                          </a:solidFill>
+                          <a:effectLst/>
+                          <a:latin typeface="Calibri" panose="020F0502020204030204" pitchFamily="34" charset="0"/>
+                        </a:rPr>
+                        <a:t>log_sigmaP</a:t>
+                      </a:r>
+                    </a:p>
+                  </a:txBody>
+                  <a:tcPr marL="9525" marR="9525" marT="9525" marB="0" anchor="b"/>
+                </a:tc>
+                <a:tc>
+                  <a:txBody>
+                    <a:bodyPr/>
+                    <a:lstStyle/>
+                    <a:p>
+                      <a:pPr algn="ctr" fontAlgn="b"/>
+                      <a:r>
+                        <a:rPr lang="en-GB" sz="1400" b="0" i="0" u="none" strike="noStrike">
+                          <a:solidFill>
+                            <a:srgbClr val="000000"/>
+                          </a:solidFill>
+                          <a:effectLst/>
+                          <a:latin typeface="Calibri" panose="020F0502020204030204" pitchFamily="34" charset="0"/>
+                        </a:rPr>
+                        <a:t>1</a:t>
+                      </a:r>
+                    </a:p>
+                  </a:txBody>
+                  <a:tcPr marL="9525" marR="9525" marT="9525" marB="0" anchor="b"/>
+                </a:tc>
+                <a:tc>
+                  <a:txBody>
+                    <a:bodyPr/>
+                    <a:lstStyle/>
+                    <a:p>
+                      <a:pPr algn="ctr" fontAlgn="b"/>
+                      <a:r>
+                        <a:rPr lang="en-GB" sz="1400" b="0" i="0" u="none" strike="noStrike" dirty="0" smtClean="0">
+                          <a:solidFill>
+                            <a:srgbClr val="000000"/>
+                          </a:solidFill>
+                          <a:effectLst/>
+                          <a:latin typeface="Calibri" panose="020F0502020204030204" pitchFamily="34" charset="0"/>
+                        </a:rPr>
+                        <a:t>-</a:t>
+                      </a:r>
+                      <a:r>
+                        <a:rPr lang="en-GB" sz="1400" b="0" i="0" u="none" strike="noStrike" dirty="0" err="1" smtClean="0">
+                          <a:solidFill>
+                            <a:srgbClr val="000000"/>
+                          </a:solidFill>
+                          <a:effectLst/>
+                          <a:latin typeface="Calibri" panose="020F0502020204030204" pitchFamily="34" charset="0"/>
+                        </a:rPr>
+                        <a:t>Inf</a:t>
+                      </a:r>
+                      <a:endParaRPr lang="en-GB" sz="1400" b="0" i="0" u="none" strike="noStrike" dirty="0">
+                        <a:solidFill>
+                          <a:srgbClr val="000000"/>
+                        </a:solidFill>
+                        <a:effectLst/>
+                        <a:latin typeface="Calibri" panose="020F0502020204030204" pitchFamily="34" charset="0"/>
+                      </a:endParaRPr>
+                    </a:p>
+                  </a:txBody>
+                  <a:tcPr marL="9525" marR="9525" marT="9525" marB="0" anchor="b"/>
+                </a:tc>
+                <a:tc>
+                  <a:txBody>
+                    <a:bodyPr/>
+                    <a:lstStyle/>
+                    <a:p>
+                      <a:pPr algn="ctr" fontAlgn="b"/>
+                      <a:r>
+                        <a:rPr lang="en-GB" sz="1400" b="0" i="0" u="none" strike="noStrike">
+                          <a:solidFill>
+                            <a:srgbClr val="000000"/>
+                          </a:solidFill>
+                          <a:effectLst/>
+                          <a:latin typeface="Calibri" panose="020F0502020204030204" pitchFamily="34" charset="0"/>
+                        </a:rPr>
+                        <a:t>-1.3451</a:t>
+                      </a:r>
+                    </a:p>
+                  </a:txBody>
+                  <a:tcPr marL="9525" marR="9525" marT="9525" marB="0" anchor="b"/>
+                </a:tc>
+                <a:tc>
+                  <a:txBody>
+                    <a:bodyPr/>
+                    <a:lstStyle/>
+                    <a:p>
+                      <a:pPr algn="ctr" fontAlgn="b"/>
+                      <a:r>
+                        <a:rPr lang="en-GB" sz="1400" b="0" i="0" u="none" strike="noStrike">
+                          <a:solidFill>
+                            <a:srgbClr val="000000"/>
+                          </a:solidFill>
+                          <a:effectLst/>
+                          <a:latin typeface="Calibri" panose="020F0502020204030204" pitchFamily="34" charset="0"/>
+                        </a:rPr>
+                        <a:t>Inf</a:t>
+                      </a:r>
+                    </a:p>
+                  </a:txBody>
+                  <a:tcPr marL="9525" marR="9525" marT="9525" marB="0" anchor="b"/>
+                </a:tc>
+                <a:tc>
+                  <a:txBody>
+                    <a:bodyPr/>
+                    <a:lstStyle/>
+                    <a:p>
+                      <a:pPr algn="ctr" fontAlgn="b"/>
+                      <a:r>
+                        <a:rPr lang="en-GB" sz="1400" b="0" i="0" u="none" strike="noStrike">
+                          <a:solidFill>
+                            <a:srgbClr val="000000"/>
+                          </a:solidFill>
+                          <a:effectLst/>
+                          <a:latin typeface="Calibri" panose="020F0502020204030204" pitchFamily="34" charset="0"/>
+                        </a:rPr>
+                        <a:t>3.34E-06</a:t>
+                      </a:r>
+                    </a:p>
+                  </a:txBody>
+                  <a:tcPr marL="9525" marR="9525" marT="9525" marB="0" anchor="b"/>
+                </a:tc>
+                <a:tc>
+                  <a:txBody>
+                    <a:bodyPr/>
+                    <a:lstStyle/>
+                    <a:p>
+                      <a:pPr algn="ctr" fontAlgn="b"/>
+                      <a:r>
+                        <a:rPr lang="en-GB" sz="1400" b="0" i="0" u="none" strike="noStrike">
+                          <a:solidFill>
+                            <a:srgbClr val="000000"/>
+                          </a:solidFill>
+                          <a:effectLst/>
+                          <a:latin typeface="Calibri" panose="020F0502020204030204" pitchFamily="34" charset="0"/>
+                        </a:rPr>
+                        <a:t>0.117851</a:t>
+                      </a:r>
+                    </a:p>
+                  </a:txBody>
+                  <a:tcPr marL="9525" marR="9525" marT="9525" marB="0" anchor="b"/>
+                </a:tc>
+                <a:extLst>
+                  <a:ext uri="{0D108BD9-81ED-4DB2-BD59-A6C34878D82A}">
+                    <a16:rowId xmlns:a16="http://schemas.microsoft.com/office/drawing/2014/main" val="3610748696"/>
+                  </a:ext>
+                </a:extLst>
+              </a:tr>
+              <a:tr h="370840">
+                <a:tc>
+                  <a:txBody>
+                    <a:bodyPr/>
+                    <a:lstStyle/>
+                    <a:p>
+                      <a:pPr algn="l" fontAlgn="b"/>
+                      <a:r>
+                        <a:rPr lang="en-GB" sz="1400" b="0" i="0" u="none" strike="noStrike">
+                          <a:solidFill>
+                            <a:srgbClr val="000000"/>
+                          </a:solidFill>
+                          <a:effectLst/>
+                          <a:latin typeface="Calibri" panose="020F0502020204030204" pitchFamily="34" charset="0"/>
+                        </a:rPr>
+                        <a:t>log_sigmaM</a:t>
+                      </a:r>
+                    </a:p>
+                  </a:txBody>
+                  <a:tcPr marL="9525" marR="9525" marT="9525" marB="0" anchor="b"/>
+                </a:tc>
+                <a:tc>
+                  <a:txBody>
+                    <a:bodyPr/>
+                    <a:lstStyle/>
+                    <a:p>
+                      <a:pPr algn="ctr" fontAlgn="b"/>
+                      <a:r>
+                        <a:rPr lang="en-GB" sz="1400" b="0" i="0" u="none" strike="noStrike">
+                          <a:solidFill>
+                            <a:srgbClr val="000000"/>
+                          </a:solidFill>
+                          <a:effectLst/>
+                          <a:latin typeface="Calibri" panose="020F0502020204030204" pitchFamily="34" charset="0"/>
+                        </a:rPr>
+                        <a:t>1</a:t>
+                      </a:r>
+                    </a:p>
+                  </a:txBody>
+                  <a:tcPr marL="9525" marR="9525" marT="9525" marB="0" anchor="b"/>
+                </a:tc>
+                <a:tc>
+                  <a:txBody>
+                    <a:bodyPr/>
+                    <a:lstStyle/>
+                    <a:p>
+                      <a:pPr algn="ctr" fontAlgn="b"/>
+                      <a:r>
+                        <a:rPr lang="en-GB" sz="1400" b="0" i="0" u="none" strike="noStrike" dirty="0" smtClean="0">
+                          <a:solidFill>
+                            <a:srgbClr val="000000"/>
+                          </a:solidFill>
+                          <a:effectLst/>
+                          <a:latin typeface="Calibri" panose="020F0502020204030204" pitchFamily="34" charset="0"/>
+                        </a:rPr>
+                        <a:t>-</a:t>
+                      </a:r>
+                      <a:r>
+                        <a:rPr lang="en-GB" sz="1400" b="0" i="0" u="none" strike="noStrike" dirty="0" err="1" smtClean="0">
+                          <a:solidFill>
+                            <a:srgbClr val="000000"/>
+                          </a:solidFill>
+                          <a:effectLst/>
+                          <a:latin typeface="Calibri" panose="020F0502020204030204" pitchFamily="34" charset="0"/>
+                        </a:rPr>
+                        <a:t>Inf</a:t>
+                      </a:r>
+                      <a:endParaRPr lang="en-GB" sz="1400" b="0" i="0" u="none" strike="noStrike" dirty="0">
+                        <a:solidFill>
+                          <a:srgbClr val="000000"/>
+                        </a:solidFill>
+                        <a:effectLst/>
+                        <a:latin typeface="Calibri" panose="020F0502020204030204" pitchFamily="34" charset="0"/>
+                      </a:endParaRPr>
+                    </a:p>
+                  </a:txBody>
+                  <a:tcPr marL="9525" marR="9525" marT="9525" marB="0" anchor="b"/>
+                </a:tc>
+                <a:tc>
+                  <a:txBody>
+                    <a:bodyPr/>
+                    <a:lstStyle/>
+                    <a:p>
+                      <a:pPr algn="ctr" fontAlgn="b"/>
+                      <a:r>
+                        <a:rPr lang="en-GB" sz="1400" b="0" i="0" u="none" strike="noStrike" dirty="0">
+                          <a:solidFill>
+                            <a:srgbClr val="000000"/>
+                          </a:solidFill>
+                          <a:effectLst/>
+                          <a:latin typeface="Calibri" panose="020F0502020204030204" pitchFamily="34" charset="0"/>
+                        </a:rPr>
+                        <a:t>-11.029</a:t>
+                      </a:r>
+                    </a:p>
+                  </a:txBody>
+                  <a:tcPr marL="9525" marR="9525" marT="9525" marB="0" anchor="b"/>
+                </a:tc>
+                <a:tc>
+                  <a:txBody>
+                    <a:bodyPr/>
+                    <a:lstStyle/>
+                    <a:p>
+                      <a:pPr algn="ctr" fontAlgn="b"/>
+                      <a:r>
+                        <a:rPr lang="en-GB" sz="1400" b="0" i="0" u="none" strike="noStrike" dirty="0" err="1">
+                          <a:solidFill>
+                            <a:srgbClr val="000000"/>
+                          </a:solidFill>
+                          <a:effectLst/>
+                          <a:latin typeface="Calibri" panose="020F0502020204030204" pitchFamily="34" charset="0"/>
+                        </a:rPr>
+                        <a:t>Inf</a:t>
+                      </a:r>
+                      <a:endParaRPr lang="en-GB" sz="1400" b="0" i="0" u="none" strike="noStrike" dirty="0">
+                        <a:solidFill>
+                          <a:srgbClr val="000000"/>
+                        </a:solidFill>
+                        <a:effectLst/>
+                        <a:latin typeface="Calibri" panose="020F0502020204030204" pitchFamily="34" charset="0"/>
+                      </a:endParaRPr>
+                    </a:p>
+                  </a:txBody>
+                  <a:tcPr marL="9525" marR="9525" marT="9525" marB="0" anchor="b"/>
+                </a:tc>
+                <a:tc>
+                  <a:txBody>
+                    <a:bodyPr/>
+                    <a:lstStyle/>
+                    <a:p>
+                      <a:pPr algn="ctr" fontAlgn="b"/>
+                      <a:r>
+                        <a:rPr lang="en-GB" sz="1400" b="0" i="0" u="none" strike="noStrike">
+                          <a:solidFill>
+                            <a:srgbClr val="000000"/>
+                          </a:solidFill>
+                          <a:effectLst/>
+                          <a:latin typeface="Calibri" panose="020F0502020204030204" pitchFamily="34" charset="0"/>
+                        </a:rPr>
+                        <a:t>7.42E-10</a:t>
+                      </a:r>
+                    </a:p>
+                  </a:txBody>
+                  <a:tcPr marL="9525" marR="9525" marT="9525" marB="0" anchor="b"/>
+                </a:tc>
+                <a:tc>
+                  <a:txBody>
+                    <a:bodyPr/>
+                    <a:lstStyle/>
+                    <a:p>
+                      <a:pPr algn="ctr" fontAlgn="b"/>
+                      <a:r>
+                        <a:rPr lang="en-GB" sz="1400" b="0" i="0" u="none" strike="noStrike">
+                          <a:solidFill>
+                            <a:srgbClr val="000000"/>
+                          </a:solidFill>
+                          <a:effectLst/>
+                          <a:latin typeface="Calibri" panose="020F0502020204030204" pitchFamily="34" charset="0"/>
+                        </a:rPr>
+                        <a:t>26029.84</a:t>
+                      </a:r>
+                    </a:p>
+                  </a:txBody>
+                  <a:tcPr marL="9525" marR="9525" marT="9525" marB="0" anchor="b"/>
+                </a:tc>
+                <a:extLst>
+                  <a:ext uri="{0D108BD9-81ED-4DB2-BD59-A6C34878D82A}">
+                    <a16:rowId xmlns:a16="http://schemas.microsoft.com/office/drawing/2014/main" val="2765119468"/>
+                  </a:ext>
+                </a:extLst>
+              </a:tr>
+              <a:tr h="370840">
+                <a:tc>
+                  <a:txBody>
+                    <a:bodyPr/>
+                    <a:lstStyle/>
+                    <a:p>
+                      <a:pPr algn="l" fontAlgn="b"/>
+                      <a:r>
+                        <a:rPr lang="en-GB" sz="1400" b="0" i="0" u="none" strike="noStrike">
+                          <a:solidFill>
+                            <a:srgbClr val="000000"/>
+                          </a:solidFill>
+                          <a:effectLst/>
+                          <a:latin typeface="Calibri" panose="020F0502020204030204" pitchFamily="34" charset="0"/>
+                        </a:rPr>
+                        <a:t>alpha</a:t>
+                      </a:r>
+                    </a:p>
+                  </a:txBody>
+                  <a:tcPr marL="9525" marR="9525" marT="9525" marB="0" anchor="b"/>
+                </a:tc>
+                <a:tc>
+                  <a:txBody>
+                    <a:bodyPr/>
+                    <a:lstStyle/>
+                    <a:p>
+                      <a:pPr algn="ctr" fontAlgn="b"/>
+                      <a:r>
+                        <a:rPr lang="en-GB" sz="1400" b="0" i="0" u="none" strike="noStrike">
+                          <a:solidFill>
+                            <a:srgbClr val="000000"/>
+                          </a:solidFill>
+                          <a:effectLst/>
+                          <a:latin typeface="Calibri" panose="020F0502020204030204" pitchFamily="34" charset="0"/>
+                        </a:rPr>
+                        <a:t>0</a:t>
+                      </a:r>
+                    </a:p>
+                  </a:txBody>
+                  <a:tcPr marL="9525" marR="9525" marT="9525" marB="0" anchor="b"/>
+                </a:tc>
+                <a:tc>
+                  <a:txBody>
+                    <a:bodyPr/>
+                    <a:lstStyle/>
+                    <a:p>
+                      <a:pPr algn="ctr" fontAlgn="b"/>
+                      <a:r>
+                        <a:rPr lang="en-GB" sz="1400" b="0" i="0" u="none" strike="noStrike" dirty="0" smtClean="0">
+                          <a:solidFill>
+                            <a:srgbClr val="000000"/>
+                          </a:solidFill>
+                          <a:effectLst/>
+                          <a:latin typeface="Calibri" panose="020F0502020204030204" pitchFamily="34" charset="0"/>
+                        </a:rPr>
+                        <a:t>-</a:t>
+                      </a:r>
+                      <a:r>
+                        <a:rPr lang="en-GB" sz="1400" b="0" i="0" u="none" strike="noStrike" dirty="0" err="1" smtClean="0">
+                          <a:solidFill>
+                            <a:srgbClr val="000000"/>
+                          </a:solidFill>
+                          <a:effectLst/>
+                          <a:latin typeface="Calibri" panose="020F0502020204030204" pitchFamily="34" charset="0"/>
+                        </a:rPr>
+                        <a:t>Inf</a:t>
+                      </a:r>
+                      <a:endParaRPr lang="en-GB" sz="1400" b="0" i="0" u="none" strike="noStrike" dirty="0">
+                        <a:solidFill>
+                          <a:srgbClr val="000000"/>
+                        </a:solidFill>
+                        <a:effectLst/>
+                        <a:latin typeface="Calibri" panose="020F0502020204030204" pitchFamily="34" charset="0"/>
+                      </a:endParaRPr>
+                    </a:p>
+                  </a:txBody>
+                  <a:tcPr marL="9525" marR="9525" marT="9525" marB="0" anchor="b"/>
+                </a:tc>
+                <a:tc>
+                  <a:txBody>
+                    <a:bodyPr/>
+                    <a:lstStyle/>
+                    <a:p>
+                      <a:pPr algn="ctr" fontAlgn="b"/>
+                      <a:r>
+                        <a:rPr lang="en-GB" sz="1400" b="0" i="0" u="none" strike="noStrike">
+                          <a:solidFill>
+                            <a:srgbClr val="000000"/>
+                          </a:solidFill>
+                          <a:effectLst/>
+                          <a:latin typeface="Calibri" panose="020F0502020204030204" pitchFamily="34" charset="0"/>
+                        </a:rPr>
+                        <a:t>2.651077</a:t>
+                      </a:r>
+                    </a:p>
+                  </a:txBody>
+                  <a:tcPr marL="9525" marR="9525" marT="9525" marB="0" anchor="b"/>
+                </a:tc>
+                <a:tc>
+                  <a:txBody>
+                    <a:bodyPr/>
+                    <a:lstStyle/>
+                    <a:p>
+                      <a:pPr algn="ctr" fontAlgn="b"/>
+                      <a:r>
+                        <a:rPr lang="en-GB" sz="1400" b="0" i="0" u="none" strike="noStrike">
+                          <a:solidFill>
+                            <a:srgbClr val="000000"/>
+                          </a:solidFill>
+                          <a:effectLst/>
+                          <a:latin typeface="Calibri" panose="020F0502020204030204" pitchFamily="34" charset="0"/>
+                        </a:rPr>
+                        <a:t>Inf</a:t>
+                      </a:r>
+                    </a:p>
+                  </a:txBody>
+                  <a:tcPr marL="9525" marR="9525" marT="9525" marB="0" anchor="b"/>
+                </a:tc>
+                <a:tc>
+                  <a:txBody>
+                    <a:bodyPr/>
+                    <a:lstStyle/>
+                    <a:p>
+                      <a:pPr algn="ctr" fontAlgn="b"/>
+                      <a:r>
+                        <a:rPr lang="en-GB" sz="1400" b="0" i="0" u="none" strike="noStrike" dirty="0">
+                          <a:solidFill>
+                            <a:srgbClr val="000000"/>
+                          </a:solidFill>
+                          <a:effectLst/>
+                          <a:latin typeface="Calibri" panose="020F0502020204030204" pitchFamily="34" charset="0"/>
+                        </a:rPr>
+                        <a:t>-1.42E-06</a:t>
+                      </a:r>
+                    </a:p>
+                  </a:txBody>
+                  <a:tcPr marL="9525" marR="9525" marT="9525" marB="0" anchor="b"/>
+                </a:tc>
+                <a:tc>
+                  <a:txBody>
+                    <a:bodyPr/>
+                    <a:lstStyle/>
+                    <a:p>
+                      <a:pPr algn="ctr" fontAlgn="b"/>
+                      <a:r>
+                        <a:rPr lang="en-GB" sz="1400" b="0" i="0" u="none" strike="noStrike" dirty="0">
+                          <a:solidFill>
+                            <a:srgbClr val="000000"/>
+                          </a:solidFill>
+                          <a:effectLst/>
+                          <a:latin typeface="Calibri" panose="020F0502020204030204" pitchFamily="34" charset="0"/>
+                        </a:rPr>
+                        <a:t>0.665236</a:t>
+                      </a:r>
+                    </a:p>
+                  </a:txBody>
+                  <a:tcPr marL="9525" marR="9525" marT="9525" marB="0" anchor="b"/>
+                </a:tc>
+                <a:extLst>
+                  <a:ext uri="{0D108BD9-81ED-4DB2-BD59-A6C34878D82A}">
+                    <a16:rowId xmlns:a16="http://schemas.microsoft.com/office/drawing/2014/main" val="3147623146"/>
+                  </a:ext>
+                </a:extLst>
+              </a:tr>
+              <a:tr h="370840">
+                <a:tc>
+                  <a:txBody>
+                    <a:bodyPr/>
+                    <a:lstStyle/>
+                    <a:p>
+                      <a:pPr algn="l" fontAlgn="b"/>
+                      <a:r>
+                        <a:rPr lang="en-GB" sz="1400" b="0" i="0" u="none" strike="noStrike">
+                          <a:solidFill>
+                            <a:srgbClr val="000000"/>
+                          </a:solidFill>
+                          <a:effectLst/>
+                          <a:latin typeface="Calibri" panose="020F0502020204030204" pitchFamily="34" charset="0"/>
+                        </a:rPr>
+                        <a:t>rho</a:t>
+                      </a:r>
+                    </a:p>
+                  </a:txBody>
+                  <a:tcPr marL="9525" marR="9525" marT="9525" marB="0" anchor="b"/>
+                </a:tc>
+                <a:tc>
+                  <a:txBody>
+                    <a:bodyPr/>
+                    <a:lstStyle/>
+                    <a:p>
+                      <a:pPr algn="ctr" fontAlgn="b"/>
+                      <a:r>
+                        <a:rPr lang="en-GB" sz="1400" b="0" i="0" u="none" strike="noStrike">
+                          <a:solidFill>
+                            <a:srgbClr val="000000"/>
+                          </a:solidFill>
+                          <a:effectLst/>
+                          <a:latin typeface="Calibri" panose="020F0502020204030204" pitchFamily="34" charset="0"/>
+                        </a:rPr>
+                        <a:t>0</a:t>
+                      </a:r>
+                    </a:p>
+                  </a:txBody>
+                  <a:tcPr marL="9525" marR="9525" marT="9525" marB="0" anchor="b"/>
+                </a:tc>
+                <a:tc>
+                  <a:txBody>
+                    <a:bodyPr/>
+                    <a:lstStyle/>
+                    <a:p>
+                      <a:pPr algn="ctr" fontAlgn="b"/>
+                      <a:r>
+                        <a:rPr lang="en-GB" sz="1400" b="0" i="0" u="none" strike="noStrike" dirty="0" smtClean="0">
+                          <a:solidFill>
+                            <a:srgbClr val="000000"/>
+                          </a:solidFill>
+                          <a:effectLst/>
+                          <a:latin typeface="Calibri" panose="020F0502020204030204" pitchFamily="34" charset="0"/>
+                        </a:rPr>
+                        <a:t>-</a:t>
+                      </a:r>
+                      <a:r>
+                        <a:rPr lang="en-GB" sz="1400" b="0" i="0" u="none" strike="noStrike" dirty="0" err="1" smtClean="0">
+                          <a:solidFill>
+                            <a:srgbClr val="000000"/>
+                          </a:solidFill>
+                          <a:effectLst/>
+                          <a:latin typeface="Calibri" panose="020F0502020204030204" pitchFamily="34" charset="0"/>
+                        </a:rPr>
+                        <a:t>Inf</a:t>
+                      </a:r>
+                      <a:endParaRPr lang="en-GB" sz="1400" b="0" i="0" u="none" strike="noStrike" dirty="0">
+                        <a:solidFill>
+                          <a:srgbClr val="000000"/>
+                        </a:solidFill>
+                        <a:effectLst/>
+                        <a:latin typeface="Calibri" panose="020F0502020204030204" pitchFamily="34" charset="0"/>
+                      </a:endParaRPr>
+                    </a:p>
+                  </a:txBody>
+                  <a:tcPr marL="9525" marR="9525" marT="9525" marB="0" anchor="b"/>
+                </a:tc>
+                <a:tc>
+                  <a:txBody>
+                    <a:bodyPr/>
+                    <a:lstStyle/>
+                    <a:p>
+                      <a:pPr algn="ctr" fontAlgn="b"/>
+                      <a:r>
+                        <a:rPr lang="en-GB" sz="1400" b="0" i="0" u="none" strike="noStrike">
+                          <a:solidFill>
+                            <a:srgbClr val="000000"/>
+                          </a:solidFill>
+                          <a:effectLst/>
+                          <a:latin typeface="Calibri" panose="020F0502020204030204" pitchFamily="34" charset="0"/>
+                        </a:rPr>
+                        <a:t>0.419967</a:t>
+                      </a:r>
+                    </a:p>
+                  </a:txBody>
+                  <a:tcPr marL="9525" marR="9525" marT="9525" marB="0" anchor="b"/>
+                </a:tc>
+                <a:tc>
+                  <a:txBody>
+                    <a:bodyPr/>
+                    <a:lstStyle/>
+                    <a:p>
+                      <a:pPr algn="ctr" fontAlgn="b"/>
+                      <a:r>
+                        <a:rPr lang="en-GB" sz="1400" b="0" i="0" u="none" strike="noStrike">
+                          <a:solidFill>
+                            <a:srgbClr val="000000"/>
+                          </a:solidFill>
+                          <a:effectLst/>
+                          <a:latin typeface="Calibri" panose="020F0502020204030204" pitchFamily="34" charset="0"/>
+                        </a:rPr>
+                        <a:t>Inf</a:t>
+                      </a:r>
+                    </a:p>
+                  </a:txBody>
+                  <a:tcPr marL="9525" marR="9525" marT="9525" marB="0" anchor="b"/>
+                </a:tc>
+                <a:tc>
+                  <a:txBody>
+                    <a:bodyPr/>
+                    <a:lstStyle/>
+                    <a:p>
+                      <a:pPr algn="ctr" fontAlgn="b"/>
+                      <a:r>
+                        <a:rPr lang="en-GB" sz="1400" b="0" i="0" u="none" strike="noStrike" dirty="0">
+                          <a:solidFill>
+                            <a:srgbClr val="000000"/>
+                          </a:solidFill>
+                          <a:effectLst/>
+                          <a:latin typeface="Calibri" panose="020F0502020204030204" pitchFamily="34" charset="0"/>
+                        </a:rPr>
+                        <a:t>-2.64E-06</a:t>
+                      </a:r>
+                    </a:p>
+                  </a:txBody>
+                  <a:tcPr marL="9525" marR="9525" marT="9525" marB="0" anchor="b"/>
+                </a:tc>
+                <a:tc>
+                  <a:txBody>
+                    <a:bodyPr/>
+                    <a:lstStyle/>
+                    <a:p>
+                      <a:pPr algn="ctr" fontAlgn="b"/>
+                      <a:r>
+                        <a:rPr lang="en-GB" sz="1400" b="0" i="0" u="none" strike="noStrike" dirty="0">
+                          <a:solidFill>
+                            <a:srgbClr val="000000"/>
+                          </a:solidFill>
+                          <a:effectLst/>
+                          <a:latin typeface="Calibri" panose="020F0502020204030204" pitchFamily="34" charset="0"/>
+                        </a:rPr>
+                        <a:t>0.145993</a:t>
+                      </a:r>
+                    </a:p>
+                  </a:txBody>
+                  <a:tcPr marL="9525" marR="9525" marT="9525" marB="0" anchor="b"/>
+                </a:tc>
+                <a:extLst>
+                  <a:ext uri="{0D108BD9-81ED-4DB2-BD59-A6C34878D82A}">
+                    <a16:rowId xmlns:a16="http://schemas.microsoft.com/office/drawing/2014/main" val="1929771086"/>
+                  </a:ext>
+                </a:extLst>
+              </a:tr>
+            </a:tbl>
+          </a:graphicData>
+        </a:graphic>
+      </p:graphicFrame>
+    </p:spTree>
+    <p:extLst>
+      <p:ext uri="{BB962C8B-B14F-4D97-AF65-F5344CB8AC3E}">
+        <p14:creationId xmlns:p14="http://schemas.microsoft.com/office/powerpoint/2010/main" val="3966753172"/>
+      </p:ext>
+    </p:extLst>
+  </p:cSld>
+  <p:clrMapOvr>
+    <a:masterClrMapping/>
+  </p:clrMapOvr>
+  <p:timing>
+    <p:tnLst>
+      <p:par>
+        <p:cTn id="1" dur="indefinite" restart="never" nodeType="tmRoot">
+          <p:childTnLst>
+            <p:seq concurrent="1" nextAc="seek">
+              <p:cTn id="2" dur="indefinite" nodeType="mainSeq">
+                <p:childTnLst>
+                  <p:par>
+                    <p:cTn id="3" fill="hold">
+                      <p:stCondLst>
+                        <p:cond delay="indefinite"/>
+                      </p:stCondLst>
+                      <p:childTnLst>
+                        <p:par>
+                          <p:cTn id="4" fill="hold">
+                            <p:stCondLst>
+                              <p:cond delay="0"/>
+                            </p:stCondLst>
+                            <p:childTnLst>
+                              <p:par>
+                                <p:cTn id="5" presetID="1" presetClass="entr" presetSubtype="0" fill="hold" nodeType="clickEffect">
+                                  <p:stCondLst>
+                                    <p:cond delay="0"/>
+                                  </p:stCondLst>
+                                  <p:childTnLst>
+                                    <p:set>
+                                      <p:cBhvr>
+                                        <p:cTn id="6" dur="1" fill="hold">
+                                          <p:stCondLst>
+                                            <p:cond delay="0"/>
+                                          </p:stCondLst>
+                                        </p:cTn>
+                                        <p:tgtEl>
+                                          <p:spTgt spid="3">
+                                            <p:txEl>
+                                              <p:pRg st="4" end="4"/>
+                                            </p:txEl>
+                                          </p:spTgt>
+                                        </p:tgtEl>
+                                        <p:attrNameLst>
+                                          <p:attrName>style.visibility</p:attrName>
+                                        </p:attrNameLst>
+                                      </p:cBhvr>
+                                      <p:to>
+                                        <p:strVal val="visible"/>
+                                      </p:to>
+                                    </p:set>
+                                  </p:childTnLst>
+                                </p:cTn>
+                              </p:par>
+                            </p:childTnLst>
+                          </p:cTn>
+                        </p:par>
+                      </p:childTnLst>
+                    </p:cTn>
+                  </p:par>
+                </p:childTnLst>
+              </p:cTn>
+              <p:prevCondLst>
+                <p:cond evt="onPrev" delay="0">
+                  <p:tgtEl>
+                    <p:sldTgt/>
+                  </p:tgtEl>
+                </p:cond>
+              </p:prevCondLst>
+              <p:nextCondLst>
+                <p:cond evt="onNext" delay="0">
+                  <p:tgtEl>
+                    <p:sldTgt/>
+                  </p:tgtEl>
+                </p:cond>
+              </p:nextCondLst>
+            </p:seq>
+          </p:childTnLst>
+        </p:cTn>
+      </p:par>
+    </p:tnLst>
+  </p:timing>
+</p:sld>
+</file>
+
+<file path=ppt/slides/slide15.xml><?xml version="1.0" encoding="utf-8"?>
+<p:sld xmlns:a="http://schemas.openxmlformats.org/drawingml/2006/main" xmlns:r="http://schemas.openxmlformats.org/officeDocument/2006/relationships" xmlns:p="http://schemas.openxmlformats.org/presentationml/2006/main">
+  <p:cSld>
+    <p:spTree>
+      <p:nvGrpSpPr>
+        <p:cNvPr id="1" name=""/>
+        <p:cNvGrpSpPr/>
+        <p:nvPr/>
+      </p:nvGrpSpPr>
+      <p:grpSpPr>
+        <a:xfrm>
+          <a:off x="0" y="0"/>
+          <a:ext cx="0" cy="0"/>
+          <a:chOff x="0" y="0"/>
+          <a:chExt cx="0" cy="0"/>
+        </a:xfrm>
+      </p:grpSpPr>
+      <p:sp>
+        <p:nvSpPr>
+          <p:cNvPr id="2" name="Title 1"/>
+          <p:cNvSpPr>
+            <a:spLocks noGrp="1"/>
+          </p:cNvSpPr>
+          <p:nvPr>
+            <p:ph type="title"/>
+          </p:nvPr>
+        </p:nvSpPr>
+        <p:spPr/>
+        <p:txBody>
+          <a:bodyPr/>
+          <a:lstStyle/>
+          <a:p>
+            <a:endParaRPr lang="en-GB"/>
+          </a:p>
+        </p:txBody>
+      </p:sp>
+      <mc:AlternateContent xmlns:mc="http://schemas.openxmlformats.org/markup-compatibility/2006">
+        <mc:Choice xmlns:a14="http://schemas.microsoft.com/office/drawing/2010/main" Requires="a14">
+          <p:sp>
+            <p:nvSpPr>
+              <p:cNvPr id="3" name="Content Placeholder 2"/>
+              <p:cNvSpPr>
+                <a:spLocks noGrp="1"/>
+              </p:cNvSpPr>
+              <p:nvPr>
+                <p:ph idx="1"/>
+              </p:nvPr>
+            </p:nvSpPr>
+            <p:spPr/>
+            <p:txBody>
+              <a:bodyPr>
+                <a:normAutofit fontScale="92500"/>
+              </a:bodyPr>
+              <a:lstStyle/>
+              <a:p>
+                <a:pPr marL="0" indent="0">
+                  <a:buNone/>
+                </a:pPr>
+                <a:r>
+                  <a:rPr lang="en-US" b="1" dirty="0" smtClean="0"/>
+                  <a:t>Add sampling variance</a:t>
+                </a:r>
+              </a:p>
+              <a:p>
+                <a:pPr marL="0" indent="0">
+                  <a:buNone/>
+                </a:pPr>
+                <a:endParaRPr lang="en-US" dirty="0"/>
+              </a:p>
+              <a:p>
+                <a:pPr marL="0" indent="0">
+                  <a:buNone/>
+                </a:pPr>
+                <a:r>
+                  <a:rPr lang="en-US" dirty="0" smtClean="0"/>
+                  <a:t>Suppose you have many measurements </a:t>
+                </a:r>
+                <a14:m>
+                  <m:oMath xmlns:m="http://schemas.openxmlformats.org/officeDocument/2006/math">
+                    <m:sSub>
+                      <m:sSubPr>
+                        <m:ctrlPr>
+                          <a:rPr lang="en-US" b="0" i="1" smtClean="0">
+                            <a:latin typeface="Cambria Math" panose="02040503050406030204" pitchFamily="18" charset="0"/>
+                          </a:rPr>
+                        </m:ctrlPr>
+                      </m:sSubPr>
+                      <m:e>
+                        <m:r>
+                          <a:rPr lang="en-US" b="0" i="1" smtClean="0">
+                            <a:latin typeface="Cambria Math" panose="02040503050406030204" pitchFamily="18" charset="0"/>
+                          </a:rPr>
+                          <m:t>𝑥</m:t>
+                        </m:r>
+                      </m:e>
+                      <m:sub>
+                        <m:r>
+                          <a:rPr lang="en-US" b="0" i="1" smtClean="0">
+                            <a:latin typeface="Cambria Math" panose="02040503050406030204" pitchFamily="18" charset="0"/>
+                          </a:rPr>
+                          <m:t>𝑖</m:t>
+                        </m:r>
+                      </m:sub>
+                    </m:sSub>
+                  </m:oMath>
+                </a14:m>
+                <a:r>
+                  <a:rPr lang="en-US" dirty="0" smtClean="0"/>
+                  <a:t>, what is the mean and standard error?</a:t>
+                </a:r>
+              </a:p>
+              <a:p>
+                <a:pPr marL="0" indent="0">
+                  <a:buNone/>
+                </a:pPr>
+                <a14:m>
+                  <m:oMathPara xmlns:m="http://schemas.openxmlformats.org/officeDocument/2006/math">
+                    <m:oMathParaPr>
+                      <m:jc m:val="centerGroup"/>
+                    </m:oMathParaPr>
+                    <m:oMath xmlns:m="http://schemas.openxmlformats.org/officeDocument/2006/math">
+                      <m:acc>
+                        <m:accPr>
+                          <m:chr m:val="̂"/>
+                          <m:ctrlPr>
+                            <a:rPr lang="en-US" i="1" smtClean="0">
+                              <a:latin typeface="Cambria Math" panose="02040503050406030204" pitchFamily="18" charset="0"/>
+                              <a:ea typeface="Cambria Math" panose="02040503050406030204" pitchFamily="18" charset="0"/>
+                            </a:rPr>
+                          </m:ctrlPr>
+                        </m:accPr>
+                        <m:e>
+                          <m:r>
+                            <a:rPr lang="en-US" i="1">
+                              <a:latin typeface="Cambria Math" panose="02040503050406030204" pitchFamily="18" charset="0"/>
+                              <a:ea typeface="Cambria Math" panose="02040503050406030204" pitchFamily="18" charset="0"/>
+                            </a:rPr>
+                            <m:t>𝜇</m:t>
+                          </m:r>
+                        </m:e>
+                      </m:acc>
+                      <m:r>
+                        <a:rPr lang="en-US" b="0" i="1" smtClean="0">
+                          <a:latin typeface="Cambria Math" panose="02040503050406030204" pitchFamily="18" charset="0"/>
+                          <a:ea typeface="Cambria Math" panose="02040503050406030204" pitchFamily="18" charset="0"/>
+                        </a:rPr>
+                        <m:t>=</m:t>
+                      </m:r>
+                      <m:f>
+                        <m:fPr>
+                          <m:ctrlPr>
+                            <a:rPr lang="en-US" b="0" i="1" smtClean="0">
+                              <a:latin typeface="Cambria Math" panose="02040503050406030204" pitchFamily="18" charset="0"/>
+                              <a:ea typeface="Cambria Math" panose="02040503050406030204" pitchFamily="18" charset="0"/>
+                            </a:rPr>
+                          </m:ctrlPr>
+                        </m:fPr>
+                        <m:num>
+                          <m:r>
+                            <a:rPr lang="en-US" b="0" i="1" smtClean="0">
+                              <a:latin typeface="Cambria Math" panose="02040503050406030204" pitchFamily="18" charset="0"/>
+                              <a:ea typeface="Cambria Math" panose="02040503050406030204" pitchFamily="18" charset="0"/>
+                            </a:rPr>
+                            <m:t>1</m:t>
+                          </m:r>
+                        </m:num>
+                        <m:den>
+                          <m:sSub>
+                            <m:sSubPr>
+                              <m:ctrlPr>
+                                <a:rPr lang="en-US" i="1">
+                                  <a:latin typeface="Cambria Math" panose="02040503050406030204" pitchFamily="18" charset="0"/>
+                                  <a:ea typeface="Cambria Math" panose="02040503050406030204" pitchFamily="18" charset="0"/>
+                                </a:rPr>
+                              </m:ctrlPr>
+                            </m:sSubPr>
+                            <m:e>
+                              <m:r>
+                                <a:rPr lang="en-US" i="1">
+                                  <a:latin typeface="Cambria Math" panose="02040503050406030204" pitchFamily="18" charset="0"/>
+                                  <a:ea typeface="Cambria Math" panose="02040503050406030204" pitchFamily="18" charset="0"/>
+                                </a:rPr>
+                                <m:t>𝑛</m:t>
+                              </m:r>
+                            </m:e>
+                            <m:sub>
+                              <m:r>
+                                <a:rPr lang="en-US" i="1">
+                                  <a:latin typeface="Cambria Math" panose="02040503050406030204" pitchFamily="18" charset="0"/>
+                                  <a:ea typeface="Cambria Math" panose="02040503050406030204" pitchFamily="18" charset="0"/>
+                                </a:rPr>
+                                <m:t>𝑖</m:t>
+                              </m:r>
+                            </m:sub>
+                          </m:sSub>
+                        </m:den>
+                      </m:f>
+                      <m:nary>
+                        <m:naryPr>
+                          <m:chr m:val="∑"/>
+                          <m:ctrlPr>
+                            <a:rPr lang="en-US" b="0" i="1" smtClean="0">
+                              <a:latin typeface="Cambria Math" panose="02040503050406030204" pitchFamily="18" charset="0"/>
+                              <a:ea typeface="Cambria Math" panose="02040503050406030204" pitchFamily="18" charset="0"/>
+                            </a:rPr>
+                          </m:ctrlPr>
+                        </m:naryPr>
+                        <m:sub>
+                          <m:r>
+                            <m:rPr>
+                              <m:brk m:alnAt="23"/>
+                            </m:rPr>
+                            <a:rPr lang="en-US" b="0" i="1" smtClean="0">
+                              <a:latin typeface="Cambria Math" panose="02040503050406030204" pitchFamily="18" charset="0"/>
+                              <a:ea typeface="Cambria Math" panose="02040503050406030204" pitchFamily="18" charset="0"/>
+                            </a:rPr>
+                            <m:t>𝑖</m:t>
+                          </m:r>
+                          <m:r>
+                            <a:rPr lang="en-US" b="0" i="1" smtClean="0">
+                              <a:latin typeface="Cambria Math" panose="02040503050406030204" pitchFamily="18" charset="0"/>
+                              <a:ea typeface="Cambria Math" panose="02040503050406030204" pitchFamily="18" charset="0"/>
+                            </a:rPr>
+                            <m:t>=1</m:t>
+                          </m:r>
+                        </m:sub>
+                        <m:sup>
+                          <m:sSub>
+                            <m:sSubPr>
+                              <m:ctrlPr>
+                                <a:rPr lang="en-US" b="0" i="1" smtClean="0">
+                                  <a:latin typeface="Cambria Math" panose="02040503050406030204" pitchFamily="18" charset="0"/>
+                                  <a:ea typeface="Cambria Math" panose="02040503050406030204" pitchFamily="18" charset="0"/>
+                                </a:rPr>
+                              </m:ctrlPr>
+                            </m:sSubPr>
+                            <m:e>
+                              <m:r>
+                                <a:rPr lang="en-US" b="0" i="1" smtClean="0">
+                                  <a:latin typeface="Cambria Math" panose="02040503050406030204" pitchFamily="18" charset="0"/>
+                                  <a:ea typeface="Cambria Math" panose="02040503050406030204" pitchFamily="18" charset="0"/>
+                                </a:rPr>
+                                <m:t>𝑛</m:t>
+                              </m:r>
+                            </m:e>
+                            <m:sub>
+                              <m:r>
+                                <a:rPr lang="en-US" b="0" i="1" smtClean="0">
+                                  <a:latin typeface="Cambria Math" panose="02040503050406030204" pitchFamily="18" charset="0"/>
+                                  <a:ea typeface="Cambria Math" panose="02040503050406030204" pitchFamily="18" charset="0"/>
+                                </a:rPr>
+                                <m:t>𝑖</m:t>
+                              </m:r>
+                            </m:sub>
+                          </m:sSub>
+                        </m:sup>
+                        <m:e>
+                          <m:sSub>
+                            <m:sSubPr>
+                              <m:ctrlPr>
+                                <a:rPr lang="en-US" b="0" i="1" smtClean="0">
+                                  <a:latin typeface="Cambria Math" panose="02040503050406030204" pitchFamily="18" charset="0"/>
+                                  <a:ea typeface="Cambria Math" panose="02040503050406030204" pitchFamily="18" charset="0"/>
+                                </a:rPr>
+                              </m:ctrlPr>
+                            </m:sSubPr>
+                            <m:e>
+                              <m:r>
+                                <a:rPr lang="en-US" b="0" i="1" smtClean="0">
+                                  <a:latin typeface="Cambria Math" panose="02040503050406030204" pitchFamily="18" charset="0"/>
+                                  <a:ea typeface="Cambria Math" panose="02040503050406030204" pitchFamily="18" charset="0"/>
+                                </a:rPr>
+                                <m:t>𝑥</m:t>
+                              </m:r>
+                            </m:e>
+                            <m:sub>
+                              <m:r>
+                                <a:rPr lang="en-US" b="0" i="1" smtClean="0">
+                                  <a:latin typeface="Cambria Math" panose="02040503050406030204" pitchFamily="18" charset="0"/>
+                                  <a:ea typeface="Cambria Math" panose="02040503050406030204" pitchFamily="18" charset="0"/>
+                                </a:rPr>
+                                <m:t>𝑖</m:t>
+                              </m:r>
+                            </m:sub>
+                          </m:sSub>
+                        </m:e>
+                      </m:nary>
+                    </m:oMath>
+                  </m:oMathPara>
+                </a14:m>
+                <a:endParaRPr lang="en-US" dirty="0" smtClean="0"/>
+              </a:p>
+              <a:p>
+                <a:pPr marL="0" indent="0">
+                  <a:buNone/>
+                </a:pPr>
+                <a14:m>
+                  <m:oMathPara xmlns:m="http://schemas.openxmlformats.org/officeDocument/2006/math">
+                    <m:oMathParaPr>
+                      <m:jc m:val="centerGroup"/>
+                    </m:oMathParaPr>
+                    <m:oMath xmlns:m="http://schemas.openxmlformats.org/officeDocument/2006/math">
+                      <m:acc>
+                        <m:accPr>
+                          <m:chr m:val="̂"/>
+                          <m:ctrlPr>
+                            <a:rPr lang="en-US" i="1" smtClean="0">
+                              <a:latin typeface="Cambria Math" panose="02040503050406030204" pitchFamily="18" charset="0"/>
+                              <a:ea typeface="Cambria Math" panose="02040503050406030204" pitchFamily="18" charset="0"/>
+                            </a:rPr>
+                          </m:ctrlPr>
+                        </m:accPr>
+                        <m:e>
+                          <m:r>
+                            <a:rPr lang="en-US" i="1" smtClean="0">
+                              <a:latin typeface="Cambria Math" panose="02040503050406030204" pitchFamily="18" charset="0"/>
+                              <a:ea typeface="Cambria Math" panose="02040503050406030204" pitchFamily="18" charset="0"/>
+                            </a:rPr>
+                            <m:t>𝜎</m:t>
+                          </m:r>
+                        </m:e>
+                      </m:acc>
+                      <m:r>
+                        <a:rPr lang="en-US" b="0" i="1" smtClean="0">
+                          <a:latin typeface="Cambria Math" panose="02040503050406030204" pitchFamily="18" charset="0"/>
+                          <a:ea typeface="Cambria Math" panose="02040503050406030204" pitchFamily="18" charset="0"/>
+                        </a:rPr>
+                        <m:t>=</m:t>
+                      </m:r>
+                      <m:rad>
+                        <m:radPr>
+                          <m:degHide m:val="on"/>
+                          <m:ctrlPr>
+                            <a:rPr lang="en-US" b="0" i="1" smtClean="0">
+                              <a:latin typeface="Cambria Math" panose="02040503050406030204" pitchFamily="18" charset="0"/>
+                              <a:ea typeface="Cambria Math" panose="02040503050406030204" pitchFamily="18" charset="0"/>
+                            </a:rPr>
+                          </m:ctrlPr>
+                        </m:radPr>
+                        <m:deg/>
+                        <m:e>
+                          <m:f>
+                            <m:fPr>
+                              <m:ctrlPr>
+                                <a:rPr lang="en-US" i="1">
+                                  <a:latin typeface="Cambria Math" panose="02040503050406030204" pitchFamily="18" charset="0"/>
+                                  <a:ea typeface="Cambria Math" panose="02040503050406030204" pitchFamily="18" charset="0"/>
+                                </a:rPr>
+                              </m:ctrlPr>
+                            </m:fPr>
+                            <m:num>
+                              <m:r>
+                                <a:rPr lang="en-US" i="1">
+                                  <a:latin typeface="Cambria Math" panose="02040503050406030204" pitchFamily="18" charset="0"/>
+                                  <a:ea typeface="Cambria Math" panose="02040503050406030204" pitchFamily="18" charset="0"/>
+                                </a:rPr>
+                                <m:t>1</m:t>
+                              </m:r>
+                            </m:num>
+                            <m:den>
+                              <m:sSub>
+                                <m:sSubPr>
+                                  <m:ctrlPr>
+                                    <a:rPr lang="en-US" i="1">
+                                      <a:latin typeface="Cambria Math" panose="02040503050406030204" pitchFamily="18" charset="0"/>
+                                      <a:ea typeface="Cambria Math" panose="02040503050406030204" pitchFamily="18" charset="0"/>
+                                    </a:rPr>
+                                  </m:ctrlPr>
+                                </m:sSubPr>
+                                <m:e>
+                                  <m:r>
+                                    <a:rPr lang="en-US" i="1">
+                                      <a:latin typeface="Cambria Math" panose="02040503050406030204" pitchFamily="18" charset="0"/>
+                                      <a:ea typeface="Cambria Math" panose="02040503050406030204" pitchFamily="18" charset="0"/>
+                                    </a:rPr>
+                                    <m:t>𝑛</m:t>
+                                  </m:r>
+                                </m:e>
+                                <m:sub>
+                                  <m:r>
+                                    <a:rPr lang="en-US" i="1">
+                                      <a:latin typeface="Cambria Math" panose="02040503050406030204" pitchFamily="18" charset="0"/>
+                                      <a:ea typeface="Cambria Math" panose="02040503050406030204" pitchFamily="18" charset="0"/>
+                                    </a:rPr>
+                                    <m:t>𝑖</m:t>
+                                  </m:r>
+                                </m:sub>
+                              </m:sSub>
+                              <m:r>
+                                <a:rPr lang="en-US" i="1">
+                                  <a:latin typeface="Cambria Math" panose="02040503050406030204" pitchFamily="18" charset="0"/>
+                                  <a:ea typeface="Cambria Math" panose="02040503050406030204" pitchFamily="18" charset="0"/>
+                                </a:rPr>
+                                <m:t>−1</m:t>
+                              </m:r>
+                            </m:den>
+                          </m:f>
+                          <m:nary>
+                            <m:naryPr>
+                              <m:chr m:val="∑"/>
+                              <m:ctrlPr>
+                                <a:rPr lang="en-US" i="1">
+                                  <a:latin typeface="Cambria Math" panose="02040503050406030204" pitchFamily="18" charset="0"/>
+                                  <a:ea typeface="Cambria Math" panose="02040503050406030204" pitchFamily="18" charset="0"/>
+                                </a:rPr>
+                              </m:ctrlPr>
+                            </m:naryPr>
+                            <m:sub>
+                              <m:r>
+                                <m:rPr>
+                                  <m:brk m:alnAt="23"/>
+                                </m:rPr>
+                                <a:rPr lang="en-US" i="1">
+                                  <a:latin typeface="Cambria Math" panose="02040503050406030204" pitchFamily="18" charset="0"/>
+                                  <a:ea typeface="Cambria Math" panose="02040503050406030204" pitchFamily="18" charset="0"/>
+                                </a:rPr>
+                                <m:t>𝑖</m:t>
+                              </m:r>
+                              <m:r>
+                                <a:rPr lang="en-US" i="1">
+                                  <a:latin typeface="Cambria Math" panose="02040503050406030204" pitchFamily="18" charset="0"/>
+                                  <a:ea typeface="Cambria Math" panose="02040503050406030204" pitchFamily="18" charset="0"/>
+                                </a:rPr>
+                                <m:t>=1</m:t>
+                              </m:r>
+                            </m:sub>
+                            <m:sup>
+                              <m:sSub>
+                                <m:sSubPr>
+                                  <m:ctrlPr>
+                                    <a:rPr lang="en-US" i="1">
+                                      <a:latin typeface="Cambria Math" panose="02040503050406030204" pitchFamily="18" charset="0"/>
+                                      <a:ea typeface="Cambria Math" panose="02040503050406030204" pitchFamily="18" charset="0"/>
+                                    </a:rPr>
+                                  </m:ctrlPr>
+                                </m:sSubPr>
+                                <m:e>
+                                  <m:r>
+                                    <a:rPr lang="en-US" i="1">
+                                      <a:latin typeface="Cambria Math" panose="02040503050406030204" pitchFamily="18" charset="0"/>
+                                      <a:ea typeface="Cambria Math" panose="02040503050406030204" pitchFamily="18" charset="0"/>
+                                    </a:rPr>
+                                    <m:t>𝑛</m:t>
+                                  </m:r>
+                                </m:e>
+                                <m:sub>
+                                  <m:r>
+                                    <a:rPr lang="en-US" i="1">
+                                      <a:latin typeface="Cambria Math" panose="02040503050406030204" pitchFamily="18" charset="0"/>
+                                      <a:ea typeface="Cambria Math" panose="02040503050406030204" pitchFamily="18" charset="0"/>
+                                    </a:rPr>
+                                    <m:t>𝑖</m:t>
+                                  </m:r>
+                                </m:sub>
+                              </m:sSub>
+                            </m:sup>
+                            <m:e>
+                              <m:sSup>
+                                <m:sSupPr>
+                                  <m:ctrlPr>
+                                    <a:rPr lang="en-US" i="1">
+                                      <a:latin typeface="Cambria Math" panose="02040503050406030204" pitchFamily="18" charset="0"/>
+                                      <a:ea typeface="Cambria Math" panose="02040503050406030204" pitchFamily="18" charset="0"/>
+                                    </a:rPr>
+                                  </m:ctrlPr>
+                                </m:sSupPr>
+                                <m:e>
+                                  <m:d>
+                                    <m:dPr>
+                                      <m:ctrlPr>
+                                        <a:rPr lang="en-US" i="1">
+                                          <a:latin typeface="Cambria Math" panose="02040503050406030204" pitchFamily="18" charset="0"/>
+                                          <a:ea typeface="Cambria Math" panose="02040503050406030204" pitchFamily="18" charset="0"/>
+                                        </a:rPr>
+                                      </m:ctrlPr>
+                                    </m:dPr>
+                                    <m:e>
+                                      <m:sSub>
+                                        <m:sSubPr>
+                                          <m:ctrlPr>
+                                            <a:rPr lang="en-US" i="1">
+                                              <a:latin typeface="Cambria Math" panose="02040503050406030204" pitchFamily="18" charset="0"/>
+                                              <a:ea typeface="Cambria Math" panose="02040503050406030204" pitchFamily="18" charset="0"/>
+                                            </a:rPr>
+                                          </m:ctrlPr>
+                                        </m:sSubPr>
+                                        <m:e>
+                                          <m:r>
+                                            <a:rPr lang="en-US" i="1">
+                                              <a:latin typeface="Cambria Math" panose="02040503050406030204" pitchFamily="18" charset="0"/>
+                                              <a:ea typeface="Cambria Math" panose="02040503050406030204" pitchFamily="18" charset="0"/>
+                                            </a:rPr>
+                                            <m:t>𝑥</m:t>
+                                          </m:r>
+                                        </m:e>
+                                        <m:sub>
+                                          <m:r>
+                                            <a:rPr lang="en-US" i="1">
+                                              <a:latin typeface="Cambria Math" panose="02040503050406030204" pitchFamily="18" charset="0"/>
+                                              <a:ea typeface="Cambria Math" panose="02040503050406030204" pitchFamily="18" charset="0"/>
+                                            </a:rPr>
+                                            <m:t>𝑖</m:t>
+                                          </m:r>
+                                        </m:sub>
+                                      </m:sSub>
+                                      <m:r>
+                                        <a:rPr lang="en-US" i="1">
+                                          <a:latin typeface="Cambria Math" panose="02040503050406030204" pitchFamily="18" charset="0"/>
+                                          <a:ea typeface="Cambria Math" panose="02040503050406030204" pitchFamily="18" charset="0"/>
+                                        </a:rPr>
+                                        <m:t>−</m:t>
+                                      </m:r>
+                                      <m:acc>
+                                        <m:accPr>
+                                          <m:chr m:val="̂"/>
+                                          <m:ctrlPr>
+                                            <a:rPr lang="en-US" i="1">
+                                              <a:latin typeface="Cambria Math" panose="02040503050406030204" pitchFamily="18" charset="0"/>
+                                              <a:ea typeface="Cambria Math" panose="02040503050406030204" pitchFamily="18" charset="0"/>
+                                            </a:rPr>
+                                          </m:ctrlPr>
+                                        </m:accPr>
+                                        <m:e>
+                                          <m:r>
+                                            <a:rPr lang="en-US" i="1">
+                                              <a:latin typeface="Cambria Math" panose="02040503050406030204" pitchFamily="18" charset="0"/>
+                                              <a:ea typeface="Cambria Math" panose="02040503050406030204" pitchFamily="18" charset="0"/>
+                                            </a:rPr>
+                                            <m:t>𝜇</m:t>
+                                          </m:r>
+                                        </m:e>
+                                      </m:acc>
+                                    </m:e>
+                                  </m:d>
+                                </m:e>
+                                <m:sup>
+                                  <m:r>
+                                    <a:rPr lang="en-US" i="1">
+                                      <a:latin typeface="Cambria Math" panose="02040503050406030204" pitchFamily="18" charset="0"/>
+                                      <a:ea typeface="Cambria Math" panose="02040503050406030204" pitchFamily="18" charset="0"/>
+                                    </a:rPr>
+                                    <m:t>2</m:t>
+                                  </m:r>
+                                </m:sup>
+                              </m:sSup>
+                            </m:e>
+                          </m:nary>
+                        </m:e>
+                      </m:rad>
+                    </m:oMath>
+                  </m:oMathPara>
+                </a14:m>
+                <a:endParaRPr lang="en-US" dirty="0" smtClean="0"/>
+              </a:p>
+              <a:p>
+                <a:pPr marL="0" indent="0">
+                  <a:buNone/>
+                </a:pPr>
+                <a14:m>
+                  <m:oMathPara xmlns:m="http://schemas.openxmlformats.org/officeDocument/2006/math">
+                    <m:oMathParaPr>
+                      <m:jc m:val="centerGroup"/>
+                    </m:oMathParaPr>
+                    <m:oMath xmlns:m="http://schemas.openxmlformats.org/officeDocument/2006/math">
+                      <m:acc>
+                        <m:accPr>
+                          <m:chr m:val="̂"/>
+                          <m:ctrlPr>
+                            <a:rPr lang="en-US" b="0" i="1" smtClean="0">
+                              <a:latin typeface="Cambria Math" panose="02040503050406030204" pitchFamily="18" charset="0"/>
+                            </a:rPr>
+                          </m:ctrlPr>
+                        </m:accPr>
+                        <m:e>
+                          <m:r>
+                            <a:rPr lang="en-US" i="1">
+                              <a:latin typeface="Cambria Math" panose="02040503050406030204" pitchFamily="18" charset="0"/>
+                            </a:rPr>
+                            <m:t>𝑆𝐸</m:t>
+                          </m:r>
+                        </m:e>
+                      </m:acc>
+                      <m:d>
+                        <m:dPr>
+                          <m:ctrlPr>
+                            <a:rPr lang="en-US" b="0" i="1" smtClean="0">
+                              <a:latin typeface="Cambria Math" panose="02040503050406030204" pitchFamily="18" charset="0"/>
+                            </a:rPr>
+                          </m:ctrlPr>
+                        </m:dPr>
+                        <m:e>
+                          <m:acc>
+                            <m:accPr>
+                              <m:chr m:val="̂"/>
+                              <m:ctrlPr>
+                                <a:rPr lang="en-US" i="1">
+                                  <a:latin typeface="Cambria Math" panose="02040503050406030204" pitchFamily="18" charset="0"/>
+                                  <a:ea typeface="Cambria Math" panose="02040503050406030204" pitchFamily="18" charset="0"/>
+                                </a:rPr>
+                              </m:ctrlPr>
+                            </m:accPr>
+                            <m:e>
+                              <m:r>
+                                <a:rPr lang="en-US" i="1">
+                                  <a:latin typeface="Cambria Math" panose="02040503050406030204" pitchFamily="18" charset="0"/>
+                                  <a:ea typeface="Cambria Math" panose="02040503050406030204" pitchFamily="18" charset="0"/>
+                                </a:rPr>
+                                <m:t>𝜇</m:t>
+                              </m:r>
+                            </m:e>
+                          </m:acc>
+                        </m:e>
+                      </m:d>
+                      <m:r>
+                        <a:rPr lang="en-US" b="0" i="1" smtClean="0">
+                          <a:latin typeface="Cambria Math" panose="02040503050406030204" pitchFamily="18" charset="0"/>
+                          <a:ea typeface="Cambria Math" panose="02040503050406030204" pitchFamily="18" charset="0"/>
+                        </a:rPr>
+                        <m:t>=</m:t>
+                      </m:r>
+                      <m:f>
+                        <m:fPr>
+                          <m:ctrlPr>
+                            <a:rPr lang="en-US" b="0" i="1" smtClean="0">
+                              <a:latin typeface="Cambria Math" panose="02040503050406030204" pitchFamily="18" charset="0"/>
+                              <a:ea typeface="Cambria Math" panose="02040503050406030204" pitchFamily="18" charset="0"/>
+                            </a:rPr>
+                          </m:ctrlPr>
+                        </m:fPr>
+                        <m:num>
+                          <m:acc>
+                            <m:accPr>
+                              <m:chr m:val="̂"/>
+                              <m:ctrlPr>
+                                <a:rPr lang="en-US" i="1">
+                                  <a:latin typeface="Cambria Math" panose="02040503050406030204" pitchFamily="18" charset="0"/>
+                                  <a:ea typeface="Cambria Math" panose="02040503050406030204" pitchFamily="18" charset="0"/>
+                                </a:rPr>
+                              </m:ctrlPr>
+                            </m:accPr>
+                            <m:e>
+                              <m:r>
+                                <a:rPr lang="en-US" i="1">
+                                  <a:latin typeface="Cambria Math" panose="02040503050406030204" pitchFamily="18" charset="0"/>
+                                  <a:ea typeface="Cambria Math" panose="02040503050406030204" pitchFamily="18" charset="0"/>
+                                </a:rPr>
+                                <m:t>𝜎</m:t>
+                              </m:r>
+                            </m:e>
+                          </m:acc>
+                        </m:num>
+                        <m:den>
+                          <m:rad>
+                            <m:radPr>
+                              <m:degHide m:val="on"/>
+                              <m:ctrlPr>
+                                <a:rPr lang="en-US" i="1">
+                                  <a:latin typeface="Cambria Math" panose="02040503050406030204" pitchFamily="18" charset="0"/>
+                                  <a:ea typeface="Cambria Math" panose="02040503050406030204" pitchFamily="18" charset="0"/>
+                                </a:rPr>
+                              </m:ctrlPr>
+                            </m:radPr>
+                            <m:deg/>
+                            <m:e>
+                              <m:sSub>
+                                <m:sSubPr>
+                                  <m:ctrlPr>
+                                    <a:rPr lang="en-US" b="0" i="1" smtClean="0">
+                                      <a:latin typeface="Cambria Math" panose="02040503050406030204" pitchFamily="18" charset="0"/>
+                                      <a:ea typeface="Cambria Math" panose="02040503050406030204" pitchFamily="18" charset="0"/>
+                                    </a:rPr>
+                                  </m:ctrlPr>
+                                </m:sSubPr>
+                                <m:e>
+                                  <m:r>
+                                    <a:rPr lang="en-US" b="0" i="1" smtClean="0">
+                                      <a:latin typeface="Cambria Math" panose="02040503050406030204" pitchFamily="18" charset="0"/>
+                                      <a:ea typeface="Cambria Math" panose="02040503050406030204" pitchFamily="18" charset="0"/>
+                                    </a:rPr>
+                                    <m:t>𝑛</m:t>
+                                  </m:r>
+                                </m:e>
+                                <m:sub>
+                                  <m:r>
+                                    <a:rPr lang="en-US" b="0" i="1" smtClean="0">
+                                      <a:latin typeface="Cambria Math" panose="02040503050406030204" pitchFamily="18" charset="0"/>
+                                      <a:ea typeface="Cambria Math" panose="02040503050406030204" pitchFamily="18" charset="0"/>
+                                    </a:rPr>
+                                    <m:t>𝑖</m:t>
+                                  </m:r>
+                                </m:sub>
+                              </m:sSub>
+                            </m:e>
+                          </m:rad>
+                        </m:den>
+                      </m:f>
+                    </m:oMath>
+                  </m:oMathPara>
+                </a14:m>
+                <a:endParaRPr lang="en-US" dirty="0" smtClean="0"/>
+              </a:p>
+            </p:txBody>
+          </p:sp>
+        </mc:Choice>
+        <mc:Fallback>
+          <p:sp>
+            <p:nvSpPr>
+              <p:cNvPr id="3" name="Content Placeholder 2"/>
+              <p:cNvSpPr>
+                <a:spLocks noGrp="1" noRot="1" noChangeAspect="1" noMove="1" noResize="1" noEditPoints="1" noAdjustHandles="1" noChangeArrowheads="1" noChangeShapeType="1" noTextEdit="1"/>
+              </p:cNvSpPr>
+              <p:nvPr>
+                <p:ph idx="1"/>
+              </p:nvPr>
+            </p:nvSpPr>
+            <p:spPr>
+              <a:blipFill>
+                <a:blip r:embed="rId2"/>
+                <a:stretch>
+                  <a:fillRect l="-1220" t="-923" r="-814"/>
+                </a:stretch>
+              </a:blipFill>
+            </p:spPr>
+            <p:txBody>
+              <a:bodyPr/>
+              <a:lstStyle/>
+              <a:p>
+                <a:r>
+                  <a:rPr lang="en-GB">
+                    <a:noFill/>
+                  </a:rPr>
+                  <a:t> </a:t>
+                </a:r>
+              </a:p>
+            </p:txBody>
+          </p:sp>
+        </mc:Fallback>
+      </mc:AlternateContent>
+    </p:spTree>
+    <p:extLst>
+      <p:ext uri="{BB962C8B-B14F-4D97-AF65-F5344CB8AC3E}">
+        <p14:creationId xmlns:p14="http://schemas.microsoft.com/office/powerpoint/2010/main" val="1183308175"/>
+      </p:ext>
+    </p:extLst>
+  </p:cSld>
+  <p:clrMapOvr>
+    <a:masterClrMapping/>
+  </p:clrMapOvr>
+  <p:timing>
+    <p:tnLst>
+      <p:par>
+        <p:cTn id="1" dur="indefinite" restart="never" nodeType="tmRoot">
+          <p:childTnLst>
+            <p:seq concurrent="1" nextAc="seek">
+              <p:cTn id="2" dur="indefinite" nodeType="mainSeq">
+                <p:childTnLst>
+                  <p:par>
+                    <p:cTn id="3" fill="hold">
+                      <p:stCondLst>
+                        <p:cond delay="indefinite"/>
+                      </p:stCondLst>
+                      <p:childTnLst>
+                        <p:par>
+                          <p:cTn id="4" fill="hold">
+                            <p:stCondLst>
+                              <p:cond delay="0"/>
+                            </p:stCondLst>
+                            <p:childTnLst>
+                              <p:par>
+                                <p:cTn id="5" presetID="1" presetClass="entr" presetSubtype="0" fill="hold" nodeType="clickEffect">
+                                  <p:stCondLst>
+                                    <p:cond delay="0"/>
+                                  </p:stCondLst>
+                                  <p:childTnLst>
+                                    <p:set>
+                                      <p:cBhvr>
+                                        <p:cTn id="6" dur="1" fill="hold">
+                                          <p:stCondLst>
+                                            <p:cond delay="0"/>
+                                          </p:stCondLst>
+                                        </p:cTn>
+                                        <p:tgtEl>
+                                          <p:spTgt spid="3">
+                                            <p:txEl>
+                                              <p:pRg st="3" end="3"/>
+                                            </p:txEl>
+                                          </p:spTgt>
+                                        </p:tgtEl>
+                                        <p:attrNameLst>
+                                          <p:attrName>style.visibility</p:attrName>
+                                        </p:attrNameLst>
+                                      </p:cBhvr>
+                                      <p:to>
+                                        <p:strVal val="visible"/>
+                                      </p:to>
+                                    </p:set>
+                                  </p:childTnLst>
+                                </p:cTn>
+                              </p:par>
+                              <p:par>
+                                <p:cTn id="7" presetID="1" presetClass="entr" presetSubtype="0" fill="hold" nodeType="withEffect">
+                                  <p:stCondLst>
+                                    <p:cond delay="0"/>
+                                  </p:stCondLst>
+                                  <p:childTnLst>
+                                    <p:set>
+                                      <p:cBhvr>
+                                        <p:cTn id="8" dur="1" fill="hold">
+                                          <p:stCondLst>
+                                            <p:cond delay="0"/>
+                                          </p:stCondLst>
+                                        </p:cTn>
+                                        <p:tgtEl>
+                                          <p:spTgt spid="3">
+                                            <p:txEl>
+                                              <p:pRg st="4" end="4"/>
+                                            </p:txEl>
+                                          </p:spTgt>
+                                        </p:tgtEl>
+                                        <p:attrNameLst>
+                                          <p:attrName>style.visibility</p:attrName>
+                                        </p:attrNameLst>
+                                      </p:cBhvr>
+                                      <p:to>
+                                        <p:strVal val="visible"/>
+                                      </p:to>
+                                    </p:set>
+                                  </p:childTnLst>
+                                </p:cTn>
+                              </p:par>
+                              <p:par>
+                                <p:cTn id="9" presetID="1" presetClass="entr" presetSubtype="0" fill="hold" nodeType="withEffect">
+                                  <p:stCondLst>
+                                    <p:cond delay="0"/>
+                                  </p:stCondLst>
+                                  <p:childTnLst>
+                                    <p:set>
+                                      <p:cBhvr>
+                                        <p:cTn id="10" dur="1" fill="hold">
+                                          <p:stCondLst>
+                                            <p:cond delay="0"/>
+                                          </p:stCondLst>
+                                        </p:cTn>
+                                        <p:tgtEl>
+                                          <p:spTgt spid="3">
+                                            <p:txEl>
+                                              <p:pRg st="5" end="5"/>
+                                            </p:txEl>
+                                          </p:spTgt>
+                                        </p:tgtEl>
+                                        <p:attrNameLst>
+                                          <p:attrName>style.visibility</p:attrName>
+                                        </p:attrNameLst>
+                                      </p:cBhvr>
+                                      <p:to>
+                                        <p:strVal val="visible"/>
+                                      </p:to>
+                                    </p:set>
+                                  </p:childTnLst>
+                                </p:cTn>
+                              </p:par>
+                            </p:childTnLst>
+                          </p:cTn>
+                        </p:par>
+                      </p:childTnLst>
+                    </p:cTn>
+                  </p:par>
+                </p:childTnLst>
+              </p:cTn>
+              <p:prevCondLst>
+                <p:cond evt="onPrev" delay="0">
+                  <p:tgtEl>
+                    <p:sldTgt/>
+                  </p:tgtEl>
+                </p:cond>
+              </p:prevCondLst>
+              <p:nextCondLst>
+                <p:cond evt="onNext" delay="0">
+                  <p:tgtEl>
+                    <p:sldTgt/>
+                  </p:tgtEl>
+                </p:cond>
+              </p:nextCondLst>
+            </p:seq>
+          </p:childTnLst>
+        </p:cTn>
+      </p:par>
+    </p:tnLst>
+  </p:timing>
+</p:sld>
+</file>
+
+<file path=ppt/slides/slide16.xml><?xml version="1.0" encoding="utf-8"?>
+<p:sld xmlns:a="http://schemas.openxmlformats.org/drawingml/2006/main" xmlns:r="http://schemas.openxmlformats.org/officeDocument/2006/relationships" xmlns:p="http://schemas.openxmlformats.org/presentationml/2006/main">
+  <p:cSld>
+    <p:spTree>
+      <p:nvGrpSpPr>
+        <p:cNvPr id="1" name=""/>
+        <p:cNvGrpSpPr/>
+        <p:nvPr/>
+      </p:nvGrpSpPr>
+      <p:grpSpPr>
+        <a:xfrm>
+          <a:off x="0" y="0"/>
+          <a:ext cx="0" cy="0"/>
+          <a:chOff x="0" y="0"/>
+          <a:chExt cx="0" cy="0"/>
+        </a:xfrm>
+      </p:grpSpPr>
+      <p:sp>
+        <p:nvSpPr>
+          <p:cNvPr id="2" name="Title 1"/>
+          <p:cNvSpPr>
+            <a:spLocks noGrp="1"/>
+          </p:cNvSpPr>
+          <p:nvPr>
+            <p:ph type="title"/>
+          </p:nvPr>
+        </p:nvSpPr>
+        <p:spPr/>
+        <p:txBody>
+          <a:bodyPr/>
+          <a:lstStyle/>
+          <a:p>
+            <a:endParaRPr lang="en-GB"/>
+          </a:p>
+        </p:txBody>
+      </p:sp>
+      <mc:AlternateContent xmlns:mc="http://schemas.openxmlformats.org/markup-compatibility/2006">
+        <mc:Choice xmlns:a14="http://schemas.microsoft.com/office/drawing/2010/main" Requires="a14">
+          <p:sp>
+            <p:nvSpPr>
+              <p:cNvPr id="3" name="Content Placeholder 2"/>
+              <p:cNvSpPr>
+                <a:spLocks noGrp="1"/>
+              </p:cNvSpPr>
+              <p:nvPr>
+                <p:ph idx="1"/>
+              </p:nvPr>
+            </p:nvSpPr>
+            <p:spPr/>
+            <p:txBody>
+              <a:bodyPr>
+                <a:normAutofit/>
+              </a:bodyPr>
+              <a:lstStyle/>
+              <a:p>
+                <a:pPr marL="0" indent="0">
+                  <a:buNone/>
+                </a:pPr>
+                <a:r>
+                  <a:rPr lang="en-US" b="1" dirty="0" smtClean="0"/>
+                  <a:t>Add sampling variance</a:t>
+                </a:r>
+              </a:p>
+              <a:p>
+                <a:pPr marL="0" indent="0">
+                  <a:buNone/>
+                </a:pPr>
+                <a:endParaRPr lang="en-US" dirty="0"/>
+              </a:p>
+              <a:p>
+                <a:pPr marL="0" indent="0">
+                  <a:buNone/>
+                </a:pPr>
+                <a:r>
+                  <a:rPr lang="en-US" dirty="0" smtClean="0"/>
+                  <a:t>If measurements </a:t>
+                </a:r>
+                <a14:m>
+                  <m:oMath xmlns:m="http://schemas.openxmlformats.org/officeDocument/2006/math">
+                    <m:sSub>
+                      <m:sSubPr>
+                        <m:ctrlPr>
+                          <a:rPr lang="en-US" b="0" i="1" smtClean="0">
+                            <a:latin typeface="Cambria Math" panose="02040503050406030204" pitchFamily="18" charset="0"/>
+                          </a:rPr>
+                        </m:ctrlPr>
+                      </m:sSubPr>
+                      <m:e>
+                        <m:r>
+                          <a:rPr lang="en-US" b="0" i="1" smtClean="0">
+                            <a:latin typeface="Cambria Math" panose="02040503050406030204" pitchFamily="18" charset="0"/>
+                          </a:rPr>
+                          <m:t>𝑥</m:t>
+                        </m:r>
+                      </m:e>
+                      <m:sub>
+                        <m:r>
+                          <a:rPr lang="en-US" b="0" i="1" smtClean="0">
+                            <a:latin typeface="Cambria Math" panose="02040503050406030204" pitchFamily="18" charset="0"/>
+                          </a:rPr>
+                          <m:t>𝑖</m:t>
+                        </m:r>
+                      </m:sub>
+                    </m:sSub>
+                  </m:oMath>
+                </a14:m>
+                <a:r>
+                  <a:rPr lang="en-US" dirty="0" smtClean="0"/>
+                  <a:t> follow a lognormal distribution with mean </a:t>
+                </a:r>
+                <a14:m>
+                  <m:oMath xmlns:m="http://schemas.openxmlformats.org/officeDocument/2006/math">
+                    <m:acc>
+                      <m:accPr>
+                        <m:chr m:val="̂"/>
+                        <m:ctrlPr>
+                          <a:rPr lang="en-US" i="1">
+                            <a:latin typeface="Cambria Math" panose="02040503050406030204" pitchFamily="18" charset="0"/>
+                            <a:ea typeface="Cambria Math" panose="02040503050406030204" pitchFamily="18" charset="0"/>
+                          </a:rPr>
+                        </m:ctrlPr>
+                      </m:accPr>
+                      <m:e>
+                        <m:r>
+                          <a:rPr lang="en-US" i="1">
+                            <a:latin typeface="Cambria Math" panose="02040503050406030204" pitchFamily="18" charset="0"/>
+                            <a:ea typeface="Cambria Math" panose="02040503050406030204" pitchFamily="18" charset="0"/>
+                          </a:rPr>
+                          <m:t>𝜇</m:t>
+                        </m:r>
+                      </m:e>
+                    </m:acc>
+                  </m:oMath>
+                </a14:m>
+                <a:r>
+                  <a:rPr lang="en-US" dirty="0" smtClean="0"/>
+                  <a:t> and standard deviation </a:t>
+                </a:r>
+                <a14:m>
+                  <m:oMath xmlns:m="http://schemas.openxmlformats.org/officeDocument/2006/math">
+                    <m:acc>
+                      <m:accPr>
+                        <m:chr m:val="̂"/>
+                        <m:ctrlPr>
+                          <a:rPr lang="en-US" i="1">
+                            <a:latin typeface="Cambria Math" panose="02040503050406030204" pitchFamily="18" charset="0"/>
+                          </a:rPr>
+                        </m:ctrlPr>
+                      </m:accPr>
+                      <m:e>
+                        <m:r>
+                          <a:rPr lang="en-US" i="1">
+                            <a:latin typeface="Cambria Math" panose="02040503050406030204" pitchFamily="18" charset="0"/>
+                          </a:rPr>
+                          <m:t>𝑆𝐸</m:t>
+                        </m:r>
+                      </m:e>
+                    </m:acc>
+                    <m:d>
+                      <m:dPr>
+                        <m:ctrlPr>
+                          <a:rPr lang="en-US" i="1">
+                            <a:latin typeface="Cambria Math" panose="02040503050406030204" pitchFamily="18" charset="0"/>
+                          </a:rPr>
+                        </m:ctrlPr>
+                      </m:dPr>
+                      <m:e>
+                        <m:acc>
+                          <m:accPr>
+                            <m:chr m:val="̂"/>
+                            <m:ctrlPr>
+                              <a:rPr lang="en-US" i="1">
+                                <a:latin typeface="Cambria Math" panose="02040503050406030204" pitchFamily="18" charset="0"/>
+                                <a:ea typeface="Cambria Math" panose="02040503050406030204" pitchFamily="18" charset="0"/>
+                              </a:rPr>
+                            </m:ctrlPr>
+                          </m:accPr>
+                          <m:e>
+                            <m:r>
+                              <a:rPr lang="en-US" i="1">
+                                <a:latin typeface="Cambria Math" panose="02040503050406030204" pitchFamily="18" charset="0"/>
+                                <a:ea typeface="Cambria Math" panose="02040503050406030204" pitchFamily="18" charset="0"/>
+                              </a:rPr>
+                              <m:t>𝜇</m:t>
+                            </m:r>
+                          </m:e>
+                        </m:acc>
+                      </m:e>
+                    </m:d>
+                  </m:oMath>
+                </a14:m>
+                <a:r>
+                  <a:rPr lang="en-US" dirty="0" smtClean="0"/>
+                  <a:t>, what is the log-standard deviation </a:t>
+                </a:r>
+                <a14:m>
+                  <m:oMath xmlns:m="http://schemas.openxmlformats.org/officeDocument/2006/math">
+                    <m:sSub>
+                      <m:sSubPr>
+                        <m:ctrlPr>
+                          <a:rPr lang="en-US" b="0" i="1" smtClean="0">
+                            <a:latin typeface="Cambria Math" panose="02040503050406030204" pitchFamily="18" charset="0"/>
+                            <a:ea typeface="Cambria Math" panose="02040503050406030204" pitchFamily="18" charset="0"/>
+                          </a:rPr>
+                        </m:ctrlPr>
+                      </m:sSubPr>
+                      <m:e>
+                        <m:r>
+                          <a:rPr lang="en-US" i="1" smtClean="0">
+                            <a:latin typeface="Cambria Math" panose="02040503050406030204" pitchFamily="18" charset="0"/>
+                            <a:ea typeface="Cambria Math" panose="02040503050406030204" pitchFamily="18" charset="0"/>
+                          </a:rPr>
+                          <m:t>𝜎</m:t>
+                        </m:r>
+                      </m:e>
+                      <m:sub>
+                        <m:r>
+                          <a:rPr lang="en-US" b="0" i="1" smtClean="0">
+                            <a:latin typeface="Cambria Math" panose="02040503050406030204" pitchFamily="18" charset="0"/>
+                            <a:ea typeface="Cambria Math" panose="02040503050406030204" pitchFamily="18" charset="0"/>
+                          </a:rPr>
+                          <m:t>𝑙𝑜𝑔𝑛𝑜𝑟𝑚𝑎𝑙</m:t>
+                        </m:r>
+                      </m:sub>
+                    </m:sSub>
+                  </m:oMath>
+                </a14:m>
+                <a:r>
+                  <a:rPr lang="en-US" dirty="0" smtClean="0"/>
+                  <a:t> of the lognormal distribution?</a:t>
+                </a:r>
+              </a:p>
+              <a:p>
+                <a:pPr marL="0" indent="0">
+                  <a:buNone/>
+                </a:pPr>
+                <a14:m>
+                  <m:oMathPara xmlns:m="http://schemas.openxmlformats.org/officeDocument/2006/math">
+                    <m:oMathParaPr>
+                      <m:jc m:val="centerGroup"/>
+                    </m:oMathParaPr>
+                    <m:oMath xmlns:m="http://schemas.openxmlformats.org/officeDocument/2006/math">
+                      <m:r>
+                        <a:rPr lang="en-US" b="0" i="1" smtClean="0">
+                          <a:latin typeface="Cambria Math" panose="02040503050406030204" pitchFamily="18" charset="0"/>
+                        </a:rPr>
+                        <m:t>𝐶𝑉</m:t>
+                      </m:r>
+                      <m:r>
+                        <a:rPr lang="en-US" b="0" i="1" smtClean="0">
+                          <a:latin typeface="Cambria Math" panose="02040503050406030204" pitchFamily="18" charset="0"/>
+                        </a:rPr>
+                        <m:t>=</m:t>
+                      </m:r>
+                      <m:f>
+                        <m:fPr>
+                          <m:ctrlPr>
+                            <a:rPr lang="en-US" b="0" i="1" smtClean="0">
+                              <a:latin typeface="Cambria Math" panose="02040503050406030204" pitchFamily="18" charset="0"/>
+                            </a:rPr>
+                          </m:ctrlPr>
+                        </m:fPr>
+                        <m:num>
+                          <m:acc>
+                            <m:accPr>
+                              <m:chr m:val="̂"/>
+                              <m:ctrlPr>
+                                <a:rPr lang="en-US" i="1">
+                                  <a:latin typeface="Cambria Math" panose="02040503050406030204" pitchFamily="18" charset="0"/>
+                                </a:rPr>
+                              </m:ctrlPr>
+                            </m:accPr>
+                            <m:e>
+                              <m:r>
+                                <a:rPr lang="en-US" i="1">
+                                  <a:latin typeface="Cambria Math" panose="02040503050406030204" pitchFamily="18" charset="0"/>
+                                </a:rPr>
+                                <m:t>𝑆𝐸</m:t>
+                              </m:r>
+                            </m:e>
+                          </m:acc>
+                          <m:d>
+                            <m:dPr>
+                              <m:ctrlPr>
+                                <a:rPr lang="en-US" i="1">
+                                  <a:latin typeface="Cambria Math" panose="02040503050406030204" pitchFamily="18" charset="0"/>
+                                </a:rPr>
+                              </m:ctrlPr>
+                            </m:dPr>
+                            <m:e>
+                              <m:acc>
+                                <m:accPr>
+                                  <m:chr m:val="̂"/>
+                                  <m:ctrlPr>
+                                    <a:rPr lang="en-US" i="1">
+                                      <a:latin typeface="Cambria Math" panose="02040503050406030204" pitchFamily="18" charset="0"/>
+                                      <a:ea typeface="Cambria Math" panose="02040503050406030204" pitchFamily="18" charset="0"/>
+                                    </a:rPr>
+                                  </m:ctrlPr>
+                                </m:accPr>
+                                <m:e>
+                                  <m:r>
+                                    <a:rPr lang="en-US" i="1">
+                                      <a:latin typeface="Cambria Math" panose="02040503050406030204" pitchFamily="18" charset="0"/>
+                                      <a:ea typeface="Cambria Math" panose="02040503050406030204" pitchFamily="18" charset="0"/>
+                                    </a:rPr>
+                                    <m:t>𝜇</m:t>
+                                  </m:r>
+                                </m:e>
+                              </m:acc>
+                            </m:e>
+                          </m:d>
+                        </m:num>
+                        <m:den>
+                          <m:acc>
+                            <m:accPr>
+                              <m:chr m:val="̂"/>
+                              <m:ctrlPr>
+                                <a:rPr lang="en-US" i="1">
+                                  <a:latin typeface="Cambria Math" panose="02040503050406030204" pitchFamily="18" charset="0"/>
+                                  <a:ea typeface="Cambria Math" panose="02040503050406030204" pitchFamily="18" charset="0"/>
+                                </a:rPr>
+                              </m:ctrlPr>
+                            </m:accPr>
+                            <m:e>
+                              <m:r>
+                                <a:rPr lang="en-US" i="1">
+                                  <a:latin typeface="Cambria Math" panose="02040503050406030204" pitchFamily="18" charset="0"/>
+                                  <a:ea typeface="Cambria Math" panose="02040503050406030204" pitchFamily="18" charset="0"/>
+                                </a:rPr>
+                                <m:t>𝜇</m:t>
+                              </m:r>
+                            </m:e>
+                          </m:acc>
+                        </m:den>
+                      </m:f>
+                      <m:r>
+                        <a:rPr lang="en-US" b="0" i="1" smtClean="0">
+                          <a:latin typeface="Cambria Math" panose="02040503050406030204" pitchFamily="18" charset="0"/>
+                        </a:rPr>
+                        <m:t>=</m:t>
+                      </m:r>
+                      <m:rad>
+                        <m:radPr>
+                          <m:degHide m:val="on"/>
+                          <m:ctrlPr>
+                            <a:rPr lang="en-US" b="0" i="1" smtClean="0">
+                              <a:latin typeface="Cambria Math" panose="02040503050406030204" pitchFamily="18" charset="0"/>
+                            </a:rPr>
+                          </m:ctrlPr>
+                        </m:radPr>
+                        <m:deg/>
+                        <m:e>
+                          <m:sSup>
+                            <m:sSupPr>
+                              <m:ctrlPr>
+                                <a:rPr lang="en-US" b="0" i="1" smtClean="0">
+                                  <a:latin typeface="Cambria Math" panose="02040503050406030204" pitchFamily="18" charset="0"/>
+                                </a:rPr>
+                              </m:ctrlPr>
+                            </m:sSupPr>
+                            <m:e>
+                              <m:r>
+                                <a:rPr lang="en-US" b="0" i="1" smtClean="0">
+                                  <a:latin typeface="Cambria Math" panose="02040503050406030204" pitchFamily="18" charset="0"/>
+                                </a:rPr>
+                                <m:t>𝑒</m:t>
+                              </m:r>
+                            </m:e>
+                            <m:sup>
+                              <m:sSubSup>
+                                <m:sSubSupPr>
+                                  <m:ctrlPr>
+                                    <a:rPr lang="en-US" b="0" i="1" smtClean="0">
+                                      <a:latin typeface="Cambria Math" panose="02040503050406030204" pitchFamily="18" charset="0"/>
+                                      <a:ea typeface="Cambria Math" panose="02040503050406030204" pitchFamily="18" charset="0"/>
+                                    </a:rPr>
+                                  </m:ctrlPr>
+                                </m:sSubSupPr>
+                                <m:e>
+                                  <m:r>
+                                    <a:rPr lang="en-US" i="1">
+                                      <a:latin typeface="Cambria Math" panose="02040503050406030204" pitchFamily="18" charset="0"/>
+                                      <a:ea typeface="Cambria Math" panose="02040503050406030204" pitchFamily="18" charset="0"/>
+                                    </a:rPr>
+                                    <m:t>𝜎</m:t>
+                                  </m:r>
+                                </m:e>
+                                <m:sub>
+                                  <m:r>
+                                    <a:rPr lang="en-US" i="1">
+                                      <a:latin typeface="Cambria Math" panose="02040503050406030204" pitchFamily="18" charset="0"/>
+                                      <a:ea typeface="Cambria Math" panose="02040503050406030204" pitchFamily="18" charset="0"/>
+                                    </a:rPr>
+                                    <m:t>𝑙𝑜𝑔𝑛𝑜𝑟𝑚𝑎𝑙</m:t>
+                                  </m:r>
+                                </m:sub>
+                                <m:sup>
+                                  <m:r>
+                                    <a:rPr lang="en-US" b="0" i="1" smtClean="0">
+                                      <a:latin typeface="Cambria Math" panose="02040503050406030204" pitchFamily="18" charset="0"/>
+                                      <a:ea typeface="Cambria Math" panose="02040503050406030204" pitchFamily="18" charset="0"/>
+                                    </a:rPr>
+                                    <m:t>2</m:t>
+                                  </m:r>
+                                </m:sup>
+                              </m:sSubSup>
+                            </m:sup>
+                          </m:sSup>
+                          <m:r>
+                            <a:rPr lang="en-US" b="0" i="1" smtClean="0">
+                              <a:latin typeface="Cambria Math" panose="02040503050406030204" pitchFamily="18" charset="0"/>
+                              <a:ea typeface="Cambria Math" panose="02040503050406030204" pitchFamily="18" charset="0"/>
+                            </a:rPr>
+                            <m:t>−</m:t>
+                          </m:r>
+                          <m:r>
+                            <a:rPr lang="en-US" b="0" i="1" smtClean="0">
+                              <a:latin typeface="Cambria Math" panose="02040503050406030204" pitchFamily="18" charset="0"/>
+                              <a:ea typeface="Cambria Math" panose="02040503050406030204" pitchFamily="18" charset="0"/>
+                            </a:rPr>
+                            <m:t>1</m:t>
+                          </m:r>
+                        </m:e>
+                      </m:rad>
+                    </m:oMath>
+                  </m:oMathPara>
+                </a14:m>
+                <a:endParaRPr lang="en-US" dirty="0" smtClean="0"/>
+              </a:p>
+              <a:p>
+                <a:pPr marL="0" indent="0">
+                  <a:buNone/>
+                </a:pPr>
+                <a:r>
+                  <a:rPr lang="en-US" dirty="0" smtClean="0"/>
+                  <a:t>Therefore:</a:t>
+                </a:r>
+              </a:p>
+              <a:p>
+                <a:pPr marL="0" indent="0">
+                  <a:buNone/>
+                </a:pPr>
+                <a14:m>
+                  <m:oMathPara xmlns:m="http://schemas.openxmlformats.org/officeDocument/2006/math">
+                    <m:oMathParaPr>
+                      <m:jc m:val="centerGroup"/>
+                    </m:oMathParaPr>
+                    <m:oMath xmlns:m="http://schemas.openxmlformats.org/officeDocument/2006/math">
+                      <m:sSubSup>
+                        <m:sSubSupPr>
+                          <m:ctrlPr>
+                            <a:rPr lang="en-US" i="1">
+                              <a:latin typeface="Cambria Math" panose="02040503050406030204" pitchFamily="18" charset="0"/>
+                              <a:ea typeface="Cambria Math" panose="02040503050406030204" pitchFamily="18" charset="0"/>
+                            </a:rPr>
+                          </m:ctrlPr>
+                        </m:sSubSupPr>
+                        <m:e>
+                          <m:r>
+                            <a:rPr lang="en-US" i="1">
+                              <a:latin typeface="Cambria Math" panose="02040503050406030204" pitchFamily="18" charset="0"/>
+                              <a:ea typeface="Cambria Math" panose="02040503050406030204" pitchFamily="18" charset="0"/>
+                            </a:rPr>
+                            <m:t>𝜎</m:t>
+                          </m:r>
+                        </m:e>
+                        <m:sub>
+                          <m:r>
+                            <a:rPr lang="en-US" i="1">
+                              <a:latin typeface="Cambria Math" panose="02040503050406030204" pitchFamily="18" charset="0"/>
+                              <a:ea typeface="Cambria Math" panose="02040503050406030204" pitchFamily="18" charset="0"/>
+                            </a:rPr>
+                            <m:t>𝑙𝑜𝑔𝑛𝑜𝑟𝑚𝑎𝑙</m:t>
+                          </m:r>
+                        </m:sub>
+                        <m:sup>
+                          <m:r>
+                            <a:rPr lang="en-US" i="1">
+                              <a:latin typeface="Cambria Math" panose="02040503050406030204" pitchFamily="18" charset="0"/>
+                              <a:ea typeface="Cambria Math" panose="02040503050406030204" pitchFamily="18" charset="0"/>
+                            </a:rPr>
+                            <m:t>2</m:t>
+                          </m:r>
+                        </m:sup>
+                      </m:sSubSup>
+                      <m:r>
+                        <a:rPr lang="en-US" b="0" i="1" smtClean="0">
+                          <a:latin typeface="Cambria Math" panose="02040503050406030204" pitchFamily="18" charset="0"/>
+                          <a:ea typeface="Cambria Math" panose="02040503050406030204" pitchFamily="18" charset="0"/>
+                        </a:rPr>
+                        <m:t>=</m:t>
+                      </m:r>
+                      <m:func>
+                        <m:funcPr>
+                          <m:ctrlPr>
+                            <a:rPr lang="en-US" b="0" i="1" smtClean="0">
+                              <a:latin typeface="Cambria Math" panose="02040503050406030204" pitchFamily="18" charset="0"/>
+                              <a:ea typeface="Cambria Math" panose="02040503050406030204" pitchFamily="18" charset="0"/>
+                            </a:rPr>
+                          </m:ctrlPr>
+                        </m:funcPr>
+                        <m:fName>
+                          <m:r>
+                            <m:rPr>
+                              <m:sty m:val="p"/>
+                            </m:rPr>
+                            <a:rPr lang="en-US" b="0" i="0" smtClean="0">
+                              <a:latin typeface="Cambria Math" panose="02040503050406030204" pitchFamily="18" charset="0"/>
+                              <a:ea typeface="Cambria Math" panose="02040503050406030204" pitchFamily="18" charset="0"/>
+                            </a:rPr>
+                            <m:t>log</m:t>
+                          </m:r>
+                        </m:fName>
+                        <m:e>
+                          <m:d>
+                            <m:dPr>
+                              <m:ctrlPr>
+                                <a:rPr lang="en-US" b="0" i="1" smtClean="0">
+                                  <a:latin typeface="Cambria Math" panose="02040503050406030204" pitchFamily="18" charset="0"/>
+                                  <a:ea typeface="Cambria Math" panose="02040503050406030204" pitchFamily="18" charset="0"/>
+                                </a:rPr>
+                              </m:ctrlPr>
+                            </m:dPr>
+                            <m:e>
+                              <m:r>
+                                <a:rPr lang="en-US" i="1">
+                                  <a:latin typeface="Cambria Math" panose="02040503050406030204" pitchFamily="18" charset="0"/>
+                                </a:rPr>
+                                <m:t>𝐶</m:t>
+                              </m:r>
+                              <m:sSup>
+                                <m:sSupPr>
+                                  <m:ctrlPr>
+                                    <a:rPr lang="en-US" b="0" i="1" smtClean="0">
+                                      <a:latin typeface="Cambria Math" panose="02040503050406030204" pitchFamily="18" charset="0"/>
+                                    </a:rPr>
+                                  </m:ctrlPr>
+                                </m:sSupPr>
+                                <m:e>
+                                  <m:r>
+                                    <a:rPr lang="en-US" i="1">
+                                      <a:latin typeface="Cambria Math" panose="02040503050406030204" pitchFamily="18" charset="0"/>
+                                    </a:rPr>
+                                    <m:t>𝑉</m:t>
+                                  </m:r>
+                                </m:e>
+                                <m:sup>
+                                  <m:r>
+                                    <a:rPr lang="en-US" b="0" i="1" smtClean="0">
+                                      <a:latin typeface="Cambria Math" panose="02040503050406030204" pitchFamily="18" charset="0"/>
+                                    </a:rPr>
+                                    <m:t>2</m:t>
+                                  </m:r>
+                                </m:sup>
+                              </m:sSup>
+                              <m:r>
+                                <a:rPr lang="en-US" b="0" i="1" smtClean="0">
+                                  <a:latin typeface="Cambria Math" panose="02040503050406030204" pitchFamily="18" charset="0"/>
+                                </a:rPr>
+                                <m:t>+</m:t>
+                              </m:r>
+                              <m:r>
+                                <a:rPr lang="en-US" b="0" i="1" smtClean="0">
+                                  <a:latin typeface="Cambria Math" panose="02040503050406030204" pitchFamily="18" charset="0"/>
+                                </a:rPr>
+                                <m:t>1</m:t>
+                              </m:r>
+                            </m:e>
+                          </m:d>
+                        </m:e>
+                      </m:func>
+                    </m:oMath>
+                  </m:oMathPara>
+                </a14:m>
+                <a:endParaRPr lang="en-US" dirty="0" smtClean="0"/>
+              </a:p>
+            </p:txBody>
+          </p:sp>
+        </mc:Choice>
+        <mc:Fallback>
+          <p:sp>
+            <p:nvSpPr>
+              <p:cNvPr id="3" name="Content Placeholder 2"/>
+              <p:cNvSpPr>
+                <a:spLocks noGrp="1" noRot="1" noChangeAspect="1" noMove="1" noResize="1" noEditPoints="1" noAdjustHandles="1" noChangeArrowheads="1" noChangeShapeType="1" noTextEdit="1"/>
+              </p:cNvSpPr>
+              <p:nvPr>
+                <p:ph idx="1"/>
+              </p:nvPr>
+            </p:nvSpPr>
+            <p:spPr>
+              <a:blipFill>
+                <a:blip r:embed="rId2"/>
+                <a:stretch>
+                  <a:fillRect l="-1424" t="-1026" r="-542"/>
+                </a:stretch>
+              </a:blipFill>
+            </p:spPr>
+            <p:txBody>
+              <a:bodyPr/>
+              <a:lstStyle/>
+              <a:p>
+                <a:r>
+                  <a:rPr lang="en-GB">
+                    <a:noFill/>
+                  </a:rPr>
+                  <a:t> </a:t>
+                </a:r>
+              </a:p>
+            </p:txBody>
+          </p:sp>
+        </mc:Fallback>
+      </mc:AlternateContent>
+    </p:spTree>
+    <p:extLst>
+      <p:ext uri="{BB962C8B-B14F-4D97-AF65-F5344CB8AC3E}">
+        <p14:creationId xmlns:p14="http://schemas.microsoft.com/office/powerpoint/2010/main" val="3664574696"/>
+      </p:ext>
+    </p:extLst>
+  </p:cSld>
+  <p:clrMapOvr>
+    <a:masterClrMapping/>
+  </p:clrMapOvr>
+  <p:timing>
+    <p:tnLst>
+      <p:par>
+        <p:cTn id="1" dur="indefinite" restart="never" nodeType="tmRoot"/>
+      </p:par>
+    </p:tnLst>
+  </p:timing>
+</p:sld>
+</file>
+
+<file path=ppt/slides/slide17.xml><?xml version="1.0" encoding="utf-8"?>
+<p:sld xmlns:a="http://schemas.openxmlformats.org/drawingml/2006/main" xmlns:r="http://schemas.openxmlformats.org/officeDocument/2006/relationships" xmlns:p="http://schemas.openxmlformats.org/presentationml/2006/main">
+  <p:cSld>
+    <p:spTree>
+      <p:nvGrpSpPr>
+        <p:cNvPr id="1" name=""/>
+        <p:cNvGrpSpPr/>
+        <p:nvPr/>
+      </p:nvGrpSpPr>
+      <p:grpSpPr>
+        <a:xfrm>
+          <a:off x="0" y="0"/>
+          <a:ext cx="0" cy="0"/>
+          <a:chOff x="0" y="0"/>
+          <a:chExt cx="0" cy="0"/>
+        </a:xfrm>
+      </p:grpSpPr>
+      <p:sp>
+        <p:nvSpPr>
+          <p:cNvPr id="2" name="Title 1"/>
+          <p:cNvSpPr>
+            <a:spLocks noGrp="1"/>
+          </p:cNvSpPr>
+          <p:nvPr>
+            <p:ph type="title"/>
+          </p:nvPr>
+        </p:nvSpPr>
+        <p:spPr/>
+        <p:txBody>
+          <a:bodyPr/>
+          <a:lstStyle/>
+          <a:p>
+            <a:endParaRPr lang="en-GB"/>
+          </a:p>
+        </p:txBody>
+      </p:sp>
+      <p:sp>
+        <p:nvSpPr>
+          <p:cNvPr id="3" name="Content Placeholder 2"/>
+          <p:cNvSpPr>
+            <a:spLocks noGrp="1"/>
+          </p:cNvSpPr>
+          <p:nvPr>
+            <p:ph idx="1"/>
+          </p:nvPr>
+        </p:nvSpPr>
+        <p:spPr/>
+        <p:txBody>
+          <a:bodyPr/>
+          <a:lstStyle/>
+          <a:p>
+            <a:pPr marL="0" indent="0">
+              <a:buNone/>
+            </a:pPr>
+            <a:r>
+              <a:rPr lang="en-US" b="1" dirty="0" smtClean="0"/>
+              <a:t>Lab exercise</a:t>
+            </a:r>
+            <a:endParaRPr lang="en-US" dirty="0" smtClean="0"/>
+          </a:p>
+          <a:p>
+            <a:pPr marL="0" indent="0">
+              <a:buNone/>
+            </a:pPr>
+            <a:endParaRPr lang="en-US" b="1" dirty="0"/>
+          </a:p>
+          <a:p>
+            <a:pPr marL="0" indent="0">
+              <a:buNone/>
+            </a:pPr>
+            <a:r>
+              <a:rPr lang="en-US" b="1" dirty="0" smtClean="0"/>
+              <a:t>[Add sampling variance and re-run]</a:t>
+            </a:r>
+            <a:endParaRPr lang="en-US" b="1" dirty="0" smtClean="0"/>
+          </a:p>
+        </p:txBody>
+      </p:sp>
+    </p:spTree>
+    <p:extLst>
+      <p:ext uri="{BB962C8B-B14F-4D97-AF65-F5344CB8AC3E}">
+        <p14:creationId xmlns:p14="http://schemas.microsoft.com/office/powerpoint/2010/main" val="2973171029"/>
+      </p:ext>
+    </p:extLst>
+  </p:cSld>
+  <p:clrMapOvr>
+    <a:masterClrMapping/>
+  </p:clrMapOvr>
+  <p:timing>
+    <p:tnLst>
+      <p:par>
+        <p:cTn id="1" dur="indefinite" restart="never" nodeType="tmRoot"/>
+      </p:par>
+    </p:tnLst>
+  </p:timing>
+</p:sld>
+</file>
+
+<file path=ppt/slides/slide18.xml><?xml version="1.0" encoding="utf-8"?>
+<p:sld xmlns:a="http://schemas.openxmlformats.org/drawingml/2006/main" xmlns:r="http://schemas.openxmlformats.org/officeDocument/2006/relationships" xmlns:p="http://schemas.openxmlformats.org/presentationml/2006/main">
+  <p:cSld>
+    <p:spTree>
+      <p:nvGrpSpPr>
+        <p:cNvPr id="1" name=""/>
+        <p:cNvGrpSpPr/>
+        <p:nvPr/>
+      </p:nvGrpSpPr>
+      <p:grpSpPr>
+        <a:xfrm>
+          <a:off x="0" y="0"/>
+          <a:ext cx="0" cy="0"/>
+          <a:chOff x="0" y="0"/>
+          <a:chExt cx="0" cy="0"/>
+        </a:xfrm>
+      </p:grpSpPr>
+      <p:sp>
+        <p:nvSpPr>
+          <p:cNvPr id="2" name="Title 1"/>
+          <p:cNvSpPr>
+            <a:spLocks noGrp="1"/>
+          </p:cNvSpPr>
+          <p:nvPr>
+            <p:ph type="title"/>
+          </p:nvPr>
+        </p:nvSpPr>
+        <p:spPr/>
+        <p:txBody>
+          <a:bodyPr/>
+          <a:lstStyle/>
+          <a:p>
+            <a:endParaRPr lang="en-GB"/>
+          </a:p>
+        </p:txBody>
+      </p:sp>
+      <p:sp>
+        <p:nvSpPr>
+          <p:cNvPr id="3" name="Content Placeholder 2"/>
+          <p:cNvSpPr>
+            <a:spLocks noGrp="1"/>
+          </p:cNvSpPr>
+          <p:nvPr>
+            <p:ph idx="1"/>
+          </p:nvPr>
+        </p:nvSpPr>
+        <p:spPr>
+          <a:xfrm>
+            <a:off x="76200" y="838200"/>
+            <a:ext cx="8991600" cy="5943600"/>
+          </a:xfrm>
+        </p:spPr>
+        <p:txBody>
+          <a:bodyPr/>
+          <a:lstStyle/>
+          <a:p>
+            <a:pPr marL="0" indent="0">
+              <a:buNone/>
+            </a:pPr>
+            <a:r>
+              <a:rPr lang="en-US" b="1" dirty="0" smtClean="0"/>
+              <a:t>Alaska pollock</a:t>
+            </a:r>
+          </a:p>
+          <a:p>
+            <a:pPr marL="0" indent="0">
+              <a:buNone/>
+            </a:pPr>
+            <a:endParaRPr lang="en-US" b="1" dirty="0"/>
+          </a:p>
+          <a:p>
+            <a:pPr marL="0" indent="0">
+              <a:buNone/>
+            </a:pPr>
+            <a:r>
+              <a:rPr lang="en-US" dirty="0" smtClean="0"/>
+              <a:t>Is this converged?</a:t>
+            </a:r>
+          </a:p>
+          <a:p>
+            <a:pPr marL="0" indent="0">
+              <a:buNone/>
+            </a:pPr>
+            <a:endParaRPr lang="en-US" dirty="0"/>
+          </a:p>
+          <a:p>
+            <a:pPr marL="0" indent="0">
+              <a:buNone/>
+            </a:pPr>
+            <a:r>
+              <a:rPr lang="en-US" dirty="0" smtClean="0"/>
+              <a:t>How to modify?</a:t>
+            </a:r>
+          </a:p>
+          <a:p>
+            <a:pPr marL="0" indent="0">
+              <a:buNone/>
+            </a:pPr>
+            <a:endParaRPr lang="en-US" dirty="0" smtClean="0"/>
+          </a:p>
+          <a:p>
+            <a:pPr marL="0" indent="0">
+              <a:buNone/>
+            </a:pPr>
+            <a:endParaRPr lang="en-US" dirty="0" smtClean="0"/>
+          </a:p>
+          <a:p>
+            <a:pPr marL="457200" lvl="1" indent="0">
+              <a:buNone/>
+            </a:pPr>
+            <a:endParaRPr lang="en-US" dirty="0" smtClean="0"/>
+          </a:p>
+        </p:txBody>
+      </p:sp>
+      <p:graphicFrame>
+        <p:nvGraphicFramePr>
+          <p:cNvPr id="7" name="Table 6"/>
+          <p:cNvGraphicFramePr>
+            <a:graphicFrameLocks noGrp="1"/>
+          </p:cNvGraphicFramePr>
+          <p:nvPr>
+            <p:extLst>
+              <p:ext uri="{D42A27DB-BD31-4B8C-83A1-F6EECF244321}">
+                <p14:modId xmlns:p14="http://schemas.microsoft.com/office/powerpoint/2010/main" val="641891090"/>
+              </p:ext>
+            </p:extLst>
+          </p:nvPr>
+        </p:nvGraphicFramePr>
+        <p:xfrm>
+          <a:off x="647076" y="4556760"/>
+          <a:ext cx="6095999" cy="2355850"/>
+        </p:xfrm>
+        <a:graphic>
+          <a:graphicData uri="http://schemas.openxmlformats.org/drawingml/2006/table">
+            <a:tbl>
+              <a:tblPr firstRow="1" bandRow="1">
+                <a:tableStyleId>{5C22544A-7EE6-4342-B048-85BDC9FD1C3A}</a:tableStyleId>
+              </a:tblPr>
+              <a:tblGrid>
+                <a:gridCol w="870857">
+                  <a:extLst>
+                    <a:ext uri="{9D8B030D-6E8A-4147-A177-3AD203B41FA5}">
+                      <a16:colId xmlns:a16="http://schemas.microsoft.com/office/drawing/2014/main" val="2929900390"/>
+                    </a:ext>
+                  </a:extLst>
+                </a:gridCol>
+                <a:gridCol w="870857">
+                  <a:extLst>
+                    <a:ext uri="{9D8B030D-6E8A-4147-A177-3AD203B41FA5}">
+                      <a16:colId xmlns:a16="http://schemas.microsoft.com/office/drawing/2014/main" val="582206649"/>
+                    </a:ext>
+                  </a:extLst>
+                </a:gridCol>
+                <a:gridCol w="870857">
+                  <a:extLst>
+                    <a:ext uri="{9D8B030D-6E8A-4147-A177-3AD203B41FA5}">
+                      <a16:colId xmlns:a16="http://schemas.microsoft.com/office/drawing/2014/main" val="4134810510"/>
+                    </a:ext>
+                  </a:extLst>
+                </a:gridCol>
+                <a:gridCol w="870857">
+                  <a:extLst>
+                    <a:ext uri="{9D8B030D-6E8A-4147-A177-3AD203B41FA5}">
+                      <a16:colId xmlns:a16="http://schemas.microsoft.com/office/drawing/2014/main" val="955040813"/>
+                    </a:ext>
+                  </a:extLst>
+                </a:gridCol>
+                <a:gridCol w="870857">
+                  <a:extLst>
+                    <a:ext uri="{9D8B030D-6E8A-4147-A177-3AD203B41FA5}">
+                      <a16:colId xmlns:a16="http://schemas.microsoft.com/office/drawing/2014/main" val="3654415663"/>
+                    </a:ext>
+                  </a:extLst>
+                </a:gridCol>
+                <a:gridCol w="870857">
+                  <a:extLst>
+                    <a:ext uri="{9D8B030D-6E8A-4147-A177-3AD203B41FA5}">
+                      <a16:colId xmlns:a16="http://schemas.microsoft.com/office/drawing/2014/main" val="2026900679"/>
+                    </a:ext>
+                  </a:extLst>
+                </a:gridCol>
+                <a:gridCol w="870857">
+                  <a:extLst>
+                    <a:ext uri="{9D8B030D-6E8A-4147-A177-3AD203B41FA5}">
+                      <a16:colId xmlns:a16="http://schemas.microsoft.com/office/drawing/2014/main" val="2562458432"/>
+                    </a:ext>
+                  </a:extLst>
+                </a:gridCol>
+              </a:tblGrid>
+              <a:tr h="370840">
+                <a:tc>
+                  <a:txBody>
+                    <a:bodyPr/>
+                    <a:lstStyle/>
+                    <a:p>
+                      <a:pPr algn="l" fontAlgn="b"/>
+                      <a:r>
+                        <a:rPr lang="en-GB" sz="1400" b="0" i="0" u="none" strike="noStrike" dirty="0" err="1">
+                          <a:solidFill>
+                            <a:srgbClr val="000000"/>
+                          </a:solidFill>
+                          <a:effectLst/>
+                          <a:latin typeface="Calibri" panose="020F0502020204030204" pitchFamily="34" charset="0"/>
+                        </a:rPr>
+                        <a:t>Param</a:t>
+                      </a:r>
+                      <a:endParaRPr lang="en-GB" sz="1400" b="0" i="0" u="none" strike="noStrike" dirty="0">
+                        <a:solidFill>
+                          <a:srgbClr val="000000"/>
+                        </a:solidFill>
+                        <a:effectLst/>
+                        <a:latin typeface="Calibri" panose="020F0502020204030204" pitchFamily="34" charset="0"/>
+                      </a:endParaRPr>
+                    </a:p>
+                  </a:txBody>
+                  <a:tcPr marL="9525" marR="9525" marT="9525" marB="0" anchor="b"/>
+                </a:tc>
+                <a:tc>
+                  <a:txBody>
+                    <a:bodyPr/>
+                    <a:lstStyle/>
+                    <a:p>
+                      <a:pPr algn="l" fontAlgn="b"/>
+                      <a:r>
+                        <a:rPr lang="en-GB" sz="1400" b="0" i="0" u="none" strike="noStrike" dirty="0" smtClean="0">
+                          <a:solidFill>
+                            <a:srgbClr val="000000"/>
+                          </a:solidFill>
+                          <a:effectLst/>
+                          <a:latin typeface="Calibri" panose="020F0502020204030204" pitchFamily="34" charset="0"/>
+                        </a:rPr>
+                        <a:t>Starting</a:t>
+                      </a:r>
+                      <a:r>
+                        <a:rPr lang="en-GB" sz="1400" b="0" i="0" u="none" strike="noStrike" baseline="0" dirty="0" smtClean="0">
+                          <a:solidFill>
+                            <a:srgbClr val="000000"/>
+                          </a:solidFill>
+                          <a:effectLst/>
+                          <a:latin typeface="Calibri" panose="020F0502020204030204" pitchFamily="34" charset="0"/>
+                        </a:rPr>
+                        <a:t> </a:t>
+                      </a:r>
+                      <a:r>
+                        <a:rPr lang="en-GB" sz="1400" b="0" i="0" u="none" strike="noStrike" dirty="0" smtClean="0">
+                          <a:solidFill>
+                            <a:srgbClr val="000000"/>
+                          </a:solidFill>
+                          <a:effectLst/>
+                          <a:latin typeface="Calibri" panose="020F0502020204030204" pitchFamily="34" charset="0"/>
+                        </a:rPr>
+                        <a:t>value</a:t>
+                      </a:r>
+                      <a:endParaRPr lang="en-GB" sz="1400" b="0" i="0" u="none" strike="noStrike" dirty="0">
+                        <a:solidFill>
+                          <a:srgbClr val="000000"/>
+                        </a:solidFill>
+                        <a:effectLst/>
+                        <a:latin typeface="Calibri" panose="020F0502020204030204" pitchFamily="34" charset="0"/>
+                      </a:endParaRPr>
+                    </a:p>
+                  </a:txBody>
+                  <a:tcPr marL="9525" marR="9525" marT="9525" marB="0" anchor="b"/>
+                </a:tc>
+                <a:tc>
+                  <a:txBody>
+                    <a:bodyPr/>
+                    <a:lstStyle/>
+                    <a:p>
+                      <a:pPr algn="l" fontAlgn="b"/>
+                      <a:r>
+                        <a:rPr lang="en-GB" sz="1400" b="0" i="0" u="none" strike="noStrike" dirty="0">
+                          <a:solidFill>
+                            <a:srgbClr val="000000"/>
+                          </a:solidFill>
+                          <a:effectLst/>
+                          <a:latin typeface="Calibri" panose="020F0502020204030204" pitchFamily="34" charset="0"/>
+                        </a:rPr>
+                        <a:t>Lower</a:t>
+                      </a:r>
+                    </a:p>
+                  </a:txBody>
+                  <a:tcPr marL="9525" marR="9525" marT="9525" marB="0" anchor="b"/>
+                </a:tc>
+                <a:tc>
+                  <a:txBody>
+                    <a:bodyPr/>
+                    <a:lstStyle/>
+                    <a:p>
+                      <a:pPr algn="l" fontAlgn="b"/>
+                      <a:r>
+                        <a:rPr lang="en-GB" sz="1400" b="0" i="0" u="none" strike="noStrike" dirty="0">
+                          <a:solidFill>
+                            <a:srgbClr val="000000"/>
+                          </a:solidFill>
+                          <a:effectLst/>
+                          <a:latin typeface="Calibri" panose="020F0502020204030204" pitchFamily="34" charset="0"/>
+                        </a:rPr>
+                        <a:t>MLE</a:t>
+                      </a:r>
+                    </a:p>
+                  </a:txBody>
+                  <a:tcPr marL="9525" marR="9525" marT="9525" marB="0" anchor="b"/>
+                </a:tc>
+                <a:tc>
+                  <a:txBody>
+                    <a:bodyPr/>
+                    <a:lstStyle/>
+                    <a:p>
+                      <a:pPr algn="l" fontAlgn="b"/>
+                      <a:r>
+                        <a:rPr lang="en-GB" sz="1400" b="0" i="0" u="none" strike="noStrike" dirty="0">
+                          <a:solidFill>
+                            <a:srgbClr val="000000"/>
+                          </a:solidFill>
+                          <a:effectLst/>
+                          <a:latin typeface="Calibri" panose="020F0502020204030204" pitchFamily="34" charset="0"/>
+                        </a:rPr>
+                        <a:t>Upper</a:t>
+                      </a:r>
+                    </a:p>
+                  </a:txBody>
+                  <a:tcPr marL="9525" marR="9525" marT="9525" marB="0" anchor="b"/>
+                </a:tc>
+                <a:tc>
+                  <a:txBody>
+                    <a:bodyPr/>
+                    <a:lstStyle/>
+                    <a:p>
+                      <a:pPr algn="l" fontAlgn="b"/>
+                      <a:r>
+                        <a:rPr lang="en-GB" sz="1400" b="0" i="0" u="none" strike="noStrike" dirty="0" smtClean="0">
+                          <a:solidFill>
+                            <a:srgbClr val="000000"/>
+                          </a:solidFill>
+                          <a:effectLst/>
+                          <a:latin typeface="Calibri" panose="020F0502020204030204" pitchFamily="34" charset="0"/>
+                        </a:rPr>
+                        <a:t>Final</a:t>
+                      </a:r>
+                      <a:r>
+                        <a:rPr lang="en-GB" sz="1400" b="0" i="0" u="none" strike="noStrike" baseline="0" dirty="0" smtClean="0">
+                          <a:solidFill>
+                            <a:srgbClr val="000000"/>
+                          </a:solidFill>
+                          <a:effectLst/>
+                          <a:latin typeface="Calibri" panose="020F0502020204030204" pitchFamily="34" charset="0"/>
+                        </a:rPr>
+                        <a:t> </a:t>
+                      </a:r>
+                      <a:r>
+                        <a:rPr lang="en-GB" sz="1400" b="0" i="0" u="none" strike="noStrike" dirty="0" smtClean="0">
+                          <a:solidFill>
+                            <a:srgbClr val="000000"/>
+                          </a:solidFill>
+                          <a:effectLst/>
+                          <a:latin typeface="Calibri" panose="020F0502020204030204" pitchFamily="34" charset="0"/>
+                        </a:rPr>
+                        <a:t>gradient</a:t>
+                      </a:r>
+                      <a:endParaRPr lang="en-GB" sz="1400" b="0" i="0" u="none" strike="noStrike" dirty="0">
+                        <a:solidFill>
+                          <a:srgbClr val="000000"/>
+                        </a:solidFill>
+                        <a:effectLst/>
+                        <a:latin typeface="Calibri" panose="020F0502020204030204" pitchFamily="34" charset="0"/>
+                      </a:endParaRPr>
+                    </a:p>
+                  </a:txBody>
+                  <a:tcPr marL="9525" marR="9525" marT="9525" marB="0" anchor="b"/>
+                </a:tc>
+                <a:tc>
+                  <a:txBody>
+                    <a:bodyPr/>
+                    <a:lstStyle/>
+                    <a:p>
+                      <a:pPr algn="l" fontAlgn="b"/>
+                      <a:r>
+                        <a:rPr lang="en-GB" sz="1400" b="0" i="0" u="none" strike="noStrike" dirty="0">
+                          <a:solidFill>
+                            <a:srgbClr val="000000"/>
+                          </a:solidFill>
+                          <a:effectLst/>
+                          <a:latin typeface="Calibri" panose="020F0502020204030204" pitchFamily="34" charset="0"/>
+                        </a:rPr>
+                        <a:t>Std. Error</a:t>
+                      </a:r>
+                    </a:p>
+                  </a:txBody>
+                  <a:tcPr marL="9525" marR="9525" marT="9525" marB="0" anchor="b"/>
+                </a:tc>
+                <a:extLst>
+                  <a:ext uri="{0D108BD9-81ED-4DB2-BD59-A6C34878D82A}">
+                    <a16:rowId xmlns:a16="http://schemas.microsoft.com/office/drawing/2014/main" val="3473302007"/>
+                  </a:ext>
+                </a:extLst>
+              </a:tr>
+              <a:tr h="370840">
+                <a:tc>
+                  <a:txBody>
+                    <a:bodyPr/>
+                    <a:lstStyle/>
+                    <a:p>
+                      <a:pPr algn="l" fontAlgn="b"/>
+                      <a:r>
+                        <a:rPr lang="en-GB" sz="1400" b="0" i="0" u="none" strike="noStrike">
+                          <a:solidFill>
+                            <a:srgbClr val="000000"/>
+                          </a:solidFill>
+                          <a:effectLst/>
+                          <a:latin typeface="Calibri" panose="020F0502020204030204" pitchFamily="34" charset="0"/>
+                        </a:rPr>
+                        <a:t>log_d0</a:t>
+                      </a:r>
+                    </a:p>
+                  </a:txBody>
+                  <a:tcPr marL="9525" marR="9525" marT="9525" marB="0" anchor="b"/>
+                </a:tc>
+                <a:tc>
+                  <a:txBody>
+                    <a:bodyPr/>
+                    <a:lstStyle/>
+                    <a:p>
+                      <a:pPr algn="ctr" fontAlgn="b"/>
+                      <a:r>
+                        <a:rPr lang="en-GB" sz="1400" b="0" i="0" u="none" strike="noStrike" dirty="0">
+                          <a:solidFill>
+                            <a:srgbClr val="000000"/>
+                          </a:solidFill>
+                          <a:effectLst/>
+                          <a:latin typeface="Calibri" panose="020F0502020204030204" pitchFamily="34" charset="0"/>
+                        </a:rPr>
+                        <a:t>0</a:t>
+                      </a:r>
+                    </a:p>
+                  </a:txBody>
+                  <a:tcPr marL="9525" marR="9525" marT="9525" marB="0" anchor="b"/>
+                </a:tc>
+                <a:tc>
+                  <a:txBody>
+                    <a:bodyPr/>
+                    <a:lstStyle/>
+                    <a:p>
+                      <a:pPr algn="ctr" fontAlgn="b"/>
+                      <a:r>
+                        <a:rPr lang="en-GB" sz="1400" b="0" i="0" u="none" strike="noStrike" dirty="0" smtClean="0">
+                          <a:solidFill>
+                            <a:srgbClr val="000000"/>
+                          </a:solidFill>
+                          <a:effectLst/>
+                          <a:latin typeface="Calibri" panose="020F0502020204030204" pitchFamily="34" charset="0"/>
+                        </a:rPr>
+                        <a:t>-</a:t>
+                      </a:r>
+                      <a:r>
+                        <a:rPr lang="en-GB" sz="1400" b="0" i="0" u="none" strike="noStrike" dirty="0" err="1" smtClean="0">
+                          <a:solidFill>
+                            <a:srgbClr val="000000"/>
+                          </a:solidFill>
+                          <a:effectLst/>
+                          <a:latin typeface="Calibri" panose="020F0502020204030204" pitchFamily="34" charset="0"/>
+                        </a:rPr>
+                        <a:t>Inf</a:t>
+                      </a:r>
+                      <a:endParaRPr lang="en-GB" sz="1400" b="0" i="0" u="none" strike="noStrike" dirty="0">
+                        <a:solidFill>
+                          <a:srgbClr val="000000"/>
+                        </a:solidFill>
+                        <a:effectLst/>
+                        <a:latin typeface="Calibri" panose="020F0502020204030204" pitchFamily="34" charset="0"/>
+                      </a:endParaRPr>
+                    </a:p>
+                  </a:txBody>
+                  <a:tcPr marL="9525" marR="9525" marT="9525" marB="0" anchor="b"/>
+                </a:tc>
+                <a:tc>
+                  <a:txBody>
+                    <a:bodyPr/>
+                    <a:lstStyle/>
+                    <a:p>
+                      <a:pPr algn="ctr" fontAlgn="b"/>
+                      <a:r>
+                        <a:rPr lang="en-GB" sz="1400" b="0" i="0" u="none" strike="noStrike">
+                          <a:solidFill>
+                            <a:srgbClr val="000000"/>
+                          </a:solidFill>
+                          <a:effectLst/>
+                          <a:latin typeface="Calibri" panose="020F0502020204030204" pitchFamily="34" charset="0"/>
+                        </a:rPr>
+                        <a:t>4.21494</a:t>
+                      </a:r>
+                    </a:p>
+                  </a:txBody>
+                  <a:tcPr marL="9525" marR="9525" marT="9525" marB="0" anchor="b"/>
+                </a:tc>
+                <a:tc>
+                  <a:txBody>
+                    <a:bodyPr/>
+                    <a:lstStyle/>
+                    <a:p>
+                      <a:pPr algn="ctr" fontAlgn="b"/>
+                      <a:r>
+                        <a:rPr lang="en-GB" sz="1400" b="0" i="0" u="none" strike="noStrike">
+                          <a:solidFill>
+                            <a:srgbClr val="000000"/>
+                          </a:solidFill>
+                          <a:effectLst/>
+                          <a:latin typeface="Calibri" panose="020F0502020204030204" pitchFamily="34" charset="0"/>
+                        </a:rPr>
+                        <a:t>Inf</a:t>
+                      </a:r>
+                    </a:p>
+                  </a:txBody>
+                  <a:tcPr marL="9525" marR="9525" marT="9525" marB="0" anchor="b"/>
+                </a:tc>
+                <a:tc>
+                  <a:txBody>
+                    <a:bodyPr/>
+                    <a:lstStyle/>
+                    <a:p>
+                      <a:pPr algn="ctr" fontAlgn="b"/>
+                      <a:r>
+                        <a:rPr lang="en-GB" sz="1400" b="0" i="0" u="none" strike="noStrike">
+                          <a:solidFill>
+                            <a:srgbClr val="000000"/>
+                          </a:solidFill>
+                          <a:effectLst/>
+                          <a:latin typeface="Calibri" panose="020F0502020204030204" pitchFamily="34" charset="0"/>
+                        </a:rPr>
+                        <a:t>2.35E-07</a:t>
+                      </a:r>
+                    </a:p>
+                  </a:txBody>
+                  <a:tcPr marL="9525" marR="9525" marT="9525" marB="0" anchor="b"/>
+                </a:tc>
+                <a:tc>
+                  <a:txBody>
+                    <a:bodyPr/>
+                    <a:lstStyle/>
+                    <a:p>
+                      <a:pPr algn="ctr" fontAlgn="b"/>
+                      <a:r>
+                        <a:rPr lang="en-GB" sz="1400" b="0" i="0" u="none" strike="noStrike">
+                          <a:solidFill>
+                            <a:srgbClr val="000000"/>
+                          </a:solidFill>
+                          <a:effectLst/>
+                          <a:latin typeface="Calibri" panose="020F0502020204030204" pitchFamily="34" charset="0"/>
+                        </a:rPr>
+                        <a:t>0.290923</a:t>
+                      </a:r>
+                    </a:p>
+                  </a:txBody>
+                  <a:tcPr marL="9525" marR="9525" marT="9525" marB="0" anchor="b"/>
+                </a:tc>
+                <a:extLst>
+                  <a:ext uri="{0D108BD9-81ED-4DB2-BD59-A6C34878D82A}">
+                    <a16:rowId xmlns:a16="http://schemas.microsoft.com/office/drawing/2014/main" val="2897939989"/>
+                  </a:ext>
+                </a:extLst>
+              </a:tr>
+              <a:tr h="370840">
+                <a:tc>
+                  <a:txBody>
+                    <a:bodyPr/>
+                    <a:lstStyle/>
+                    <a:p>
+                      <a:pPr algn="l" fontAlgn="b"/>
+                      <a:r>
+                        <a:rPr lang="en-GB" sz="1400" b="0" i="0" u="none" strike="noStrike">
+                          <a:solidFill>
+                            <a:srgbClr val="000000"/>
+                          </a:solidFill>
+                          <a:effectLst/>
+                          <a:latin typeface="Calibri" panose="020F0502020204030204" pitchFamily="34" charset="0"/>
+                        </a:rPr>
+                        <a:t>log_sigmaP</a:t>
+                      </a:r>
+                    </a:p>
+                  </a:txBody>
+                  <a:tcPr marL="9525" marR="9525" marT="9525" marB="0" anchor="b"/>
+                </a:tc>
+                <a:tc>
+                  <a:txBody>
+                    <a:bodyPr/>
+                    <a:lstStyle/>
+                    <a:p>
+                      <a:pPr algn="ctr" fontAlgn="b"/>
+                      <a:r>
+                        <a:rPr lang="en-GB" sz="1400" b="0" i="0" u="none" strike="noStrike">
+                          <a:solidFill>
+                            <a:srgbClr val="000000"/>
+                          </a:solidFill>
+                          <a:effectLst/>
+                          <a:latin typeface="Calibri" panose="020F0502020204030204" pitchFamily="34" charset="0"/>
+                        </a:rPr>
+                        <a:t>1</a:t>
+                      </a:r>
+                    </a:p>
+                  </a:txBody>
+                  <a:tcPr marL="9525" marR="9525" marT="9525" marB="0" anchor="b"/>
+                </a:tc>
+                <a:tc>
+                  <a:txBody>
+                    <a:bodyPr/>
+                    <a:lstStyle/>
+                    <a:p>
+                      <a:pPr algn="ctr" fontAlgn="b"/>
+                      <a:r>
+                        <a:rPr lang="en-GB" sz="1400" b="0" i="0" u="none" strike="noStrike" dirty="0" smtClean="0">
+                          <a:solidFill>
+                            <a:srgbClr val="000000"/>
+                          </a:solidFill>
+                          <a:effectLst/>
+                          <a:latin typeface="Calibri" panose="020F0502020204030204" pitchFamily="34" charset="0"/>
+                        </a:rPr>
+                        <a:t>-</a:t>
+                      </a:r>
+                      <a:r>
+                        <a:rPr lang="en-GB" sz="1400" b="0" i="0" u="none" strike="noStrike" dirty="0" err="1" smtClean="0">
+                          <a:solidFill>
+                            <a:srgbClr val="000000"/>
+                          </a:solidFill>
+                          <a:effectLst/>
+                          <a:latin typeface="Calibri" panose="020F0502020204030204" pitchFamily="34" charset="0"/>
+                        </a:rPr>
+                        <a:t>Inf</a:t>
+                      </a:r>
+                      <a:endParaRPr lang="en-GB" sz="1400" b="0" i="0" u="none" strike="noStrike" dirty="0">
+                        <a:solidFill>
+                          <a:srgbClr val="000000"/>
+                        </a:solidFill>
+                        <a:effectLst/>
+                        <a:latin typeface="Calibri" panose="020F0502020204030204" pitchFamily="34" charset="0"/>
+                      </a:endParaRPr>
+                    </a:p>
+                  </a:txBody>
+                  <a:tcPr marL="9525" marR="9525" marT="9525" marB="0" anchor="b"/>
+                </a:tc>
+                <a:tc>
+                  <a:txBody>
+                    <a:bodyPr/>
+                    <a:lstStyle/>
+                    <a:p>
+                      <a:pPr algn="ctr" fontAlgn="b"/>
+                      <a:r>
+                        <a:rPr lang="en-GB" sz="1400" b="0" i="0" u="none" strike="noStrike">
+                          <a:solidFill>
+                            <a:srgbClr val="000000"/>
+                          </a:solidFill>
+                          <a:effectLst/>
+                          <a:latin typeface="Calibri" panose="020F0502020204030204" pitchFamily="34" charset="0"/>
+                        </a:rPr>
+                        <a:t>-1.54627</a:t>
+                      </a:r>
+                    </a:p>
+                  </a:txBody>
+                  <a:tcPr marL="9525" marR="9525" marT="9525" marB="0" anchor="b"/>
+                </a:tc>
+                <a:tc>
+                  <a:txBody>
+                    <a:bodyPr/>
+                    <a:lstStyle/>
+                    <a:p>
+                      <a:pPr algn="ctr" fontAlgn="b"/>
+                      <a:r>
+                        <a:rPr lang="en-GB" sz="1400" b="0" i="0" u="none" strike="noStrike">
+                          <a:solidFill>
+                            <a:srgbClr val="000000"/>
+                          </a:solidFill>
+                          <a:effectLst/>
+                          <a:latin typeface="Calibri" panose="020F0502020204030204" pitchFamily="34" charset="0"/>
+                        </a:rPr>
+                        <a:t>Inf</a:t>
+                      </a:r>
+                    </a:p>
+                  </a:txBody>
+                  <a:tcPr marL="9525" marR="9525" marT="9525" marB="0" anchor="b"/>
+                </a:tc>
+                <a:tc>
+                  <a:txBody>
+                    <a:bodyPr/>
+                    <a:lstStyle/>
+                    <a:p>
+                      <a:pPr algn="ctr" fontAlgn="b"/>
+                      <a:r>
+                        <a:rPr lang="en-GB" sz="1400" b="0" i="0" u="none" strike="noStrike">
+                          <a:solidFill>
+                            <a:srgbClr val="000000"/>
+                          </a:solidFill>
+                          <a:effectLst/>
+                          <a:latin typeface="Calibri" panose="020F0502020204030204" pitchFamily="34" charset="0"/>
+                        </a:rPr>
+                        <a:t>-1.26E-07</a:t>
+                      </a:r>
+                    </a:p>
+                  </a:txBody>
+                  <a:tcPr marL="9525" marR="9525" marT="9525" marB="0" anchor="b"/>
+                </a:tc>
+                <a:tc>
+                  <a:txBody>
+                    <a:bodyPr/>
+                    <a:lstStyle/>
+                    <a:p>
+                      <a:pPr algn="ctr" fontAlgn="b"/>
+                      <a:r>
+                        <a:rPr lang="en-GB" sz="1400" b="0" i="0" u="none" strike="noStrike">
+                          <a:solidFill>
+                            <a:srgbClr val="000000"/>
+                          </a:solidFill>
+                          <a:effectLst/>
+                          <a:latin typeface="Calibri" panose="020F0502020204030204" pitchFamily="34" charset="0"/>
+                        </a:rPr>
+                        <a:t>0.297971</a:t>
+                      </a:r>
+                    </a:p>
+                  </a:txBody>
+                  <a:tcPr marL="9525" marR="9525" marT="9525" marB="0" anchor="b"/>
+                </a:tc>
+                <a:extLst>
+                  <a:ext uri="{0D108BD9-81ED-4DB2-BD59-A6C34878D82A}">
+                    <a16:rowId xmlns:a16="http://schemas.microsoft.com/office/drawing/2014/main" val="3610748696"/>
+                  </a:ext>
+                </a:extLst>
+              </a:tr>
+              <a:tr h="370840">
+                <a:tc>
+                  <a:txBody>
+                    <a:bodyPr/>
+                    <a:lstStyle/>
+                    <a:p>
+                      <a:pPr algn="l" fontAlgn="b"/>
+                      <a:r>
+                        <a:rPr lang="en-GB" sz="1400" b="0" i="0" u="none" strike="noStrike">
+                          <a:solidFill>
+                            <a:srgbClr val="000000"/>
+                          </a:solidFill>
+                          <a:effectLst/>
+                          <a:latin typeface="Calibri" panose="020F0502020204030204" pitchFamily="34" charset="0"/>
+                        </a:rPr>
+                        <a:t>log_sigmaM</a:t>
+                      </a:r>
+                    </a:p>
+                  </a:txBody>
+                  <a:tcPr marL="9525" marR="9525" marT="9525" marB="0" anchor="b"/>
+                </a:tc>
+                <a:tc>
+                  <a:txBody>
+                    <a:bodyPr/>
+                    <a:lstStyle/>
+                    <a:p>
+                      <a:pPr algn="ctr" fontAlgn="b"/>
+                      <a:r>
+                        <a:rPr lang="en-GB" sz="1400" b="0" i="0" u="none" strike="noStrike">
+                          <a:solidFill>
+                            <a:srgbClr val="000000"/>
+                          </a:solidFill>
+                          <a:effectLst/>
+                          <a:latin typeface="Calibri" panose="020F0502020204030204" pitchFamily="34" charset="0"/>
+                        </a:rPr>
+                        <a:t>1</a:t>
+                      </a:r>
+                    </a:p>
+                  </a:txBody>
+                  <a:tcPr marL="9525" marR="9525" marT="9525" marB="0" anchor="b"/>
+                </a:tc>
+                <a:tc>
+                  <a:txBody>
+                    <a:bodyPr/>
+                    <a:lstStyle/>
+                    <a:p>
+                      <a:pPr algn="ctr" fontAlgn="b"/>
+                      <a:r>
+                        <a:rPr lang="en-GB" sz="1400" b="0" i="0" u="none" strike="noStrike" dirty="0" smtClean="0">
+                          <a:solidFill>
+                            <a:srgbClr val="000000"/>
+                          </a:solidFill>
+                          <a:effectLst/>
+                          <a:latin typeface="Calibri" panose="020F0502020204030204" pitchFamily="34" charset="0"/>
+                        </a:rPr>
+                        <a:t>-</a:t>
+                      </a:r>
+                      <a:r>
+                        <a:rPr lang="en-GB" sz="1400" b="0" i="0" u="none" strike="noStrike" dirty="0" err="1" smtClean="0">
+                          <a:solidFill>
+                            <a:srgbClr val="000000"/>
+                          </a:solidFill>
+                          <a:effectLst/>
+                          <a:latin typeface="Calibri" panose="020F0502020204030204" pitchFamily="34" charset="0"/>
+                        </a:rPr>
+                        <a:t>Inf</a:t>
+                      </a:r>
+                      <a:endParaRPr lang="en-GB" sz="1400" b="0" i="0" u="none" strike="noStrike" dirty="0">
+                        <a:solidFill>
+                          <a:srgbClr val="000000"/>
+                        </a:solidFill>
+                        <a:effectLst/>
+                        <a:latin typeface="Calibri" panose="020F0502020204030204" pitchFamily="34" charset="0"/>
+                      </a:endParaRPr>
+                    </a:p>
+                  </a:txBody>
+                  <a:tcPr marL="9525" marR="9525" marT="9525" marB="0" anchor="b"/>
+                </a:tc>
+                <a:tc>
+                  <a:txBody>
+                    <a:bodyPr/>
+                    <a:lstStyle/>
+                    <a:p>
+                      <a:pPr algn="ctr" fontAlgn="b"/>
+                      <a:r>
+                        <a:rPr lang="en-GB" sz="1400" b="0" i="0" u="none" strike="noStrike">
+                          <a:solidFill>
+                            <a:srgbClr val="000000"/>
+                          </a:solidFill>
+                          <a:effectLst/>
+                          <a:latin typeface="Calibri" panose="020F0502020204030204" pitchFamily="34" charset="0"/>
+                        </a:rPr>
+                        <a:t>-4.98037</a:t>
+                      </a:r>
+                    </a:p>
+                  </a:txBody>
+                  <a:tcPr marL="9525" marR="9525" marT="9525" marB="0" anchor="b"/>
+                </a:tc>
+                <a:tc>
+                  <a:txBody>
+                    <a:bodyPr/>
+                    <a:lstStyle/>
+                    <a:p>
+                      <a:pPr algn="ctr" fontAlgn="b"/>
+                      <a:r>
+                        <a:rPr lang="en-GB" sz="1400" b="0" i="0" u="none" strike="noStrike">
+                          <a:solidFill>
+                            <a:srgbClr val="000000"/>
+                          </a:solidFill>
+                          <a:effectLst/>
+                          <a:latin typeface="Calibri" panose="020F0502020204030204" pitchFamily="34" charset="0"/>
+                        </a:rPr>
+                        <a:t>Inf</a:t>
+                      </a:r>
+                    </a:p>
+                  </a:txBody>
+                  <a:tcPr marL="9525" marR="9525" marT="9525" marB="0" anchor="b"/>
+                </a:tc>
+                <a:tc>
+                  <a:txBody>
+                    <a:bodyPr/>
+                    <a:lstStyle/>
+                    <a:p>
+                      <a:pPr algn="ctr" fontAlgn="b"/>
+                      <a:r>
+                        <a:rPr lang="en-GB" sz="1400" b="0" i="0" u="none" strike="noStrike">
+                          <a:solidFill>
+                            <a:srgbClr val="000000"/>
+                          </a:solidFill>
+                          <a:effectLst/>
+                          <a:latin typeface="Calibri" panose="020F0502020204030204" pitchFamily="34" charset="0"/>
+                        </a:rPr>
+                        <a:t>-4.42E-09</a:t>
+                      </a:r>
+                    </a:p>
+                  </a:txBody>
+                  <a:tcPr marL="9525" marR="9525" marT="9525" marB="0" anchor="b"/>
+                </a:tc>
+                <a:tc>
+                  <a:txBody>
+                    <a:bodyPr/>
+                    <a:lstStyle/>
+                    <a:p>
+                      <a:pPr algn="ctr" fontAlgn="b"/>
+                      <a:r>
+                        <a:rPr lang="en-GB" sz="1400" b="0" i="0" u="none" strike="noStrike">
+                          <a:solidFill>
+                            <a:srgbClr val="000000"/>
+                          </a:solidFill>
+                          <a:effectLst/>
+                          <a:latin typeface="Calibri" panose="020F0502020204030204" pitchFamily="34" charset="0"/>
+                        </a:rPr>
+                        <a:t>13.00587</a:t>
+                      </a:r>
+                    </a:p>
+                  </a:txBody>
+                  <a:tcPr marL="9525" marR="9525" marT="9525" marB="0" anchor="b"/>
+                </a:tc>
+                <a:extLst>
+                  <a:ext uri="{0D108BD9-81ED-4DB2-BD59-A6C34878D82A}">
+                    <a16:rowId xmlns:a16="http://schemas.microsoft.com/office/drawing/2014/main" val="2765119468"/>
+                  </a:ext>
+                </a:extLst>
+              </a:tr>
+              <a:tr h="370840">
+                <a:tc>
+                  <a:txBody>
+                    <a:bodyPr/>
+                    <a:lstStyle/>
+                    <a:p>
+                      <a:pPr algn="l" fontAlgn="b"/>
+                      <a:r>
+                        <a:rPr lang="en-GB" sz="1400" b="0" i="0" u="none" strike="noStrike">
+                          <a:solidFill>
+                            <a:srgbClr val="000000"/>
+                          </a:solidFill>
+                          <a:effectLst/>
+                          <a:latin typeface="Calibri" panose="020F0502020204030204" pitchFamily="34" charset="0"/>
+                        </a:rPr>
+                        <a:t>alpha</a:t>
+                      </a:r>
+                    </a:p>
+                  </a:txBody>
+                  <a:tcPr marL="9525" marR="9525" marT="9525" marB="0" anchor="b"/>
+                </a:tc>
+                <a:tc>
+                  <a:txBody>
+                    <a:bodyPr/>
+                    <a:lstStyle/>
+                    <a:p>
+                      <a:pPr algn="ctr" fontAlgn="b"/>
+                      <a:r>
+                        <a:rPr lang="en-GB" sz="1400" b="0" i="0" u="none" strike="noStrike">
+                          <a:solidFill>
+                            <a:srgbClr val="000000"/>
+                          </a:solidFill>
+                          <a:effectLst/>
+                          <a:latin typeface="Calibri" panose="020F0502020204030204" pitchFamily="34" charset="0"/>
+                        </a:rPr>
+                        <a:t>0</a:t>
+                      </a:r>
+                    </a:p>
+                  </a:txBody>
+                  <a:tcPr marL="9525" marR="9525" marT="9525" marB="0" anchor="b"/>
+                </a:tc>
+                <a:tc>
+                  <a:txBody>
+                    <a:bodyPr/>
+                    <a:lstStyle/>
+                    <a:p>
+                      <a:pPr algn="ctr" fontAlgn="b"/>
+                      <a:r>
+                        <a:rPr lang="en-GB" sz="1400" b="0" i="0" u="none" strike="noStrike" dirty="0" smtClean="0">
+                          <a:solidFill>
+                            <a:srgbClr val="000000"/>
+                          </a:solidFill>
+                          <a:effectLst/>
+                          <a:latin typeface="Calibri" panose="020F0502020204030204" pitchFamily="34" charset="0"/>
+                        </a:rPr>
+                        <a:t>-</a:t>
+                      </a:r>
+                      <a:r>
+                        <a:rPr lang="en-GB" sz="1400" b="0" i="0" u="none" strike="noStrike" dirty="0" err="1" smtClean="0">
+                          <a:solidFill>
+                            <a:srgbClr val="000000"/>
+                          </a:solidFill>
+                          <a:effectLst/>
+                          <a:latin typeface="Calibri" panose="020F0502020204030204" pitchFamily="34" charset="0"/>
+                        </a:rPr>
+                        <a:t>Inf</a:t>
+                      </a:r>
+                      <a:endParaRPr lang="en-GB" sz="1400" b="0" i="0" u="none" strike="noStrike" dirty="0">
+                        <a:solidFill>
+                          <a:srgbClr val="000000"/>
+                        </a:solidFill>
+                        <a:effectLst/>
+                        <a:latin typeface="Calibri" panose="020F0502020204030204" pitchFamily="34" charset="0"/>
+                      </a:endParaRPr>
+                    </a:p>
+                  </a:txBody>
+                  <a:tcPr marL="9525" marR="9525" marT="9525" marB="0" anchor="b"/>
+                </a:tc>
+                <a:tc>
+                  <a:txBody>
+                    <a:bodyPr/>
+                    <a:lstStyle/>
+                    <a:p>
+                      <a:pPr algn="ctr" fontAlgn="b"/>
+                      <a:r>
+                        <a:rPr lang="en-GB" sz="1400" b="0" i="0" u="none" strike="noStrike">
+                          <a:solidFill>
+                            <a:srgbClr val="000000"/>
+                          </a:solidFill>
+                          <a:effectLst/>
+                          <a:latin typeface="Calibri" panose="020F0502020204030204" pitchFamily="34" charset="0"/>
+                        </a:rPr>
+                        <a:t>2.071196</a:t>
+                      </a:r>
+                    </a:p>
+                  </a:txBody>
+                  <a:tcPr marL="9525" marR="9525" marT="9525" marB="0" anchor="b"/>
+                </a:tc>
+                <a:tc>
+                  <a:txBody>
+                    <a:bodyPr/>
+                    <a:lstStyle/>
+                    <a:p>
+                      <a:pPr algn="ctr" fontAlgn="b"/>
+                      <a:r>
+                        <a:rPr lang="en-GB" sz="1400" b="0" i="0" u="none" strike="noStrike">
+                          <a:solidFill>
+                            <a:srgbClr val="000000"/>
+                          </a:solidFill>
+                          <a:effectLst/>
+                          <a:latin typeface="Calibri" panose="020F0502020204030204" pitchFamily="34" charset="0"/>
+                        </a:rPr>
+                        <a:t>Inf</a:t>
+                      </a:r>
+                    </a:p>
+                  </a:txBody>
+                  <a:tcPr marL="9525" marR="9525" marT="9525" marB="0" anchor="b"/>
+                </a:tc>
+                <a:tc>
+                  <a:txBody>
+                    <a:bodyPr/>
+                    <a:lstStyle/>
+                    <a:p>
+                      <a:pPr algn="ctr" fontAlgn="b"/>
+                      <a:r>
+                        <a:rPr lang="en-GB" sz="1400" b="0" i="0" u="none" strike="noStrike">
+                          <a:solidFill>
+                            <a:srgbClr val="000000"/>
+                          </a:solidFill>
+                          <a:effectLst/>
+                          <a:latin typeface="Calibri" panose="020F0502020204030204" pitchFamily="34" charset="0"/>
+                        </a:rPr>
+                        <a:t>3.71E-06</a:t>
+                      </a:r>
+                    </a:p>
+                  </a:txBody>
+                  <a:tcPr marL="9525" marR="9525" marT="9525" marB="0" anchor="b"/>
+                </a:tc>
+                <a:tc>
+                  <a:txBody>
+                    <a:bodyPr/>
+                    <a:lstStyle/>
+                    <a:p>
+                      <a:pPr algn="ctr" fontAlgn="b"/>
+                      <a:r>
+                        <a:rPr lang="en-GB" sz="1400" b="0" i="0" u="none" strike="noStrike">
+                          <a:solidFill>
+                            <a:srgbClr val="000000"/>
+                          </a:solidFill>
+                          <a:effectLst/>
+                          <a:latin typeface="Calibri" panose="020F0502020204030204" pitchFamily="34" charset="0"/>
+                        </a:rPr>
+                        <a:t>1.02898</a:t>
+                      </a:r>
+                    </a:p>
+                  </a:txBody>
+                  <a:tcPr marL="9525" marR="9525" marT="9525" marB="0" anchor="b"/>
+                </a:tc>
+                <a:extLst>
+                  <a:ext uri="{0D108BD9-81ED-4DB2-BD59-A6C34878D82A}">
+                    <a16:rowId xmlns:a16="http://schemas.microsoft.com/office/drawing/2014/main" val="3147623146"/>
+                  </a:ext>
+                </a:extLst>
+              </a:tr>
+              <a:tr h="370840">
+                <a:tc>
+                  <a:txBody>
+                    <a:bodyPr/>
+                    <a:lstStyle/>
+                    <a:p>
+                      <a:pPr algn="l" fontAlgn="b"/>
+                      <a:r>
+                        <a:rPr lang="en-GB" sz="1400" b="0" i="0" u="none" strike="noStrike">
+                          <a:solidFill>
+                            <a:srgbClr val="000000"/>
+                          </a:solidFill>
+                          <a:effectLst/>
+                          <a:latin typeface="Calibri" panose="020F0502020204030204" pitchFamily="34" charset="0"/>
+                        </a:rPr>
+                        <a:t>rho</a:t>
+                      </a:r>
+                    </a:p>
+                  </a:txBody>
+                  <a:tcPr marL="9525" marR="9525" marT="9525" marB="0" anchor="b"/>
+                </a:tc>
+                <a:tc>
+                  <a:txBody>
+                    <a:bodyPr/>
+                    <a:lstStyle/>
+                    <a:p>
+                      <a:pPr algn="ctr" fontAlgn="b"/>
+                      <a:r>
+                        <a:rPr lang="en-GB" sz="1400" b="0" i="0" u="none" strike="noStrike">
+                          <a:solidFill>
+                            <a:srgbClr val="000000"/>
+                          </a:solidFill>
+                          <a:effectLst/>
+                          <a:latin typeface="Calibri" panose="020F0502020204030204" pitchFamily="34" charset="0"/>
+                        </a:rPr>
+                        <a:t>0</a:t>
+                      </a:r>
+                    </a:p>
+                  </a:txBody>
+                  <a:tcPr marL="9525" marR="9525" marT="9525" marB="0" anchor="b"/>
+                </a:tc>
+                <a:tc>
+                  <a:txBody>
+                    <a:bodyPr/>
+                    <a:lstStyle/>
+                    <a:p>
+                      <a:pPr algn="ctr" fontAlgn="b"/>
+                      <a:r>
+                        <a:rPr lang="en-GB" sz="1400" b="0" i="0" u="none" strike="noStrike" dirty="0" smtClean="0">
+                          <a:solidFill>
+                            <a:srgbClr val="000000"/>
+                          </a:solidFill>
+                          <a:effectLst/>
+                          <a:latin typeface="Calibri" panose="020F0502020204030204" pitchFamily="34" charset="0"/>
+                        </a:rPr>
+                        <a:t>-</a:t>
+                      </a:r>
+                      <a:r>
+                        <a:rPr lang="en-GB" sz="1400" b="0" i="0" u="none" strike="noStrike" dirty="0" err="1" smtClean="0">
+                          <a:solidFill>
+                            <a:srgbClr val="000000"/>
+                          </a:solidFill>
+                          <a:effectLst/>
+                          <a:latin typeface="Calibri" panose="020F0502020204030204" pitchFamily="34" charset="0"/>
+                        </a:rPr>
+                        <a:t>Inf</a:t>
+                      </a:r>
+                      <a:endParaRPr lang="en-GB" sz="1400" b="0" i="0" u="none" strike="noStrike" dirty="0">
+                        <a:solidFill>
+                          <a:srgbClr val="000000"/>
+                        </a:solidFill>
+                        <a:effectLst/>
+                        <a:latin typeface="Calibri" panose="020F0502020204030204" pitchFamily="34" charset="0"/>
+                      </a:endParaRPr>
+                    </a:p>
+                  </a:txBody>
+                  <a:tcPr marL="9525" marR="9525" marT="9525" marB="0" anchor="b"/>
+                </a:tc>
+                <a:tc>
+                  <a:txBody>
+                    <a:bodyPr/>
+                    <a:lstStyle/>
+                    <a:p>
+                      <a:pPr algn="ctr" fontAlgn="b"/>
+                      <a:r>
+                        <a:rPr lang="en-GB" sz="1400" b="0" i="0" u="none" strike="noStrike">
+                          <a:solidFill>
+                            <a:srgbClr val="000000"/>
+                          </a:solidFill>
+                          <a:effectLst/>
+                          <a:latin typeface="Calibri" panose="020F0502020204030204" pitchFamily="34" charset="0"/>
+                        </a:rPr>
+                        <a:t>0.546332</a:t>
+                      </a:r>
+                    </a:p>
+                  </a:txBody>
+                  <a:tcPr marL="9525" marR="9525" marT="9525" marB="0" anchor="b"/>
+                </a:tc>
+                <a:tc>
+                  <a:txBody>
+                    <a:bodyPr/>
+                    <a:lstStyle/>
+                    <a:p>
+                      <a:pPr algn="ctr" fontAlgn="b"/>
+                      <a:r>
+                        <a:rPr lang="en-GB" sz="1400" b="0" i="0" u="none" strike="noStrike">
+                          <a:solidFill>
+                            <a:srgbClr val="000000"/>
+                          </a:solidFill>
+                          <a:effectLst/>
+                          <a:latin typeface="Calibri" panose="020F0502020204030204" pitchFamily="34" charset="0"/>
+                        </a:rPr>
+                        <a:t>Inf</a:t>
+                      </a:r>
+                    </a:p>
+                  </a:txBody>
+                  <a:tcPr marL="9525" marR="9525" marT="9525" marB="0" anchor="b"/>
+                </a:tc>
+                <a:tc>
+                  <a:txBody>
+                    <a:bodyPr/>
+                    <a:lstStyle/>
+                    <a:p>
+                      <a:pPr algn="ctr" fontAlgn="b"/>
+                      <a:r>
+                        <a:rPr lang="en-GB" sz="1400" b="0" i="0" u="none" strike="noStrike">
+                          <a:solidFill>
+                            <a:srgbClr val="000000"/>
+                          </a:solidFill>
+                          <a:effectLst/>
+                          <a:latin typeface="Calibri" panose="020F0502020204030204" pitchFamily="34" charset="0"/>
+                        </a:rPr>
+                        <a:t>1.67E-05</a:t>
+                      </a:r>
+                    </a:p>
+                  </a:txBody>
+                  <a:tcPr marL="9525" marR="9525" marT="9525" marB="0" anchor="b"/>
+                </a:tc>
+                <a:tc>
+                  <a:txBody>
+                    <a:bodyPr/>
+                    <a:lstStyle/>
+                    <a:p>
+                      <a:pPr algn="ctr" fontAlgn="b"/>
+                      <a:r>
+                        <a:rPr lang="en-GB" sz="1400" b="0" i="0" u="none" strike="noStrike" dirty="0">
+                          <a:solidFill>
+                            <a:srgbClr val="000000"/>
+                          </a:solidFill>
+                          <a:effectLst/>
+                          <a:latin typeface="Calibri" panose="020F0502020204030204" pitchFamily="34" charset="0"/>
+                        </a:rPr>
+                        <a:t>0.225704</a:t>
+                      </a:r>
+                    </a:p>
+                  </a:txBody>
+                  <a:tcPr marL="9525" marR="9525" marT="9525" marB="0" anchor="b"/>
+                </a:tc>
+                <a:extLst>
+                  <a:ext uri="{0D108BD9-81ED-4DB2-BD59-A6C34878D82A}">
+                    <a16:rowId xmlns:a16="http://schemas.microsoft.com/office/drawing/2014/main" val="1929771086"/>
+                  </a:ext>
+                </a:extLst>
+              </a:tr>
+            </a:tbl>
+          </a:graphicData>
+        </a:graphic>
+      </p:graphicFrame>
+      <p:pic>
+        <p:nvPicPr>
+          <p:cNvPr id="5" name="Picture 4"/>
+          <p:cNvPicPr>
+            <a:picLocks noChangeAspect="1"/>
+          </p:cNvPicPr>
+          <p:nvPr/>
+        </p:nvPicPr>
+        <p:blipFill>
+          <a:blip r:embed="rId2" cstate="print">
+            <a:extLst>
+              <a:ext uri="{28A0092B-C50C-407E-A947-70E740481C1C}">
+                <a14:useLocalDpi xmlns:a14="http://schemas.microsoft.com/office/drawing/2010/main" val="0"/>
+              </a:ext>
+            </a:extLst>
+          </a:blip>
+          <a:stretch>
+            <a:fillRect/>
+          </a:stretch>
+        </p:blipFill>
+        <p:spPr>
+          <a:xfrm>
+            <a:off x="3440243" y="914401"/>
+            <a:ext cx="5703757" cy="3564848"/>
+          </a:xfrm>
+          <a:prstGeom prst="rect">
+            <a:avLst/>
+          </a:prstGeom>
+        </p:spPr>
+      </p:pic>
+    </p:spTree>
+    <p:extLst>
+      <p:ext uri="{BB962C8B-B14F-4D97-AF65-F5344CB8AC3E}">
+        <p14:creationId xmlns:p14="http://schemas.microsoft.com/office/powerpoint/2010/main" val="3970050273"/>
+      </p:ext>
+    </p:extLst>
+  </p:cSld>
+  <p:clrMapOvr>
+    <a:masterClrMapping/>
+  </p:clrMapOvr>
+  <p:timing>
+    <p:tnLst>
+      <p:par>
+        <p:cTn id="1" dur="indefinite" restart="never" nodeType="tmRoot">
+          <p:childTnLst>
+            <p:seq concurrent="1" nextAc="seek">
+              <p:cTn id="2" dur="indefinite" nodeType="mainSeq">
+                <p:childTnLst>
+                  <p:par>
+                    <p:cTn id="3" fill="hold">
+                      <p:stCondLst>
+                        <p:cond delay="indefinite"/>
+                      </p:stCondLst>
+                      <p:childTnLst>
+                        <p:par>
+                          <p:cTn id="4" fill="hold">
+                            <p:stCondLst>
+                              <p:cond delay="0"/>
+                            </p:stCondLst>
+                            <p:childTnLst>
+                              <p:par>
+                                <p:cTn id="5" presetID="1" presetClass="entr" presetSubtype="0" fill="hold" nodeType="clickEffect">
+                                  <p:stCondLst>
+                                    <p:cond delay="0"/>
+                                  </p:stCondLst>
+                                  <p:childTnLst>
+                                    <p:set>
+                                      <p:cBhvr>
+                                        <p:cTn id="6" dur="1" fill="hold">
+                                          <p:stCondLst>
+                                            <p:cond delay="0"/>
+                                          </p:stCondLst>
+                                        </p:cTn>
+                                        <p:tgtEl>
+                                          <p:spTgt spid="3">
+                                            <p:txEl>
+                                              <p:pRg st="4" end="4"/>
+                                            </p:txEl>
+                                          </p:spTgt>
+                                        </p:tgtEl>
+                                        <p:attrNameLst>
+                                          <p:attrName>style.visibility</p:attrName>
+                                        </p:attrNameLst>
+                                      </p:cBhvr>
+                                      <p:to>
+                                        <p:strVal val="visible"/>
+                                      </p:to>
+                                    </p:set>
+                                  </p:childTnLst>
+                                </p:cTn>
+                              </p:par>
+                            </p:childTnLst>
+                          </p:cTn>
+                        </p:par>
+                      </p:childTnLst>
+                    </p:cTn>
+                  </p:par>
+                </p:childTnLst>
+              </p:cTn>
+              <p:prevCondLst>
+                <p:cond evt="onPrev" delay="0">
+                  <p:tgtEl>
+                    <p:sldTgt/>
+                  </p:tgtEl>
+                </p:cond>
+              </p:prevCondLst>
+              <p:nextCondLst>
+                <p:cond evt="onNext" delay="0">
+                  <p:tgtEl>
+                    <p:sldTgt/>
+                  </p:tgtEl>
+                </p:cond>
+              </p:nextCondLst>
+            </p:seq>
+          </p:childTnLst>
+        </p:cTn>
+      </p:par>
+    </p:tnLst>
+  </p:timing>
+</p:sld>
+</file>
+
+<file path=ppt/slides/slide19.xml><?xml version="1.0" encoding="utf-8"?>
+<p:sld xmlns:a="http://schemas.openxmlformats.org/drawingml/2006/main" xmlns:r="http://schemas.openxmlformats.org/officeDocument/2006/relationships" xmlns:p="http://schemas.openxmlformats.org/presentationml/2006/main">
+  <p:cSld>
+    <p:spTree>
+      <p:nvGrpSpPr>
+        <p:cNvPr id="1" name=""/>
+        <p:cNvGrpSpPr/>
+        <p:nvPr/>
+      </p:nvGrpSpPr>
+      <p:grpSpPr>
+        <a:xfrm>
+          <a:off x="0" y="0"/>
+          <a:ext cx="0" cy="0"/>
+          <a:chOff x="0" y="0"/>
+          <a:chExt cx="0" cy="0"/>
+        </a:xfrm>
+      </p:grpSpPr>
+      <p:sp>
+        <p:nvSpPr>
+          <p:cNvPr id="2" name="Title 1"/>
+          <p:cNvSpPr>
+            <a:spLocks noGrp="1"/>
+          </p:cNvSpPr>
+          <p:nvPr>
+            <p:ph type="title"/>
+          </p:nvPr>
+        </p:nvSpPr>
+        <p:spPr/>
+        <p:txBody>
+          <a:bodyPr/>
+          <a:lstStyle/>
+          <a:p>
+            <a:endParaRPr lang="en-GB"/>
+          </a:p>
+        </p:txBody>
+      </p:sp>
+      <p:sp>
+        <p:nvSpPr>
+          <p:cNvPr id="3" name="Content Placeholder 2"/>
+          <p:cNvSpPr>
+            <a:spLocks noGrp="1"/>
+          </p:cNvSpPr>
+          <p:nvPr>
+            <p:ph idx="1"/>
+          </p:nvPr>
+        </p:nvSpPr>
+        <p:spPr/>
+        <p:txBody>
+          <a:bodyPr/>
+          <a:lstStyle/>
+          <a:p>
+            <a:pPr marL="0" indent="0">
+              <a:buNone/>
+            </a:pPr>
+            <a:r>
+              <a:rPr lang="en-US" b="1" dirty="0" smtClean="0"/>
+              <a:t>Lab exercise</a:t>
+            </a:r>
+            <a:endParaRPr lang="en-US" dirty="0" smtClean="0"/>
+          </a:p>
+          <a:p>
+            <a:pPr marL="0" indent="0">
+              <a:buNone/>
+            </a:pPr>
+            <a:endParaRPr lang="en-US" b="1" dirty="0"/>
+          </a:p>
+          <a:p>
+            <a:pPr marL="0" indent="0">
+              <a:buNone/>
+            </a:pPr>
+            <a:r>
+              <a:rPr lang="en-US" b="1" dirty="0" smtClean="0"/>
+              <a:t>[Fix </a:t>
+            </a:r>
+            <a:r>
+              <a:rPr lang="en-US" b="1" dirty="0" err="1" smtClean="0"/>
+              <a:t>SigmaM</a:t>
+            </a:r>
+            <a:r>
+              <a:rPr lang="en-US" b="1" dirty="0" smtClean="0"/>
+              <a:t> at 0 and re-run]</a:t>
+            </a:r>
+            <a:endParaRPr lang="en-US" b="1" dirty="0" smtClean="0"/>
+          </a:p>
+        </p:txBody>
+      </p:sp>
+    </p:spTree>
+    <p:extLst>
+      <p:ext uri="{BB962C8B-B14F-4D97-AF65-F5344CB8AC3E}">
+        <p14:creationId xmlns:p14="http://schemas.microsoft.com/office/powerpoint/2010/main" val="3205172949"/>
+      </p:ext>
+    </p:extLst>
+  </p:cSld>
+  <p:clrMapOvr>
+    <a:masterClrMapping/>
+  </p:clrMapOvr>
+  <p:timing>
+    <p:tnLst>
+      <p:par>
+        <p:cTn id="1" dur="indefinite" restart="never" nodeType="tmRoot"/>
+      </p:par>
+    </p:tnLst>
+  </p:timing>
+</p:sld>
+</file>
+
 <file path=ppt/slides/slide2.xml><?xml version="1.0" encoding="utf-8"?>
 <p:sld xmlns:a="http://schemas.openxmlformats.org/drawingml/2006/main" xmlns:r="http://schemas.openxmlformats.org/officeDocument/2006/relationships" xmlns:p="http://schemas.openxmlformats.org/presentationml/2006/main">
   <p:cSld>
@@ -4945,11 +9635,7 @@
           <a:p>
             <a:r>
               <a:rPr lang="en-US" dirty="0" smtClean="0"/>
-              <a:t>What is the stationary distri</a:t>
-            </a:r>
-            <a:r>
-              <a:rPr lang="en-US" dirty="0" smtClean="0"/>
-              <a:t>bution?</a:t>
+              <a:t>What is the stationary distribution?</a:t>
             </a:r>
           </a:p>
           <a:p>
@@ -5180,8 +9866,8 @@
           </a:p>
         </p:txBody>
       </p:sp>
-      <mc:AlternateContent xmlns:mc="http://schemas.openxmlformats.org/markup-compatibility/2006">
-        <mc:Choice xmlns:a14="http://schemas.microsoft.com/office/drawing/2010/main" Requires="a14">
+      <mc:AlternateContent xmlns:mc="http://schemas.openxmlformats.org/markup-compatibility/2006" xmlns:a14="http://schemas.microsoft.com/office/drawing/2010/main">
+        <mc:Choice Requires="a14">
           <p:sp>
             <p:nvSpPr>
               <p:cNvPr id="3" name="Content Placeholder 2"/>
@@ -5376,13 +10062,7 @@
                                 <a:rPr lang="en-US" b="0" i="1" smtClean="0">
                                   <a:latin typeface="Cambria Math" panose="02040503050406030204" pitchFamily="18" charset="0"/>
                                 </a:rPr>
-                                <m:t>)</m:t>
-                              </m:r>
-                              <m:r>
-                                <a:rPr lang="en-US" b="0" i="1" smtClean="0">
-                                  <a:latin typeface="Cambria Math" panose="02040503050406030204" pitchFamily="18" charset="0"/>
-                                </a:rPr>
-                                <m:t>+</m:t>
+                                <m:t>)+</m:t>
                               </m:r>
                               <m:sSub>
                                 <m:sSubPr>
@@ -5693,7 +10373,7 @@
             </p:txBody>
           </p:sp>
         </mc:Choice>
-        <mc:Fallback>
+        <mc:Fallback xmlns="">
           <p:sp>
             <p:nvSpPr>
               <p:cNvPr id="3" name="Content Placeholder 2"/>
@@ -5813,8 +10493,8 @@
           </a:p>
         </p:txBody>
       </p:sp>
-      <mc:AlternateContent xmlns:mc="http://schemas.openxmlformats.org/markup-compatibility/2006">
-        <mc:Choice xmlns:a14="http://schemas.microsoft.com/office/drawing/2010/main" Requires="a14">
+      <mc:AlternateContent xmlns:mc="http://schemas.openxmlformats.org/markup-compatibility/2006" xmlns:a14="http://schemas.microsoft.com/office/drawing/2010/main">
+        <mc:Choice Requires="a14">
           <p:sp>
             <p:nvSpPr>
               <p:cNvPr id="3" name="Content Placeholder 2"/>
@@ -6569,7 +11249,7 @@
             </p:txBody>
           </p:sp>
         </mc:Choice>
-        <mc:Fallback>
+        <mc:Fallback xmlns="">
           <p:sp>
             <p:nvSpPr>
               <p:cNvPr id="3" name="Content Placeholder 2"/>
@@ -6659,8 +11339,8 @@
           </a:p>
         </p:txBody>
       </p:sp>
-      <mc:AlternateContent xmlns:mc="http://schemas.openxmlformats.org/markup-compatibility/2006">
-        <mc:Choice xmlns:a14="http://schemas.microsoft.com/office/drawing/2010/main" Requires="a14">
+      <mc:AlternateContent xmlns:mc="http://schemas.openxmlformats.org/markup-compatibility/2006" xmlns:a14="http://schemas.microsoft.com/office/drawing/2010/main">
+        <mc:Choice Requires="a14">
           <p:sp>
             <p:nvSpPr>
               <p:cNvPr id="3" name="Content Placeholder 2"/>
@@ -6776,14 +11456,7 @@
                           <a:latin typeface="Cambria Math" panose="02040503050406030204" pitchFamily="18" charset="0"/>
                           <a:ea typeface="Cambria Math" panose="02040503050406030204" pitchFamily="18" charset="0"/>
                         </a:rPr>
-                        <m:t>+</m:t>
-                      </m:r>
-                      <m:r>
-                        <a:rPr lang="en-US" b="0" i="1" smtClean="0">
-                          <a:latin typeface="Cambria Math" panose="02040503050406030204" pitchFamily="18" charset="0"/>
-                          <a:ea typeface="Cambria Math" panose="02040503050406030204" pitchFamily="18" charset="0"/>
-                        </a:rPr>
-                        <m:t>(1−</m:t>
+                        <m:t>+(1−</m:t>
                       </m:r>
                       <m:r>
                         <a:rPr lang="en-US" b="0" i="1" smtClean="0">
@@ -7251,7 +11924,7 @@
             </p:txBody>
           </p:sp>
         </mc:Choice>
-        <mc:Fallback>
+        <mc:Fallback xmlns="">
           <p:sp>
             <p:nvSpPr>
               <p:cNvPr id="3" name="Content Placeholder 2"/>

</xml_diff>

<commit_message>
added in class-example code
</commit_message>
<xml_diff>
--- a/Week 3 -- Temporal Models/Lab/Lab 3 -- Gompertz model.pptx
+++ b/Week 3 -- Temporal Models/Lab/Lab 3 -- Gompertz model.pptx
@@ -5,7 +5,7 @@
     <p:sldMasterId id="2147483672" r:id="rId1"/>
   </p:sldMasterIdLst>
   <p:notesMasterIdLst>
-    <p:notesMasterId r:id="rId21"/>
+    <p:notesMasterId r:id="rId22"/>
   </p:notesMasterIdLst>
   <p:sldIdLst>
     <p:sldId id="266" r:id="rId2"/>
@@ -22,11 +22,12 @@
     <p:sldId id="338" r:id="rId13"/>
     <p:sldId id="335" r:id="rId14"/>
     <p:sldId id="337" r:id="rId15"/>
-    <p:sldId id="339" r:id="rId16"/>
-    <p:sldId id="340" r:id="rId17"/>
-    <p:sldId id="341" r:id="rId18"/>
-    <p:sldId id="342" r:id="rId19"/>
-    <p:sldId id="343" r:id="rId20"/>
+    <p:sldId id="344" r:id="rId16"/>
+    <p:sldId id="339" r:id="rId17"/>
+    <p:sldId id="340" r:id="rId18"/>
+    <p:sldId id="341" r:id="rId19"/>
+    <p:sldId id="342" r:id="rId20"/>
+    <p:sldId id="343" r:id="rId21"/>
   </p:sldIdLst>
   <p:sldSz cx="9144000" cy="6858000" type="screen4x3"/>
   <p:notesSz cx="6858000" cy="9144000"/>
@@ -3459,12 +3460,8 @@
               <a:t>Lecture 3:  </a:t>
             </a:r>
             <a:r>
-              <a:rPr lang="en-US" dirty="0" err="1" smtClean="0"/>
-              <a:t>Kalman</a:t>
-            </a:r>
-            <a:r>
               <a:rPr lang="en-US" dirty="0" smtClean="0"/>
-              <a:t> filter</a:t>
+              <a:t>Gompertz model</a:t>
             </a:r>
             <a:endParaRPr lang="en-US" dirty="0"/>
           </a:p>
@@ -3688,8 +3685,8 @@
           </a:p>
         </p:txBody>
       </p:sp>
-      <mc:AlternateContent xmlns:mc="http://schemas.openxmlformats.org/markup-compatibility/2006" xmlns:a14="http://schemas.microsoft.com/office/drawing/2010/main">
-        <mc:Choice Requires="a14">
+      <mc:AlternateContent xmlns:mc="http://schemas.openxmlformats.org/markup-compatibility/2006">
+        <mc:Choice xmlns:a14="http://schemas.microsoft.com/office/drawing/2010/main" Requires="a14">
           <p:sp>
             <p:nvSpPr>
               <p:cNvPr id="3" name="Content Placeholder 2"/>
@@ -3956,6 +3953,48 @@
                           </m:r>
                         </m:den>
                       </m:f>
+                      <m:r>
+                        <a:rPr lang="en-US" b="0" i="1" smtClean="0">
+                          <a:latin typeface="Cambria Math" panose="02040503050406030204" pitchFamily="18" charset="0"/>
+                          <a:ea typeface="Cambria Math" panose="02040503050406030204" pitchFamily="18" charset="0"/>
+                        </a:rPr>
+                        <m:t>=</m:t>
+                      </m:r>
+                      <m:f>
+                        <m:fPr>
+                          <m:ctrlPr>
+                            <a:rPr lang="en-US" b="0" i="1" smtClean="0">
+                              <a:latin typeface="Cambria Math" panose="02040503050406030204" pitchFamily="18" charset="0"/>
+                              <a:ea typeface="Cambria Math" panose="02040503050406030204" pitchFamily="18" charset="0"/>
+                            </a:rPr>
+                          </m:ctrlPr>
+                        </m:fPr>
+                        <m:num>
+                          <m:r>
+                            <a:rPr lang="en-US" i="1">
+                              <a:latin typeface="Cambria Math" panose="02040503050406030204" pitchFamily="18" charset="0"/>
+                              <a:ea typeface="Cambria Math" panose="02040503050406030204" pitchFamily="18" charset="0"/>
+                            </a:rPr>
+                            <m:t>𝛼</m:t>
+                          </m:r>
+                        </m:num>
+                        <m:den>
+                          <m:r>
+                            <a:rPr lang="en-US" b="0" i="1" smtClean="0">
+                              <a:latin typeface="Cambria Math" panose="02040503050406030204" pitchFamily="18" charset="0"/>
+                              <a:ea typeface="Cambria Math" panose="02040503050406030204" pitchFamily="18" charset="0"/>
+                            </a:rPr>
+                            <m:t>1−</m:t>
+                          </m:r>
+                          <m:r>
+                            <a:rPr lang="en-US" b="0" i="1" smtClean="0">
+                              <a:latin typeface="Cambria Math" panose="02040503050406030204" pitchFamily="18" charset="0"/>
+                              <a:ea typeface="Cambria Math" panose="02040503050406030204" pitchFamily="18" charset="0"/>
+                            </a:rPr>
+                            <m:t>𝜌</m:t>
+                          </m:r>
+                        </m:den>
+                      </m:f>
                     </m:oMath>
                   </m:oMathPara>
                 </a14:m>
@@ -4060,6 +4099,78 @@
                           </m:r>
                         </m:den>
                       </m:f>
+                      <m:r>
+                        <a:rPr lang="en-US" i="1">
+                          <a:latin typeface="Cambria Math" panose="02040503050406030204" pitchFamily="18" charset="0"/>
+                          <a:ea typeface="Cambria Math" panose="02040503050406030204" pitchFamily="18" charset="0"/>
+                        </a:rPr>
+                        <m:t>=</m:t>
+                      </m:r>
+                      <m:f>
+                        <m:fPr>
+                          <m:ctrlPr>
+                            <a:rPr lang="en-US" i="1">
+                              <a:latin typeface="Cambria Math" panose="02040503050406030204" pitchFamily="18" charset="0"/>
+                              <a:ea typeface="Cambria Math" panose="02040503050406030204" pitchFamily="18" charset="0"/>
+                            </a:rPr>
+                          </m:ctrlPr>
+                        </m:fPr>
+                        <m:num>
+                          <m:sSubSup>
+                            <m:sSubSupPr>
+                              <m:ctrlPr>
+                                <a:rPr lang="en-US" i="1">
+                                  <a:latin typeface="Cambria Math" panose="02040503050406030204" pitchFamily="18" charset="0"/>
+                                  <a:ea typeface="Cambria Math" panose="02040503050406030204" pitchFamily="18" charset="0"/>
+                                </a:rPr>
+                              </m:ctrlPr>
+                            </m:sSubSupPr>
+                            <m:e>
+                              <m:r>
+                                <a:rPr lang="en-US" i="1">
+                                  <a:latin typeface="Cambria Math" panose="02040503050406030204" pitchFamily="18" charset="0"/>
+                                  <a:ea typeface="Cambria Math" panose="02040503050406030204" pitchFamily="18" charset="0"/>
+                                </a:rPr>
+                                <m:t>𝜎</m:t>
+                              </m:r>
+                            </m:e>
+                            <m:sub>
+                              <m:r>
+                                <a:rPr lang="en-US" i="1">
+                                  <a:latin typeface="Cambria Math" panose="02040503050406030204" pitchFamily="18" charset="0"/>
+                                  <a:ea typeface="Cambria Math" panose="02040503050406030204" pitchFamily="18" charset="0"/>
+                                </a:rPr>
+                                <m:t>𝑑</m:t>
+                              </m:r>
+                            </m:sub>
+                            <m:sup>
+                              <m:r>
+                                <a:rPr lang="en-US" i="1">
+                                  <a:latin typeface="Cambria Math" panose="02040503050406030204" pitchFamily="18" charset="0"/>
+                                  <a:ea typeface="Cambria Math" panose="02040503050406030204" pitchFamily="18" charset="0"/>
+                                </a:rPr>
+                                <m:t>2</m:t>
+                              </m:r>
+                            </m:sup>
+                          </m:sSubSup>
+                        </m:num>
+                        <m:den>
+                          <m:r>
+                            <a:rPr lang="en-US" i="1">
+                              <a:latin typeface="Cambria Math" panose="02040503050406030204" pitchFamily="18" charset="0"/>
+                              <a:ea typeface="Cambria Math" panose="02040503050406030204" pitchFamily="18" charset="0"/>
+                            </a:rPr>
+                            <m:t>1−</m:t>
+                          </m:r>
+                          <m:r>
+                            <a:rPr lang="en-US" i="1">
+                              <a:latin typeface="Cambria Math" panose="02040503050406030204" pitchFamily="18" charset="0"/>
+                              <a:ea typeface="Cambria Math" panose="02040503050406030204" pitchFamily="18" charset="0"/>
+                            </a:rPr>
+                            <m:t>𝜌</m:t>
+                          </m:r>
+                        </m:den>
+                      </m:f>
                     </m:oMath>
                   </m:oMathPara>
                 </a14:m>
@@ -4074,7 +4185,7 @@
             </p:txBody>
           </p:sp>
         </mc:Choice>
-        <mc:Fallback xmlns="">
+        <mc:Fallback>
           <p:sp>
             <p:nvSpPr>
               <p:cNvPr id="3" name="Content Placeholder 2"/>
@@ -4121,110 +4232,7 @@
   <p:timing>
     <p:tnLst>
       <p:par>
-        <p:cTn id="1" dur="indefinite" restart="never" nodeType="tmRoot">
-          <p:childTnLst>
-            <p:seq concurrent="1" nextAc="seek">
-              <p:cTn id="2" dur="indefinite" nodeType="mainSeq">
-                <p:childTnLst>
-                  <p:par>
-                    <p:cTn id="3" fill="hold">
-                      <p:stCondLst>
-                        <p:cond delay="indefinite"/>
-                      </p:stCondLst>
-                      <p:childTnLst>
-                        <p:par>
-                          <p:cTn id="4" fill="hold">
-                            <p:stCondLst>
-                              <p:cond delay="0"/>
-                            </p:stCondLst>
-                            <p:childTnLst>
-                              <p:par>
-                                <p:cTn id="5" presetID="1" presetClass="entr" presetSubtype="0" fill="hold" nodeType="clickEffect">
-                                  <p:stCondLst>
-                                    <p:cond delay="0"/>
-                                  </p:stCondLst>
-                                  <p:childTnLst>
-                                    <p:set>
-                                      <p:cBhvr>
-                                        <p:cTn id="6" dur="1" fill="hold">
-                                          <p:stCondLst>
-                                            <p:cond delay="0"/>
-                                          </p:stCondLst>
-                                        </p:cTn>
-                                        <p:tgtEl>
-                                          <p:spTgt spid="3">
-                                            <p:txEl>
-                                              <p:pRg st="6" end="6"/>
-                                            </p:txEl>
-                                          </p:spTgt>
-                                        </p:tgtEl>
-                                        <p:attrNameLst>
-                                          <p:attrName>style.visibility</p:attrName>
-                                        </p:attrNameLst>
-                                      </p:cBhvr>
-                                      <p:to>
-                                        <p:strVal val="visible"/>
-                                      </p:to>
-                                    </p:set>
-                                  </p:childTnLst>
-                                </p:cTn>
-                              </p:par>
-                              <p:par>
-                                <p:cTn id="7" presetID="1" presetClass="entr" presetSubtype="0" fill="hold" nodeType="withEffect">
-                                  <p:stCondLst>
-                                    <p:cond delay="0"/>
-                                  </p:stCondLst>
-                                  <p:childTnLst>
-                                    <p:set>
-                                      <p:cBhvr>
-                                        <p:cTn id="8" dur="1" fill="hold">
-                                          <p:stCondLst>
-                                            <p:cond delay="0"/>
-                                          </p:stCondLst>
-                                        </p:cTn>
-                                        <p:tgtEl>
-                                          <p:spTgt spid="3">
-                                            <p:txEl>
-                                              <p:pRg st="7" end="7"/>
-                                            </p:txEl>
-                                          </p:spTgt>
-                                        </p:tgtEl>
-                                        <p:attrNameLst>
-                                          <p:attrName>style.visibility</p:attrName>
-                                        </p:attrNameLst>
-                                      </p:cBhvr>
-                                      <p:to>
-                                        <p:strVal val="visible"/>
-                                      </p:to>
-                                    </p:set>
-                                  </p:childTnLst>
-                                </p:cTn>
-                              </p:par>
-                            </p:childTnLst>
-                          </p:cTn>
-                        </p:par>
-                      </p:childTnLst>
-                    </p:cTn>
-                  </p:par>
-                </p:childTnLst>
-              </p:cTn>
-              <p:prevCondLst>
-                <p:cond evt="onPrev" delay="0">
-                  <p:tgtEl>
-                    <p:sldTgt/>
-                  </p:tgtEl>
-                </p:cond>
-              </p:prevCondLst>
-              <p:nextCondLst>
-                <p:cond evt="onNext" delay="0">
-                  <p:tgtEl>
-                    <p:sldTgt/>
-                  </p:tgtEl>
-                </p:cond>
-              </p:nextCondLst>
-            </p:seq>
-          </p:childTnLst>
-        </p:cTn>
+        <p:cTn id="1" dur="indefinite" restart="never" nodeType="tmRoot"/>
       </p:par>
     </p:tnLst>
   </p:timing>
@@ -4305,7 +4313,6 @@
               <a:rPr lang="en-US" b="1" dirty="0" smtClean="0"/>
               <a:t>[Look at map example in GitHub]</a:t>
             </a:r>
-            <a:endParaRPr lang="en-US" b="1" dirty="0" smtClean="0"/>
           </a:p>
         </p:txBody>
       </p:sp>
@@ -4409,7 +4416,7 @@
             </a:r>
             <a:r>
               <a:rPr lang="en-US" i="1" dirty="0" err="1" smtClean="0"/>
-              <a:t>FishLife</a:t>
+              <a:t>FishData</a:t>
             </a:r>
             <a:endParaRPr lang="en-US" dirty="0" smtClean="0"/>
           </a:p>
@@ -4418,7 +4425,6 @@
               <a:rPr lang="en-US" dirty="0" smtClean="0"/>
               <a:t>Contains data for 100s of fish populations worldwide</a:t>
             </a:r>
-            <a:endParaRPr lang="en-US" dirty="0" smtClean="0"/>
           </a:p>
           <a:p>
             <a:pPr marL="0" indent="0">
@@ -5885,6 +5891,838 @@
       </p:sp>
       <mc:AlternateContent xmlns:mc="http://schemas.openxmlformats.org/markup-compatibility/2006">
         <mc:Choice xmlns:a14="http://schemas.microsoft.com/office/drawing/2010/main" Requires="a14">
+          <p:sp>
+            <p:nvSpPr>
+              <p:cNvPr id="3" name="Content Placeholder 2"/>
+              <p:cNvSpPr>
+                <a:spLocks noGrp="1"/>
+              </p:cNvSpPr>
+              <p:nvPr>
+                <p:ph idx="1"/>
+              </p:nvPr>
+            </p:nvSpPr>
+            <p:spPr/>
+            <p:txBody>
+              <a:bodyPr/>
+              <a:lstStyle/>
+              <a:p>
+                <a:pPr marL="0" indent="0">
+                  <a:buNone/>
+                </a:pPr>
+                <a:r>
+                  <a:rPr lang="en-US" b="1" dirty="0" smtClean="0"/>
+                  <a:t>Gompertz model for Pollock</a:t>
+                </a:r>
+              </a:p>
+              <a:p>
+                <a:pPr marL="0" indent="0">
+                  <a:buNone/>
+                </a:pPr>
+                <a14:m>
+                  <m:oMathPara xmlns:m="http://schemas.openxmlformats.org/officeDocument/2006/math">
+                    <m:oMathParaPr>
+                      <m:jc m:val="centerGroup"/>
+                    </m:oMathParaPr>
+                    <m:oMath xmlns:m="http://schemas.openxmlformats.org/officeDocument/2006/math">
+                      <m:func>
+                        <m:funcPr>
+                          <m:ctrlPr>
+                            <a:rPr lang="en-US" b="0" i="1" smtClean="0">
+                              <a:latin typeface="Cambria Math" panose="02040503050406030204" pitchFamily="18" charset="0"/>
+                            </a:rPr>
+                          </m:ctrlPr>
+                        </m:funcPr>
+                        <m:fName>
+                          <m:r>
+                            <m:rPr>
+                              <m:sty m:val="p"/>
+                            </m:rPr>
+                            <a:rPr lang="en-US" b="0" i="0" smtClean="0">
+                              <a:latin typeface="Cambria Math" panose="02040503050406030204" pitchFamily="18" charset="0"/>
+                            </a:rPr>
+                            <m:t>log</m:t>
+                          </m:r>
+                        </m:fName>
+                        <m:e>
+                          <m:d>
+                            <m:dPr>
+                              <m:ctrlPr>
+                                <a:rPr lang="en-US" b="0" i="1" smtClean="0">
+                                  <a:latin typeface="Cambria Math" panose="02040503050406030204" pitchFamily="18" charset="0"/>
+                                </a:rPr>
+                              </m:ctrlPr>
+                            </m:dPr>
+                            <m:e>
+                              <m:sSub>
+                                <m:sSubPr>
+                                  <m:ctrlPr>
+                                    <a:rPr lang="en-US" i="1">
+                                      <a:latin typeface="Cambria Math" panose="02040503050406030204" pitchFamily="18" charset="0"/>
+                                    </a:rPr>
+                                  </m:ctrlPr>
+                                </m:sSubPr>
+                                <m:e>
+                                  <m:r>
+                                    <a:rPr lang="en-US" i="1">
+                                      <a:latin typeface="Cambria Math" panose="02040503050406030204" pitchFamily="18" charset="0"/>
+                                    </a:rPr>
+                                    <m:t>𝑑</m:t>
+                                  </m:r>
+                                </m:e>
+                                <m:sub>
+                                  <m:r>
+                                    <a:rPr lang="en-US" i="1">
+                                      <a:latin typeface="Cambria Math" panose="02040503050406030204" pitchFamily="18" charset="0"/>
+                                    </a:rPr>
+                                    <m:t>𝑡</m:t>
+                                  </m:r>
+                                  <m:r>
+                                    <a:rPr lang="en-US" i="1">
+                                      <a:latin typeface="Cambria Math" panose="02040503050406030204" pitchFamily="18" charset="0"/>
+                                    </a:rPr>
+                                    <m:t>+1</m:t>
+                                  </m:r>
+                                </m:sub>
+                              </m:sSub>
+                            </m:e>
+                          </m:d>
+                        </m:e>
+                      </m:func>
+                      <m:r>
+                        <a:rPr lang="en-US" b="0" i="1" smtClean="0">
+                          <a:latin typeface="Cambria Math" panose="02040503050406030204" pitchFamily="18" charset="0"/>
+                        </a:rPr>
+                        <m:t>=</m:t>
+                      </m:r>
+                      <m:r>
+                        <a:rPr lang="en-US" i="1">
+                          <a:latin typeface="Cambria Math" panose="02040503050406030204" pitchFamily="18" charset="0"/>
+                          <a:ea typeface="Cambria Math" panose="02040503050406030204" pitchFamily="18" charset="0"/>
+                        </a:rPr>
+                        <m:t>𝛼</m:t>
+                      </m:r>
+                      <m:r>
+                        <a:rPr lang="en-US" b="0" i="1" smtClean="0">
+                          <a:latin typeface="Cambria Math" panose="02040503050406030204" pitchFamily="18" charset="0"/>
+                          <a:ea typeface="Cambria Math" panose="02040503050406030204" pitchFamily="18" charset="0"/>
+                        </a:rPr>
+                        <m:t>+(1−</m:t>
+                      </m:r>
+                      <m:r>
+                        <a:rPr lang="en-US" b="0" i="1" smtClean="0">
+                          <a:latin typeface="Cambria Math" panose="02040503050406030204" pitchFamily="18" charset="0"/>
+                          <a:ea typeface="Cambria Math" panose="02040503050406030204" pitchFamily="18" charset="0"/>
+                        </a:rPr>
+                        <m:t>𝛽</m:t>
+                      </m:r>
+                      <m:r>
+                        <a:rPr lang="en-US" b="0" i="1" smtClean="0">
+                          <a:latin typeface="Cambria Math" panose="02040503050406030204" pitchFamily="18" charset="0"/>
+                          <a:ea typeface="Cambria Math" panose="02040503050406030204" pitchFamily="18" charset="0"/>
+                        </a:rPr>
+                        <m:t>)</m:t>
+                      </m:r>
+                      <m:func>
+                        <m:funcPr>
+                          <m:ctrlPr>
+                            <a:rPr lang="en-US" b="0" i="1" smtClean="0">
+                              <a:latin typeface="Cambria Math" panose="02040503050406030204" pitchFamily="18" charset="0"/>
+                              <a:ea typeface="Cambria Math" panose="02040503050406030204" pitchFamily="18" charset="0"/>
+                            </a:rPr>
+                          </m:ctrlPr>
+                        </m:funcPr>
+                        <m:fName>
+                          <m:r>
+                            <m:rPr>
+                              <m:sty m:val="p"/>
+                            </m:rPr>
+                            <a:rPr lang="en-US" b="0" i="0" smtClean="0">
+                              <a:latin typeface="Cambria Math" panose="02040503050406030204" pitchFamily="18" charset="0"/>
+                              <a:ea typeface="Cambria Math" panose="02040503050406030204" pitchFamily="18" charset="0"/>
+                            </a:rPr>
+                            <m:t>log</m:t>
+                          </m:r>
+                        </m:fName>
+                        <m:e>
+                          <m:d>
+                            <m:dPr>
+                              <m:ctrlPr>
+                                <a:rPr lang="en-US" b="0" i="1" smtClean="0">
+                                  <a:latin typeface="Cambria Math" panose="02040503050406030204" pitchFamily="18" charset="0"/>
+                                  <a:ea typeface="Cambria Math" panose="02040503050406030204" pitchFamily="18" charset="0"/>
+                                </a:rPr>
+                              </m:ctrlPr>
+                            </m:dPr>
+                            <m:e>
+                              <m:sSub>
+                                <m:sSubPr>
+                                  <m:ctrlPr>
+                                    <a:rPr lang="en-US" b="0" i="1" smtClean="0">
+                                      <a:latin typeface="Cambria Math" panose="02040503050406030204" pitchFamily="18" charset="0"/>
+                                      <a:ea typeface="Cambria Math" panose="02040503050406030204" pitchFamily="18" charset="0"/>
+                                    </a:rPr>
+                                  </m:ctrlPr>
+                                </m:sSubPr>
+                                <m:e>
+                                  <m:r>
+                                    <a:rPr lang="en-US" b="0" i="1" smtClean="0">
+                                      <a:latin typeface="Cambria Math" panose="02040503050406030204" pitchFamily="18" charset="0"/>
+                                      <a:ea typeface="Cambria Math" panose="02040503050406030204" pitchFamily="18" charset="0"/>
+                                    </a:rPr>
+                                    <m:t>𝑑</m:t>
+                                  </m:r>
+                                </m:e>
+                                <m:sub>
+                                  <m:r>
+                                    <a:rPr lang="en-US" b="0" i="1" smtClean="0">
+                                      <a:latin typeface="Cambria Math" panose="02040503050406030204" pitchFamily="18" charset="0"/>
+                                      <a:ea typeface="Cambria Math" panose="02040503050406030204" pitchFamily="18" charset="0"/>
+                                    </a:rPr>
+                                    <m:t>𝑡</m:t>
+                                  </m:r>
+                                </m:sub>
+                              </m:sSub>
+                            </m:e>
+                          </m:d>
+                        </m:e>
+                      </m:func>
+                      <m:r>
+                        <a:rPr lang="en-US" b="0" i="0" smtClean="0">
+                          <a:latin typeface="Cambria Math" panose="02040503050406030204" pitchFamily="18" charset="0"/>
+                          <a:ea typeface="Cambria Math" panose="02040503050406030204" pitchFamily="18" charset="0"/>
+                        </a:rPr>
+                        <m:t>+</m:t>
+                      </m:r>
+                      <m:sSub>
+                        <m:sSubPr>
+                          <m:ctrlPr>
+                            <a:rPr lang="en-US" i="1">
+                              <a:latin typeface="Cambria Math" panose="02040503050406030204" pitchFamily="18" charset="0"/>
+                              <a:ea typeface="Cambria Math" panose="02040503050406030204" pitchFamily="18" charset="0"/>
+                            </a:rPr>
+                          </m:ctrlPr>
+                        </m:sSubPr>
+                        <m:e>
+                          <m:r>
+                            <a:rPr lang="en-US" i="1">
+                              <a:latin typeface="Cambria Math" panose="02040503050406030204" pitchFamily="18" charset="0"/>
+                              <a:ea typeface="Cambria Math" panose="02040503050406030204" pitchFamily="18" charset="0"/>
+                            </a:rPr>
+                            <m:t>𝜀</m:t>
+                          </m:r>
+                        </m:e>
+                        <m:sub>
+                          <m:r>
+                            <a:rPr lang="en-US" i="1">
+                              <a:latin typeface="Cambria Math" panose="02040503050406030204" pitchFamily="18" charset="0"/>
+                              <a:ea typeface="Cambria Math" panose="02040503050406030204" pitchFamily="18" charset="0"/>
+                            </a:rPr>
+                            <m:t>𝑡</m:t>
+                          </m:r>
+                        </m:sub>
+                      </m:sSub>
+                    </m:oMath>
+                  </m:oMathPara>
+                </a14:m>
+                <a:endParaRPr lang="en-GB" dirty="0" smtClean="0"/>
+              </a:p>
+              <a:p>
+                <a:pPr marL="0" indent="0">
+                  <a:buNone/>
+                </a:pPr>
+                <a14:m>
+                  <m:oMathPara xmlns:m="http://schemas.openxmlformats.org/officeDocument/2006/math">
+                    <m:oMathParaPr>
+                      <m:jc m:val="centerGroup"/>
+                    </m:oMathParaPr>
+                    <m:oMath xmlns:m="http://schemas.openxmlformats.org/officeDocument/2006/math">
+                      <m:sSub>
+                        <m:sSubPr>
+                          <m:ctrlPr>
+                            <a:rPr lang="en-US" i="1">
+                              <a:latin typeface="Cambria Math" panose="02040503050406030204" pitchFamily="18" charset="0"/>
+                              <a:ea typeface="Cambria Math" panose="02040503050406030204" pitchFamily="18" charset="0"/>
+                            </a:rPr>
+                          </m:ctrlPr>
+                        </m:sSubPr>
+                        <m:e>
+                          <m:r>
+                            <a:rPr lang="en-US" i="1">
+                              <a:latin typeface="Cambria Math" panose="02040503050406030204" pitchFamily="18" charset="0"/>
+                              <a:ea typeface="Cambria Math" panose="02040503050406030204" pitchFamily="18" charset="0"/>
+                            </a:rPr>
+                            <m:t>𝜀</m:t>
+                          </m:r>
+                        </m:e>
+                        <m:sub>
+                          <m:r>
+                            <a:rPr lang="en-US" i="1">
+                              <a:latin typeface="Cambria Math" panose="02040503050406030204" pitchFamily="18" charset="0"/>
+                              <a:ea typeface="Cambria Math" panose="02040503050406030204" pitchFamily="18" charset="0"/>
+                            </a:rPr>
+                            <m:t>𝑡</m:t>
+                          </m:r>
+                        </m:sub>
+                      </m:sSub>
+                      <m:r>
+                        <a:rPr lang="en-US" b="0" i="1" smtClean="0">
+                          <a:latin typeface="Cambria Math" panose="02040503050406030204" pitchFamily="18" charset="0"/>
+                          <a:ea typeface="Cambria Math" panose="02040503050406030204" pitchFamily="18" charset="0"/>
+                        </a:rPr>
+                        <m:t>~</m:t>
+                      </m:r>
+                      <m:r>
+                        <a:rPr lang="en-US" b="0" i="1" smtClean="0">
+                          <a:latin typeface="Cambria Math" panose="02040503050406030204" pitchFamily="18" charset="0"/>
+                          <a:ea typeface="Cambria Math" panose="02040503050406030204" pitchFamily="18" charset="0"/>
+                        </a:rPr>
+                        <m:t>𝑁𝑜𝑟𝑚𝑎𝑙</m:t>
+                      </m:r>
+                      <m:r>
+                        <a:rPr lang="en-US" b="0" i="1" smtClean="0">
+                          <a:latin typeface="Cambria Math" panose="02040503050406030204" pitchFamily="18" charset="0"/>
+                          <a:ea typeface="Cambria Math" panose="02040503050406030204" pitchFamily="18" charset="0"/>
+                        </a:rPr>
+                        <m:t>(0,</m:t>
+                      </m:r>
+                      <m:sSubSup>
+                        <m:sSubSupPr>
+                          <m:ctrlPr>
+                            <a:rPr lang="en-US" b="0" i="1" smtClean="0">
+                              <a:latin typeface="Cambria Math" panose="02040503050406030204" pitchFamily="18" charset="0"/>
+                              <a:ea typeface="Cambria Math" panose="02040503050406030204" pitchFamily="18" charset="0"/>
+                            </a:rPr>
+                          </m:ctrlPr>
+                        </m:sSubSupPr>
+                        <m:e>
+                          <m:r>
+                            <a:rPr lang="en-US" b="0" i="1" smtClean="0">
+                              <a:latin typeface="Cambria Math" panose="02040503050406030204" pitchFamily="18" charset="0"/>
+                              <a:ea typeface="Cambria Math" panose="02040503050406030204" pitchFamily="18" charset="0"/>
+                            </a:rPr>
+                            <m:t>𝜎</m:t>
+                          </m:r>
+                        </m:e>
+                        <m:sub>
+                          <m:r>
+                            <a:rPr lang="en-US" b="0" i="1" smtClean="0">
+                              <a:latin typeface="Cambria Math" panose="02040503050406030204" pitchFamily="18" charset="0"/>
+                              <a:ea typeface="Cambria Math" panose="02040503050406030204" pitchFamily="18" charset="0"/>
+                            </a:rPr>
+                            <m:t>𝜀</m:t>
+                          </m:r>
+                        </m:sub>
+                        <m:sup>
+                          <m:r>
+                            <a:rPr lang="en-US" b="0" i="1" smtClean="0">
+                              <a:latin typeface="Cambria Math" panose="02040503050406030204" pitchFamily="18" charset="0"/>
+                              <a:ea typeface="Cambria Math" panose="02040503050406030204" pitchFamily="18" charset="0"/>
+                            </a:rPr>
+                            <m:t>2</m:t>
+                          </m:r>
+                        </m:sup>
+                      </m:sSubSup>
+                      <m:r>
+                        <a:rPr lang="en-US" b="0" i="1" smtClean="0">
+                          <a:latin typeface="Cambria Math" panose="02040503050406030204" pitchFamily="18" charset="0"/>
+                          <a:ea typeface="Cambria Math" panose="02040503050406030204" pitchFamily="18" charset="0"/>
+                        </a:rPr>
+                        <m:t>)</m:t>
+                      </m:r>
+                    </m:oMath>
+                  </m:oMathPara>
+                </a14:m>
+                <a:endParaRPr lang="en-GB" dirty="0" smtClean="0"/>
+              </a:p>
+              <a:p>
+                <a:pPr marL="0" indent="0">
+                  <a:buNone/>
+                </a:pPr>
+                <a14:m>
+                  <m:oMathPara xmlns:m="http://schemas.openxmlformats.org/officeDocument/2006/math">
+                    <m:oMathParaPr>
+                      <m:jc m:val="centerGroup"/>
+                    </m:oMathParaPr>
+                    <m:oMath xmlns:m="http://schemas.openxmlformats.org/officeDocument/2006/math">
+                      <m:r>
+                        <m:rPr>
+                          <m:sty m:val="p"/>
+                        </m:rPr>
+                        <a:rPr lang="en-US" b="0" i="0" smtClean="0">
+                          <a:latin typeface="Cambria Math" panose="02040503050406030204" pitchFamily="18" charset="0"/>
+                        </a:rPr>
+                        <m:t>log</m:t>
+                      </m:r>
+                      <m:r>
+                        <a:rPr lang="en-US" b="0" i="1" smtClean="0">
+                          <a:latin typeface="Cambria Math" panose="02040503050406030204" pitchFamily="18" charset="0"/>
+                        </a:rPr>
+                        <m:t>⁡(</m:t>
+                      </m:r>
+                      <m:sSub>
+                        <m:sSubPr>
+                          <m:ctrlPr>
+                            <a:rPr lang="en-US" b="0" i="1" smtClean="0">
+                              <a:latin typeface="Cambria Math" panose="02040503050406030204" pitchFamily="18" charset="0"/>
+                            </a:rPr>
+                          </m:ctrlPr>
+                        </m:sSubPr>
+                        <m:e>
+                          <m:r>
+                            <a:rPr lang="en-US" b="0" i="1" smtClean="0">
+                              <a:latin typeface="Cambria Math" panose="02040503050406030204" pitchFamily="18" charset="0"/>
+                            </a:rPr>
+                            <m:t>𝑏</m:t>
+                          </m:r>
+                        </m:e>
+                        <m:sub>
+                          <m:r>
+                            <a:rPr lang="en-US" b="0" i="1" smtClean="0">
+                              <a:latin typeface="Cambria Math" panose="02040503050406030204" pitchFamily="18" charset="0"/>
+                            </a:rPr>
+                            <m:t>𝑡</m:t>
+                          </m:r>
+                        </m:sub>
+                      </m:sSub>
+                      <m:r>
+                        <a:rPr lang="en-US" b="0" i="1" smtClean="0">
+                          <a:latin typeface="Cambria Math" panose="02040503050406030204" pitchFamily="18" charset="0"/>
+                        </a:rPr>
+                        <m:t>)~</m:t>
+                      </m:r>
+                      <m:r>
+                        <a:rPr lang="en-US" b="0" i="1" smtClean="0">
+                          <a:latin typeface="Cambria Math" panose="02040503050406030204" pitchFamily="18" charset="0"/>
+                        </a:rPr>
+                        <m:t>𝑁𝑜𝑟𝑚𝑎𝑙</m:t>
+                      </m:r>
+                      <m:r>
+                        <a:rPr lang="en-US" b="0" i="1" smtClean="0">
+                          <a:latin typeface="Cambria Math" panose="02040503050406030204" pitchFamily="18" charset="0"/>
+                        </a:rPr>
+                        <m:t>(</m:t>
+                      </m:r>
+                      <m:func>
+                        <m:funcPr>
+                          <m:ctrlPr>
+                            <a:rPr lang="en-US" b="0" i="1" smtClean="0">
+                              <a:latin typeface="Cambria Math" panose="02040503050406030204" pitchFamily="18" charset="0"/>
+                            </a:rPr>
+                          </m:ctrlPr>
+                        </m:funcPr>
+                        <m:fName>
+                          <m:r>
+                            <m:rPr>
+                              <m:sty m:val="p"/>
+                            </m:rPr>
+                            <a:rPr lang="en-US" b="0" i="0" smtClean="0">
+                              <a:latin typeface="Cambria Math" panose="02040503050406030204" pitchFamily="18" charset="0"/>
+                            </a:rPr>
+                            <m:t>log</m:t>
+                          </m:r>
+                        </m:fName>
+                        <m:e>
+                          <m:d>
+                            <m:dPr>
+                              <m:ctrlPr>
+                                <a:rPr lang="en-US" b="0" i="1" smtClean="0">
+                                  <a:latin typeface="Cambria Math" panose="02040503050406030204" pitchFamily="18" charset="0"/>
+                                </a:rPr>
+                              </m:ctrlPr>
+                            </m:dPr>
+                            <m:e>
+                              <m:sSub>
+                                <m:sSubPr>
+                                  <m:ctrlPr>
+                                    <a:rPr lang="en-US" b="0" i="1" smtClean="0">
+                                      <a:latin typeface="Cambria Math" panose="02040503050406030204" pitchFamily="18" charset="0"/>
+                                    </a:rPr>
+                                  </m:ctrlPr>
+                                </m:sSubPr>
+                                <m:e>
+                                  <m:r>
+                                    <a:rPr lang="en-US" b="0" i="1" smtClean="0">
+                                      <a:latin typeface="Cambria Math" panose="02040503050406030204" pitchFamily="18" charset="0"/>
+                                    </a:rPr>
+                                    <m:t>𝑑</m:t>
+                                  </m:r>
+                                </m:e>
+                                <m:sub>
+                                  <m:r>
+                                    <a:rPr lang="en-US" b="0" i="1" smtClean="0">
+                                      <a:latin typeface="Cambria Math" panose="02040503050406030204" pitchFamily="18" charset="0"/>
+                                    </a:rPr>
+                                    <m:t>𝑡</m:t>
+                                  </m:r>
+                                </m:sub>
+                              </m:sSub>
+                            </m:e>
+                          </m:d>
+                        </m:e>
+                      </m:func>
+                      <m:r>
+                        <a:rPr lang="en-US" b="0" i="1" smtClean="0">
+                          <a:latin typeface="Cambria Math" panose="02040503050406030204" pitchFamily="18" charset="0"/>
+                        </a:rPr>
+                        <m:t>,</m:t>
+                      </m:r>
+                      <m:r>
+                        <a:rPr lang="en-US" b="0" i="1" smtClean="0">
+                          <a:latin typeface="Cambria Math" panose="02040503050406030204" pitchFamily="18" charset="0"/>
+                        </a:rPr>
+                        <m:t>𝑆𝐸</m:t>
+                      </m:r>
+                      <m:sSup>
+                        <m:sSupPr>
+                          <m:ctrlPr>
+                            <a:rPr lang="en-US" b="0" i="1" smtClean="0">
+                              <a:latin typeface="Cambria Math" panose="02040503050406030204" pitchFamily="18" charset="0"/>
+                            </a:rPr>
+                          </m:ctrlPr>
+                        </m:sSupPr>
+                        <m:e>
+                          <m:d>
+                            <m:dPr>
+                              <m:ctrlPr>
+                                <a:rPr lang="en-US" b="0" i="1" smtClean="0">
+                                  <a:latin typeface="Cambria Math" panose="02040503050406030204" pitchFamily="18" charset="0"/>
+                                </a:rPr>
+                              </m:ctrlPr>
+                            </m:dPr>
+                            <m:e>
+                              <m:func>
+                                <m:funcPr>
+                                  <m:ctrlPr>
+                                    <a:rPr lang="en-US" b="0" i="1" smtClean="0">
+                                      <a:latin typeface="Cambria Math" panose="02040503050406030204" pitchFamily="18" charset="0"/>
+                                    </a:rPr>
+                                  </m:ctrlPr>
+                                </m:funcPr>
+                                <m:fName>
+                                  <m:r>
+                                    <m:rPr>
+                                      <m:sty m:val="p"/>
+                                    </m:rPr>
+                                    <a:rPr lang="en-US" b="0" i="0" smtClean="0">
+                                      <a:latin typeface="Cambria Math" panose="02040503050406030204" pitchFamily="18" charset="0"/>
+                                    </a:rPr>
+                                    <m:t>log</m:t>
+                                  </m:r>
+                                </m:fName>
+                                <m:e>
+                                  <m:d>
+                                    <m:dPr>
+                                      <m:ctrlPr>
+                                        <a:rPr lang="en-US" b="0" i="1" smtClean="0">
+                                          <a:latin typeface="Cambria Math" panose="02040503050406030204" pitchFamily="18" charset="0"/>
+                                        </a:rPr>
+                                      </m:ctrlPr>
+                                    </m:dPr>
+                                    <m:e>
+                                      <m:sSub>
+                                        <m:sSubPr>
+                                          <m:ctrlPr>
+                                            <a:rPr lang="en-US" b="0" i="1" smtClean="0">
+                                              <a:latin typeface="Cambria Math" panose="02040503050406030204" pitchFamily="18" charset="0"/>
+                                            </a:rPr>
+                                          </m:ctrlPr>
+                                        </m:sSubPr>
+                                        <m:e>
+                                          <m:r>
+                                            <a:rPr lang="en-US" b="0" i="1" smtClean="0">
+                                              <a:latin typeface="Cambria Math" panose="02040503050406030204" pitchFamily="18" charset="0"/>
+                                            </a:rPr>
+                                            <m:t>𝑏</m:t>
+                                          </m:r>
+                                        </m:e>
+                                        <m:sub>
+                                          <m:r>
+                                            <a:rPr lang="en-US" b="0" i="1" smtClean="0">
+                                              <a:latin typeface="Cambria Math" panose="02040503050406030204" pitchFamily="18" charset="0"/>
+                                            </a:rPr>
+                                            <m:t>𝑡</m:t>
+                                          </m:r>
+                                        </m:sub>
+                                      </m:sSub>
+                                    </m:e>
+                                  </m:d>
+                                </m:e>
+                              </m:func>
+                            </m:e>
+                          </m:d>
+                        </m:e>
+                        <m:sup>
+                          <m:r>
+                            <a:rPr lang="en-US" b="0" i="1" smtClean="0">
+                              <a:latin typeface="Cambria Math" panose="02040503050406030204" pitchFamily="18" charset="0"/>
+                            </a:rPr>
+                            <m:t>2</m:t>
+                          </m:r>
+                        </m:sup>
+                      </m:sSup>
+                      <m:r>
+                        <a:rPr lang="en-US" b="0" i="1" smtClean="0">
+                          <a:latin typeface="Cambria Math" panose="02040503050406030204" pitchFamily="18" charset="0"/>
+                        </a:rPr>
+                        <m:t>+</m:t>
+                      </m:r>
+                      <m:sSubSup>
+                        <m:sSubSupPr>
+                          <m:ctrlPr>
+                            <a:rPr lang="en-US" b="0" i="1" smtClean="0">
+                              <a:latin typeface="Cambria Math" panose="02040503050406030204" pitchFamily="18" charset="0"/>
+                              <a:ea typeface="Cambria Math" panose="02040503050406030204" pitchFamily="18" charset="0"/>
+                            </a:rPr>
+                          </m:ctrlPr>
+                        </m:sSubSupPr>
+                        <m:e>
+                          <m:r>
+                            <a:rPr lang="en-US" b="0" i="1" smtClean="0">
+                              <a:latin typeface="Cambria Math" panose="02040503050406030204" pitchFamily="18" charset="0"/>
+                              <a:ea typeface="Cambria Math" panose="02040503050406030204" pitchFamily="18" charset="0"/>
+                            </a:rPr>
+                            <m:t>𝜎</m:t>
+                          </m:r>
+                        </m:e>
+                        <m:sub>
+                          <m:r>
+                            <a:rPr lang="en-US" b="0" i="1" smtClean="0">
+                              <a:latin typeface="Cambria Math" panose="02040503050406030204" pitchFamily="18" charset="0"/>
+                              <a:ea typeface="Cambria Math" panose="02040503050406030204" pitchFamily="18" charset="0"/>
+                            </a:rPr>
+                            <m:t>𝑏</m:t>
+                          </m:r>
+                        </m:sub>
+                        <m:sup>
+                          <m:r>
+                            <a:rPr lang="en-US" b="0" i="1" smtClean="0">
+                              <a:latin typeface="Cambria Math" panose="02040503050406030204" pitchFamily="18" charset="0"/>
+                              <a:ea typeface="Cambria Math" panose="02040503050406030204" pitchFamily="18" charset="0"/>
+                            </a:rPr>
+                            <m:t>2</m:t>
+                          </m:r>
+                        </m:sup>
+                      </m:sSubSup>
+                      <m:r>
+                        <a:rPr lang="en-US" b="0" i="1" smtClean="0">
+                          <a:latin typeface="Cambria Math" panose="02040503050406030204" pitchFamily="18" charset="0"/>
+                          <a:ea typeface="Cambria Math" panose="02040503050406030204" pitchFamily="18" charset="0"/>
+                        </a:rPr>
+                        <m:t>)</m:t>
+                      </m:r>
+                    </m:oMath>
+                  </m:oMathPara>
+                </a14:m>
+                <a:endParaRPr lang="en-GB" dirty="0" smtClean="0"/>
+              </a:p>
+              <a:p>
+                <a:pPr lvl="1"/>
+                <a:r>
+                  <a:rPr lang="en-US" dirty="0" smtClean="0"/>
+                  <a:t>Where</a:t>
+                </a:r>
+              </a:p>
+              <a:p>
+                <a:pPr lvl="2"/>
+                <a14:m>
+                  <m:oMath xmlns:m="http://schemas.openxmlformats.org/officeDocument/2006/math">
+                    <m:r>
+                      <a:rPr lang="en-US" i="1">
+                        <a:latin typeface="Cambria Math" panose="02040503050406030204" pitchFamily="18" charset="0"/>
+                      </a:rPr>
+                      <m:t>𝑆𝐸</m:t>
+                    </m:r>
+                    <m:sSup>
+                      <m:sSupPr>
+                        <m:ctrlPr>
+                          <a:rPr lang="en-US" i="1">
+                            <a:latin typeface="Cambria Math" panose="02040503050406030204" pitchFamily="18" charset="0"/>
+                          </a:rPr>
+                        </m:ctrlPr>
+                      </m:sSupPr>
+                      <m:e>
+                        <m:d>
+                          <m:dPr>
+                            <m:ctrlPr>
+                              <a:rPr lang="en-US" i="1">
+                                <a:latin typeface="Cambria Math" panose="02040503050406030204" pitchFamily="18" charset="0"/>
+                              </a:rPr>
+                            </m:ctrlPr>
+                          </m:dPr>
+                          <m:e>
+                            <m:func>
+                              <m:funcPr>
+                                <m:ctrlPr>
+                                  <a:rPr lang="en-US" i="1">
+                                    <a:latin typeface="Cambria Math" panose="02040503050406030204" pitchFamily="18" charset="0"/>
+                                  </a:rPr>
+                                </m:ctrlPr>
+                              </m:funcPr>
+                              <m:fName>
+                                <m:r>
+                                  <m:rPr>
+                                    <m:sty m:val="p"/>
+                                  </m:rPr>
+                                  <a:rPr lang="en-US">
+                                    <a:latin typeface="Cambria Math" panose="02040503050406030204" pitchFamily="18" charset="0"/>
+                                  </a:rPr>
+                                  <m:t>log</m:t>
+                                </m:r>
+                              </m:fName>
+                              <m:e>
+                                <m:d>
+                                  <m:dPr>
+                                    <m:ctrlPr>
+                                      <a:rPr lang="en-US" i="1">
+                                        <a:latin typeface="Cambria Math" panose="02040503050406030204" pitchFamily="18" charset="0"/>
+                                      </a:rPr>
+                                    </m:ctrlPr>
+                                  </m:dPr>
+                                  <m:e>
+                                    <m:sSub>
+                                      <m:sSubPr>
+                                        <m:ctrlPr>
+                                          <a:rPr lang="en-US" i="1">
+                                            <a:latin typeface="Cambria Math" panose="02040503050406030204" pitchFamily="18" charset="0"/>
+                                          </a:rPr>
+                                        </m:ctrlPr>
+                                      </m:sSubPr>
+                                      <m:e>
+                                        <m:r>
+                                          <a:rPr lang="en-US" i="1">
+                                            <a:latin typeface="Cambria Math" panose="02040503050406030204" pitchFamily="18" charset="0"/>
+                                          </a:rPr>
+                                          <m:t>𝑏</m:t>
+                                        </m:r>
+                                      </m:e>
+                                      <m:sub>
+                                        <m:r>
+                                          <a:rPr lang="en-US" i="1">
+                                            <a:latin typeface="Cambria Math" panose="02040503050406030204" pitchFamily="18" charset="0"/>
+                                          </a:rPr>
+                                          <m:t>𝑡</m:t>
+                                        </m:r>
+                                      </m:sub>
+                                    </m:sSub>
+                                  </m:e>
+                                </m:d>
+                              </m:e>
+                            </m:func>
+                          </m:e>
+                        </m:d>
+                      </m:e>
+                      <m:sup>
+                        <m:r>
+                          <a:rPr lang="en-US" i="1">
+                            <a:latin typeface="Cambria Math" panose="02040503050406030204" pitchFamily="18" charset="0"/>
+                          </a:rPr>
+                          <m:t>2</m:t>
+                        </m:r>
+                      </m:sup>
+                    </m:sSup>
+                  </m:oMath>
+                </a14:m>
+                <a:r>
+                  <a:rPr lang="en-GB" dirty="0" smtClean="0"/>
+                  <a:t> is the variance of our index given variation in field-sampling data</a:t>
+                </a:r>
+                <a:endParaRPr lang="en-GB" dirty="0" smtClean="0"/>
+              </a:p>
+            </p:txBody>
+          </p:sp>
+        </mc:Choice>
+        <mc:Fallback>
+          <p:sp>
+            <p:nvSpPr>
+              <p:cNvPr id="3" name="Content Placeholder 2"/>
+              <p:cNvSpPr>
+                <a:spLocks noGrp="1" noRot="1" noChangeAspect="1" noMove="1" noResize="1" noEditPoints="1" noAdjustHandles="1" noChangeArrowheads="1" noChangeShapeType="1" noTextEdit="1"/>
+              </p:cNvSpPr>
+              <p:nvPr>
+                <p:ph idx="1"/>
+              </p:nvPr>
+            </p:nvSpPr>
+            <p:spPr>
+              <a:blipFill>
+                <a:blip r:embed="rId2"/>
+                <a:stretch>
+                  <a:fillRect l="-1424" t="-1026" r="-407"/>
+                </a:stretch>
+              </a:blipFill>
+            </p:spPr>
+            <p:txBody>
+              <a:bodyPr/>
+              <a:lstStyle/>
+              <a:p>
+                <a:r>
+                  <a:rPr lang="en-GB">
+                    <a:noFill/>
+                  </a:rPr>
+                  <a:t> </a:t>
+                </a:r>
+              </a:p>
+            </p:txBody>
+          </p:sp>
+        </mc:Fallback>
+      </mc:AlternateContent>
+    </p:spTree>
+    <p:extLst>
+      <p:ext uri="{BB962C8B-B14F-4D97-AF65-F5344CB8AC3E}">
+        <p14:creationId xmlns:p14="http://schemas.microsoft.com/office/powerpoint/2010/main" val="3076822261"/>
+      </p:ext>
+    </p:extLst>
+  </p:cSld>
+  <p:clrMapOvr>
+    <a:masterClrMapping/>
+  </p:clrMapOvr>
+  <p:timing>
+    <p:tnLst>
+      <p:par>
+        <p:cTn id="1" dur="indefinite" restart="never" nodeType="tmRoot"/>
+      </p:par>
+    </p:tnLst>
+  </p:timing>
+</p:sld>
+</file>
+
+<file path=ppt/slides/slide16.xml><?xml version="1.0" encoding="utf-8"?>
+<p:sld xmlns:a="http://schemas.openxmlformats.org/drawingml/2006/main" xmlns:r="http://schemas.openxmlformats.org/officeDocument/2006/relationships" xmlns:p="http://schemas.openxmlformats.org/presentationml/2006/main">
+  <p:cSld>
+    <p:spTree>
+      <p:nvGrpSpPr>
+        <p:cNvPr id="1" name=""/>
+        <p:cNvGrpSpPr/>
+        <p:nvPr/>
+      </p:nvGrpSpPr>
+      <p:grpSpPr>
+        <a:xfrm>
+          <a:off x="0" y="0"/>
+          <a:ext cx="0" cy="0"/>
+          <a:chOff x="0" y="0"/>
+          <a:chExt cx="0" cy="0"/>
+        </a:xfrm>
+      </p:grpSpPr>
+      <p:sp>
+        <p:nvSpPr>
+          <p:cNvPr id="2" name="Title 1"/>
+          <p:cNvSpPr>
+            <a:spLocks noGrp="1"/>
+          </p:cNvSpPr>
+          <p:nvPr>
+            <p:ph type="title"/>
+          </p:nvPr>
+        </p:nvSpPr>
+        <p:spPr/>
+        <p:txBody>
+          <a:bodyPr/>
+          <a:lstStyle/>
+          <a:p>
+            <a:endParaRPr lang="en-GB"/>
+          </a:p>
+        </p:txBody>
+      </p:sp>
+      <mc:AlternateContent xmlns:mc="http://schemas.openxmlformats.org/markup-compatibility/2006" xmlns:a14="http://schemas.microsoft.com/office/drawing/2010/main">
+        <mc:Choice Requires="a14">
           <p:sp>
             <p:nvSpPr>
               <p:cNvPr id="3" name="Content Placeholder 2"/>
@@ -6551,7 +7389,7 @@
             </p:txBody>
           </p:sp>
         </mc:Choice>
-        <mc:Fallback>
+        <mc:Fallback xmlns="">
           <p:sp>
             <p:nvSpPr>
               <p:cNvPr id="3" name="Content Placeholder 2"/>
@@ -6739,7 +7577,7 @@
 </p:sld>
 </file>
 
-<file path=ppt/slides/slide16.xml><?xml version="1.0" encoding="utf-8"?>
+<file path=ppt/slides/slide17.xml><?xml version="1.0" encoding="utf-8"?>
 <p:sld xmlns:a="http://schemas.openxmlformats.org/drawingml/2006/main" xmlns:r="http://schemas.openxmlformats.org/officeDocument/2006/relationships" xmlns:p="http://schemas.openxmlformats.org/presentationml/2006/main">
   <p:cSld>
     <p:spTree>
@@ -6775,8 +7613,8 @@
           </a:p>
         </p:txBody>
       </p:sp>
-      <mc:AlternateContent xmlns:mc="http://schemas.openxmlformats.org/markup-compatibility/2006">
-        <mc:Choice xmlns:a14="http://schemas.microsoft.com/office/drawing/2010/main" Requires="a14">
+      <mc:AlternateContent xmlns:mc="http://schemas.openxmlformats.org/markup-compatibility/2006" xmlns:a14="http://schemas.microsoft.com/office/drawing/2010/main">
+        <mc:Choice Requires="a14">
           <p:sp>
             <p:nvSpPr>
               <p:cNvPr id="3" name="Content Placeholder 2"/>
@@ -7153,14 +7991,7 @@
                               <a:latin typeface="Cambria Math" panose="02040503050406030204" pitchFamily="18" charset="0"/>
                               <a:ea typeface="Cambria Math" panose="02040503050406030204" pitchFamily="18" charset="0"/>
                             </a:rPr>
-                            <m:t>−</m:t>
-                          </m:r>
-                          <m:r>
-                            <a:rPr lang="en-US" b="0" i="1" smtClean="0">
-                              <a:latin typeface="Cambria Math" panose="02040503050406030204" pitchFamily="18" charset="0"/>
-                              <a:ea typeface="Cambria Math" panose="02040503050406030204" pitchFamily="18" charset="0"/>
-                            </a:rPr>
-                            <m:t>1</m:t>
+                            <m:t>−1</m:t>
                           </m:r>
                         </m:e>
                       </m:rad>
@@ -7299,13 +8130,7 @@
                                 <a:rPr lang="en-US" b="0" i="1" smtClean="0">
                                   <a:latin typeface="Cambria Math" panose="02040503050406030204" pitchFamily="18" charset="0"/>
                                 </a:rPr>
-                                <m:t>+</m:t>
-                              </m:r>
-                              <m:r>
-                                <a:rPr lang="en-US" b="0" i="1" smtClean="0">
-                                  <a:latin typeface="Cambria Math" panose="02040503050406030204" pitchFamily="18" charset="0"/>
-                                </a:rPr>
-                                <m:t>1</m:t>
+                                <m:t>+1</m:t>
                               </m:r>
                             </m:e>
                           </m:d>
@@ -7319,7 +8144,7 @@
             </p:txBody>
           </p:sp>
         </mc:Choice>
-        <mc:Fallback>
+        <mc:Fallback xmlns="">
           <p:sp>
             <p:nvSpPr>
               <p:cNvPr id="3" name="Content Placeholder 2"/>
@@ -7373,7 +8198,7 @@
 </p:sld>
 </file>
 
-<file path=ppt/slides/slide17.xml><?xml version="1.0" encoding="utf-8"?>
+<file path=ppt/slides/slide18.xml><?xml version="1.0" encoding="utf-8"?>
 <p:sld xmlns:a="http://schemas.openxmlformats.org/drawingml/2006/main" xmlns:r="http://schemas.openxmlformats.org/officeDocument/2006/relationships" xmlns:p="http://schemas.openxmlformats.org/presentationml/2006/main">
   <p:cSld>
     <p:spTree>
@@ -7447,7 +8272,6 @@
               <a:rPr lang="en-US" b="1" dirty="0" smtClean="0"/>
               <a:t>[Add sampling variance and re-run]</a:t>
             </a:r>
-            <a:endParaRPr lang="en-US" b="1" dirty="0" smtClean="0"/>
           </a:p>
         </p:txBody>
       </p:sp>
@@ -7471,7 +8295,7 @@
 </p:sld>
 </file>
 
-<file path=ppt/slides/slide18.xml><?xml version="1.0" encoding="utf-8"?>
+<file path=ppt/slides/slide19.xml><?xml version="1.0" encoding="utf-8"?>
 <p:sld xmlns:a="http://schemas.openxmlformats.org/drawingml/2006/main" xmlns:r="http://schemas.openxmlformats.org/officeDocument/2006/relationships" xmlns:p="http://schemas.openxmlformats.org/presentationml/2006/main">
   <p:cSld>
     <p:spTree>
@@ -8814,112 +9638,6 @@
 </p:sld>
 </file>
 
-<file path=ppt/slides/slide19.xml><?xml version="1.0" encoding="utf-8"?>
-<p:sld xmlns:a="http://schemas.openxmlformats.org/drawingml/2006/main" xmlns:r="http://schemas.openxmlformats.org/officeDocument/2006/relationships" xmlns:p="http://schemas.openxmlformats.org/presentationml/2006/main">
-  <p:cSld>
-    <p:spTree>
-      <p:nvGrpSpPr>
-        <p:cNvPr id="1" name=""/>
-        <p:cNvGrpSpPr/>
-        <p:nvPr/>
-      </p:nvGrpSpPr>
-      <p:grpSpPr>
-        <a:xfrm>
-          <a:off x="0" y="0"/>
-          <a:ext cx="0" cy="0"/>
-          <a:chOff x="0" y="0"/>
-          <a:chExt cx="0" cy="0"/>
-        </a:xfrm>
-      </p:grpSpPr>
-      <p:sp>
-        <p:nvSpPr>
-          <p:cNvPr id="2" name="Title 1"/>
-          <p:cNvSpPr>
-            <a:spLocks noGrp="1"/>
-          </p:cNvSpPr>
-          <p:nvPr>
-            <p:ph type="title"/>
-          </p:nvPr>
-        </p:nvSpPr>
-        <p:spPr/>
-        <p:txBody>
-          <a:bodyPr/>
-          <a:lstStyle/>
-          <a:p>
-            <a:endParaRPr lang="en-GB"/>
-          </a:p>
-        </p:txBody>
-      </p:sp>
-      <p:sp>
-        <p:nvSpPr>
-          <p:cNvPr id="3" name="Content Placeholder 2"/>
-          <p:cNvSpPr>
-            <a:spLocks noGrp="1"/>
-          </p:cNvSpPr>
-          <p:nvPr>
-            <p:ph idx="1"/>
-          </p:nvPr>
-        </p:nvSpPr>
-        <p:spPr/>
-        <p:txBody>
-          <a:bodyPr/>
-          <a:lstStyle/>
-          <a:p>
-            <a:pPr marL="0" indent="0">
-              <a:buNone/>
-            </a:pPr>
-            <a:r>
-              <a:rPr lang="en-US" b="1" dirty="0" smtClean="0"/>
-              <a:t>Lab exercise</a:t>
-            </a:r>
-            <a:endParaRPr lang="en-US" dirty="0" smtClean="0"/>
-          </a:p>
-          <a:p>
-            <a:pPr marL="0" indent="0">
-              <a:buNone/>
-            </a:pPr>
-            <a:endParaRPr lang="en-US" b="1" dirty="0"/>
-          </a:p>
-          <a:p>
-            <a:pPr marL="0" indent="0">
-              <a:buNone/>
-            </a:pPr>
-            <a:r>
-              <a:rPr lang="en-US" b="1" dirty="0" smtClean="0"/>
-              <a:t>[Fix </a:t>
-            </a:r>
-            <a:r>
-              <a:rPr lang="en-US" b="1" dirty="0" err="1" smtClean="0"/>
-              <a:t>SigmaM</a:t>
-            </a:r>
-            <a:r>
-              <a:rPr lang="en-US" b="1" dirty="0" smtClean="0"/>
-              <a:t> at 0 and re-run]</a:t>
-            </a:r>
-            <a:endParaRPr lang="en-US" b="1" dirty="0" smtClean="0"/>
-          </a:p>
-        </p:txBody>
-      </p:sp>
-    </p:spTree>
-    <p:extLst>
-      <p:ext uri="{BB962C8B-B14F-4D97-AF65-F5344CB8AC3E}">
-        <p14:creationId xmlns:p14="http://schemas.microsoft.com/office/powerpoint/2010/main" val="3205172949"/>
-      </p:ext>
-    </p:extLst>
-  </p:cSld>
-  <p:clrMapOvr>
-    <a:masterClrMapping/>
-  </p:clrMapOvr>
-  <p:timing>
-    <p:tnLst>
-      <p:par>
-        <p:cTn id="1" dur="indefinite" restart="never" nodeType="tmRoot"/>
-      </p:par>
-    </p:tnLst>
-  </p:timing>
-</p:sld>
-</file>
-
 <file path=ppt/slides/slide2.xml><?xml version="1.0" encoding="utf-8"?>
 <p:sld xmlns:a="http://schemas.openxmlformats.org/drawingml/2006/main" xmlns:r="http://schemas.openxmlformats.org/officeDocument/2006/relationships" xmlns:p="http://schemas.openxmlformats.org/presentationml/2006/main">
   <p:cSld>
@@ -9434,6 +10152,111 @@
     <p:extLst>
       <p:ext uri="{BB962C8B-B14F-4D97-AF65-F5344CB8AC3E}">
         <p14:creationId xmlns:p14="http://schemas.microsoft.com/office/powerpoint/2010/main" val="3172352572"/>
+      </p:ext>
+    </p:extLst>
+  </p:cSld>
+  <p:clrMapOvr>
+    <a:masterClrMapping/>
+  </p:clrMapOvr>
+  <p:timing>
+    <p:tnLst>
+      <p:par>
+        <p:cTn id="1" dur="indefinite" restart="never" nodeType="tmRoot"/>
+      </p:par>
+    </p:tnLst>
+  </p:timing>
+</p:sld>
+</file>
+
+<file path=ppt/slides/slide20.xml><?xml version="1.0" encoding="utf-8"?>
+<p:sld xmlns:a="http://schemas.openxmlformats.org/drawingml/2006/main" xmlns:r="http://schemas.openxmlformats.org/officeDocument/2006/relationships" xmlns:p="http://schemas.openxmlformats.org/presentationml/2006/main">
+  <p:cSld>
+    <p:spTree>
+      <p:nvGrpSpPr>
+        <p:cNvPr id="1" name=""/>
+        <p:cNvGrpSpPr/>
+        <p:nvPr/>
+      </p:nvGrpSpPr>
+      <p:grpSpPr>
+        <a:xfrm>
+          <a:off x="0" y="0"/>
+          <a:ext cx="0" cy="0"/>
+          <a:chOff x="0" y="0"/>
+          <a:chExt cx="0" cy="0"/>
+        </a:xfrm>
+      </p:grpSpPr>
+      <p:sp>
+        <p:nvSpPr>
+          <p:cNvPr id="2" name="Title 1"/>
+          <p:cNvSpPr>
+            <a:spLocks noGrp="1"/>
+          </p:cNvSpPr>
+          <p:nvPr>
+            <p:ph type="title"/>
+          </p:nvPr>
+        </p:nvSpPr>
+        <p:spPr/>
+        <p:txBody>
+          <a:bodyPr/>
+          <a:lstStyle/>
+          <a:p>
+            <a:endParaRPr lang="en-GB"/>
+          </a:p>
+        </p:txBody>
+      </p:sp>
+      <p:sp>
+        <p:nvSpPr>
+          <p:cNvPr id="3" name="Content Placeholder 2"/>
+          <p:cNvSpPr>
+            <a:spLocks noGrp="1"/>
+          </p:cNvSpPr>
+          <p:nvPr>
+            <p:ph idx="1"/>
+          </p:nvPr>
+        </p:nvSpPr>
+        <p:spPr/>
+        <p:txBody>
+          <a:bodyPr/>
+          <a:lstStyle/>
+          <a:p>
+            <a:pPr marL="0" indent="0">
+              <a:buNone/>
+            </a:pPr>
+            <a:r>
+              <a:rPr lang="en-US" b="1" dirty="0" smtClean="0"/>
+              <a:t>Lab exercise</a:t>
+            </a:r>
+            <a:endParaRPr lang="en-US" dirty="0" smtClean="0"/>
+          </a:p>
+          <a:p>
+            <a:pPr marL="0" indent="0">
+              <a:buNone/>
+            </a:pPr>
+            <a:endParaRPr lang="en-US" b="1" dirty="0"/>
+          </a:p>
+          <a:p>
+            <a:pPr marL="0" indent="0">
+              <a:buNone/>
+            </a:pPr>
+            <a:r>
+              <a:rPr lang="en-US" b="1" dirty="0" smtClean="0"/>
+              <a:t>[Fix </a:t>
+            </a:r>
+            <a:r>
+              <a:rPr lang="en-US" b="1" dirty="0" err="1" smtClean="0"/>
+              <a:t>SigmaM</a:t>
+            </a:r>
+            <a:r>
+              <a:rPr lang="en-US" b="1" dirty="0" smtClean="0"/>
+              <a:t> at 0 and re-run]</a:t>
+            </a:r>
+          </a:p>
+        </p:txBody>
+      </p:sp>
+    </p:spTree>
+    <p:extLst>
+      <p:ext uri="{BB962C8B-B14F-4D97-AF65-F5344CB8AC3E}">
+        <p14:creationId xmlns:p14="http://schemas.microsoft.com/office/powerpoint/2010/main" val="3205172949"/>
       </p:ext>
     </p:extLst>
   </p:cSld>
@@ -11339,8 +12162,8 @@
           </a:p>
         </p:txBody>
       </p:sp>
-      <mc:AlternateContent xmlns:mc="http://schemas.openxmlformats.org/markup-compatibility/2006" xmlns:a14="http://schemas.microsoft.com/office/drawing/2010/main">
-        <mc:Choice Requires="a14">
+      <mc:AlternateContent xmlns:mc="http://schemas.openxmlformats.org/markup-compatibility/2006">
+        <mc:Choice xmlns:a14="http://schemas.microsoft.com/office/drawing/2010/main" Requires="a14">
           <p:sp>
             <p:nvSpPr>
               <p:cNvPr id="3" name="Content Placeholder 2"/>
@@ -11752,31 +12575,64 @@
                         </a:rPr>
                         <m:t>(</m:t>
                       </m:r>
-                      <m:sSub>
-                        <m:sSubPr>
+                      <m:func>
+                        <m:funcPr>
                           <m:ctrlPr>
                             <a:rPr lang="en-US" b="0" i="1" smtClean="0">
                               <a:latin typeface="Cambria Math" panose="02040503050406030204" pitchFamily="18" charset="0"/>
                             </a:rPr>
                           </m:ctrlPr>
-                        </m:sSubPr>
+                        </m:funcPr>
+                        <m:fName>
+                          <m:r>
+                            <m:rPr>
+                              <m:sty m:val="p"/>
+                            </m:rPr>
+                            <a:rPr lang="en-US" b="0" i="0" smtClean="0">
+                              <a:latin typeface="Cambria Math" panose="02040503050406030204" pitchFamily="18" charset="0"/>
+                            </a:rPr>
+                            <m:t>log</m:t>
+                          </m:r>
+                        </m:fName>
                         <m:e>
-                          <m:r>
-                            <a:rPr lang="en-US" b="0" i="1" smtClean="0">
-                              <a:latin typeface="Cambria Math" panose="02040503050406030204" pitchFamily="18" charset="0"/>
-                            </a:rPr>
-                            <m:t>𝑑</m:t>
-                          </m:r>
+                          <m:d>
+                            <m:dPr>
+                              <m:ctrlPr>
+                                <a:rPr lang="en-US" b="0" i="1" smtClean="0">
+                                  <a:latin typeface="Cambria Math" panose="02040503050406030204" pitchFamily="18" charset="0"/>
+                                </a:rPr>
+                              </m:ctrlPr>
+                            </m:dPr>
+                            <m:e>
+                              <m:sSub>
+                                <m:sSubPr>
+                                  <m:ctrlPr>
+                                    <a:rPr lang="en-US" b="0" i="1" smtClean="0">
+                                      <a:latin typeface="Cambria Math" panose="02040503050406030204" pitchFamily="18" charset="0"/>
+                                    </a:rPr>
+                                  </m:ctrlPr>
+                                </m:sSubPr>
+                                <m:e>
+                                  <m:r>
+                                    <a:rPr lang="en-US" b="0" i="1" smtClean="0">
+                                      <a:latin typeface="Cambria Math" panose="02040503050406030204" pitchFamily="18" charset="0"/>
+                                    </a:rPr>
+                                    <m:t>𝑑</m:t>
+                                  </m:r>
+                                </m:e>
+                                <m:sub>
+                                  <m:r>
+                                    <a:rPr lang="en-US" b="0" i="1" smtClean="0">
+                                      <a:latin typeface="Cambria Math" panose="02040503050406030204" pitchFamily="18" charset="0"/>
+                                    </a:rPr>
+                                    <m:t>𝑡</m:t>
+                                  </m:r>
+                                </m:sub>
+                              </m:sSub>
+                            </m:e>
+                          </m:d>
                         </m:e>
-                        <m:sub>
-                          <m:r>
-                            <a:rPr lang="en-US" b="0" i="1" smtClean="0">
-                              <a:latin typeface="Cambria Math" panose="02040503050406030204" pitchFamily="18" charset="0"/>
-                            </a:rPr>
-                            <m:t>𝑡</m:t>
-                          </m:r>
-                        </m:sub>
-                      </m:sSub>
+                      </m:func>
                       <m:r>
                         <a:rPr lang="en-US" b="0" i="1" smtClean="0">
                           <a:latin typeface="Cambria Math" panose="02040503050406030204" pitchFamily="18" charset="0"/>
@@ -11924,7 +12780,7 @@
             </p:txBody>
           </p:sp>
         </mc:Choice>
-        <mc:Fallback xmlns="">
+        <mc:Fallback>
           <p:sp>
             <p:nvSpPr>
               <p:cNvPr id="3" name="Content Placeholder 2"/>

</xml_diff>